<commit_message>
actualizacion materiales clase 1
</commit_message>
<xml_diff>
--- a/clase1/teorica_1.pptx
+++ b/clase1/teorica_1.pptx
@@ -12251,7 +12251,15 @@
             </a:r>
             <a:r>
               <a:rPr lang="es-AR" dirty="0"/>
-              <a:t> de nuestros resultados dependen de una serie de </a:t>
+              <a:t> de nuestros </a:t>
+            </a:r>
+            <a:r>
+              <a:rPr lang="es-AR"/>
+              <a:t>resultados depende </a:t>
+            </a:r>
+            <a:r>
+              <a:rPr lang="es-AR" dirty="0"/>
+              <a:t>de una serie de </a:t>
             </a:r>
             <a:r>
               <a:rPr lang="es-AR" b="1" dirty="0"/>

</xml_diff>

<commit_message>
Modifico ppts 1, 2 y 3 (in progress)
</commit_message>
<xml_diff>
--- a/clase1/teorica_1.pptx
+++ b/clase1/teorica_1.pptx
@@ -19156,17 +19156,15 @@
         </p:nvSpPr>
         <p:spPr>
           <a:xfrm>
-            <a:off x="919369" y="1364869"/>
-            <a:ext cx="7305262" cy="3259886"/>
+            <a:off x="417199" y="1162501"/>
+            <a:ext cx="4154801" cy="3259886"/>
           </a:xfrm>
           <a:prstGeom prst="rect">
             <a:avLst/>
           </a:prstGeom>
           <a:noFill/>
           <a:ln>
-            <a:solidFill>
-              <a:schemeClr val="tx2"/>
-            </a:solidFill>
+            <a:noFill/>
             <a:extLst>
               <a:ext uri="{C807C97D-BFC1-408E-A445-0C87EB9F89A2}">
                 <ask:lineSketchStyleProps xmlns:ask="http://schemas.microsoft.com/office/drawing/2018/sketchyshapes">
@@ -19192,44 +19190,44 @@
               <a:buChar char="§"/>
             </a:pPr>
             <a:r>
-              <a:rPr lang="en-GB" dirty="0"/>
+              <a:rPr lang="en-GB" sz="1400" dirty="0"/>
               <a:t>An Introduction to Statistical Learning with applications in R (James, Witten, Hastie y </a:t>
             </a:r>
             <a:r>
-              <a:rPr lang="en-GB" dirty="0" err="1"/>
+              <a:rPr lang="en-GB" sz="1400" dirty="0" err="1"/>
               <a:t>Tibshirani</a:t>
             </a:r>
             <a:r>
-              <a:rPr lang="en-GB" dirty="0"/>
+              <a:rPr lang="en-GB" sz="1400" dirty="0"/>
               <a:t>) – 1</a:t>
             </a:r>
             <a:r>
-              <a:rPr lang="en-GB" baseline="30000" dirty="0"/>
+              <a:rPr lang="en-GB" sz="1400" baseline="30000" dirty="0"/>
               <a:t>st</a:t>
             </a:r>
             <a:r>
-              <a:rPr lang="en-GB" dirty="0"/>
+              <a:rPr lang="en-GB" sz="1400" dirty="0"/>
               <a:t> and </a:t>
             </a:r>
             <a:r>
-              <a:rPr lang="en-GB" dirty="0">
+              <a:rPr lang="en-GB" sz="1400" dirty="0">
                 <a:hlinkClick r:id="rId3"/>
               </a:rPr>
               <a:t>2</a:t>
             </a:r>
             <a:r>
-              <a:rPr lang="en-GB" baseline="30000" dirty="0">
+              <a:rPr lang="en-GB" sz="1400" baseline="30000" dirty="0">
                 <a:hlinkClick r:id="rId3"/>
               </a:rPr>
               <a:t>nd</a:t>
             </a:r>
             <a:r>
-              <a:rPr lang="en-GB" dirty="0">
+              <a:rPr lang="en-GB" sz="1400" dirty="0">
                 <a:hlinkClick r:id="rId3"/>
               </a:rPr>
               <a:t> version </a:t>
             </a:r>
-            <a:endParaRPr lang="en-GB" dirty="0"/>
+            <a:endParaRPr lang="en-GB" sz="1400" dirty="0"/>
           </a:p>
           <a:p>
             <a:pPr marL="285750" indent="-285750">
@@ -19239,7 +19237,7 @@
               <a:buFont typeface="Wingdings" panose="05000000000000000000" pitchFamily="2" charset="2"/>
               <a:buChar char="§"/>
             </a:pPr>
-            <a:endParaRPr lang="en-GB" dirty="0"/>
+            <a:endParaRPr lang="en-GB" sz="1400" dirty="0"/>
           </a:p>
           <a:p>
             <a:pPr marL="285750" indent="-285750">
@@ -19250,25 +19248,25 @@
               <a:buChar char="§"/>
             </a:pPr>
             <a:r>
-              <a:rPr lang="en-US" dirty="0">
+              <a:rPr lang="en-US" sz="1400" dirty="0">
                 <a:hlinkClick r:id="rId4"/>
               </a:rPr>
               <a:t>Tidy Modeling with R (Kuhn y </a:t>
             </a:r>
             <a:r>
-              <a:rPr lang="en-US" dirty="0" err="1">
+              <a:rPr lang="en-US" sz="1400" dirty="0" err="1">
                 <a:hlinkClick r:id="rId4"/>
               </a:rPr>
               <a:t>Silge</a:t>
             </a:r>
             <a:r>
-              <a:rPr lang="en-US" dirty="0">
+              <a:rPr lang="en-US" sz="1400" dirty="0">
                 <a:hlinkClick r:id="rId4"/>
               </a:rPr>
               <a:t>)</a:t>
             </a:r>
             <a:r>
-              <a:rPr lang="es-AR" dirty="0"/>
+              <a:rPr lang="es-AR" sz="1400" dirty="0"/>
               <a:t> </a:t>
             </a:r>
           </a:p>
@@ -19280,7 +19278,7 @@
               <a:buFont typeface="Wingdings" panose="05000000000000000000" pitchFamily="2" charset="2"/>
               <a:buChar char="§"/>
             </a:pPr>
-            <a:endParaRPr lang="es-AR" dirty="0"/>
+            <a:endParaRPr lang="es-AR" sz="1400" dirty="0"/>
           </a:p>
           <a:p>
             <a:pPr marL="285750" indent="-285750">
@@ -19291,35 +19289,37 @@
               <a:buChar char="§"/>
             </a:pPr>
             <a:r>
-              <a:rPr lang="es-AR" dirty="0" err="1"/>
+              <a:rPr lang="es-AR" sz="1400" dirty="0">
+                <a:hlinkClick r:id="rId5"/>
+              </a:rPr>
               <a:t>Introduction</a:t>
             </a:r>
             <a:r>
-              <a:rPr lang="es-AR" dirty="0"/>
+              <a:rPr lang="es-AR" sz="1400" dirty="0"/>
               <a:t> </a:t>
             </a:r>
             <a:r>
-              <a:rPr lang="es-AR" dirty="0" err="1"/>
+              <a:rPr lang="es-AR" sz="1400" dirty="0" err="1"/>
               <a:t>to</a:t>
             </a:r>
             <a:r>
-              <a:rPr lang="es-AR" dirty="0"/>
+              <a:rPr lang="es-AR" sz="1400" dirty="0"/>
               <a:t> Modern </a:t>
             </a:r>
             <a:r>
-              <a:rPr lang="es-AR" dirty="0" err="1"/>
+              <a:rPr lang="es-AR" sz="1400" dirty="0" err="1"/>
               <a:t>Statistics</a:t>
             </a:r>
             <a:r>
-              <a:rPr lang="es-AR" dirty="0"/>
+              <a:rPr lang="es-AR" sz="1400" dirty="0"/>
               <a:t> (</a:t>
             </a:r>
             <a:r>
-              <a:rPr lang="es-AR" dirty="0" err="1"/>
+              <a:rPr lang="es-AR" sz="1400" dirty="0" err="1"/>
               <a:t>Çetinkaya</a:t>
             </a:r>
             <a:r>
-              <a:rPr lang="es-AR" dirty="0"/>
+              <a:rPr lang="es-AR" sz="1400" dirty="0"/>
               <a:t>-Rundel y Hardin) </a:t>
             </a:r>
           </a:p>
@@ -19368,6 +19368,101 @@
           </a:fontRef>
         </p:style>
       </p:cxnSp>
+      <p:pic>
+        <p:nvPicPr>
+          <p:cNvPr id="6" name="Imagen 5">
+            <a:extLst>
+              <a:ext uri="{FF2B5EF4-FFF2-40B4-BE49-F238E27FC236}">
+                <a16:creationId xmlns:a16="http://schemas.microsoft.com/office/drawing/2014/main" id="{9B3FEC64-D508-4033-8F47-A49BEBA90840}"/>
+              </a:ext>
+            </a:extLst>
+          </p:cNvPr>
+          <p:cNvPicPr>
+            <a:picLocks noChangeAspect="1"/>
+          </p:cNvPicPr>
+          <p:nvPr/>
+        </p:nvPicPr>
+        <p:blipFill>
+          <a:blip r:embed="rId6"/>
+          <a:stretch>
+            <a:fillRect/>
+          </a:stretch>
+        </p:blipFill>
+        <p:spPr>
+          <a:xfrm>
+            <a:off x="4515898" y="1462908"/>
+            <a:ext cx="2244480" cy="2917461"/>
+          </a:xfrm>
+          <a:prstGeom prst="rect">
+            <a:avLst/>
+          </a:prstGeom>
+          <a:ln>
+            <a:solidFill>
+              <a:schemeClr val="tx1"/>
+            </a:solidFill>
+          </a:ln>
+        </p:spPr>
+      </p:pic>
+      <p:pic>
+        <p:nvPicPr>
+          <p:cNvPr id="10" name="Imagen 9">
+            <a:extLst>
+              <a:ext uri="{FF2B5EF4-FFF2-40B4-BE49-F238E27FC236}">
+                <a16:creationId xmlns:a16="http://schemas.microsoft.com/office/drawing/2014/main" id="{8493B9F6-6CF5-4799-A076-4A1F48D53299}"/>
+              </a:ext>
+            </a:extLst>
+          </p:cNvPr>
+          <p:cNvPicPr>
+            <a:picLocks noChangeAspect="1"/>
+          </p:cNvPicPr>
+          <p:nvPr/>
+        </p:nvPicPr>
+        <p:blipFill>
+          <a:blip r:embed="rId7"/>
+          <a:stretch>
+            <a:fillRect/>
+          </a:stretch>
+        </p:blipFill>
+        <p:spPr>
+          <a:xfrm rot="582499">
+            <a:off x="7128582" y="618711"/>
+            <a:ext cx="1831357" cy="2338501"/>
+          </a:xfrm>
+          <a:prstGeom prst="rect">
+            <a:avLst/>
+          </a:prstGeom>
+        </p:spPr>
+      </p:pic>
+      <p:pic>
+        <p:nvPicPr>
+          <p:cNvPr id="8" name="Imagen 7">
+            <a:extLst>
+              <a:ext uri="{FF2B5EF4-FFF2-40B4-BE49-F238E27FC236}">
+                <a16:creationId xmlns:a16="http://schemas.microsoft.com/office/drawing/2014/main" id="{F7DC88D4-FA26-42CB-BC86-B82208AC47D9}"/>
+              </a:ext>
+            </a:extLst>
+          </p:cNvPr>
+          <p:cNvPicPr>
+            <a:picLocks noChangeAspect="1"/>
+          </p:cNvPicPr>
+          <p:nvPr/>
+        </p:nvPicPr>
+        <p:blipFill>
+          <a:blip r:embed="rId8"/>
+          <a:stretch>
+            <a:fillRect/>
+          </a:stretch>
+        </p:blipFill>
+        <p:spPr>
+          <a:xfrm rot="20782492">
+            <a:off x="7002312" y="2462353"/>
+            <a:ext cx="1695264" cy="2256560"/>
+          </a:xfrm>
+          <a:prstGeom prst="rect">
+            <a:avLst/>
+          </a:prstGeom>
+        </p:spPr>
+      </p:pic>
     </p:spTree>
   </p:cSld>
   <p:clrMapOvr>
@@ -22816,7 +22911,7 @@
           <p:nvPr>
             <p:extLst>
               <p:ext uri="{D42A27DB-BD31-4B8C-83A1-F6EECF244321}">
-                <p14:modId xmlns:p14="http://schemas.microsoft.com/office/powerpoint/2010/main" val="3433493774"/>
+                <p14:modId xmlns:p14="http://schemas.microsoft.com/office/powerpoint/2010/main" val="698374864"/>
               </p:ext>
             </p:extLst>
           </p:nvPr>
@@ -23233,7 +23328,10 @@
                         <a:buNone/>
                       </a:pPr>
                       <a:r>
-                        <a:rPr lang="en-GB">
+                        <a:rPr lang="en-GB" dirty="0">
+                          <a:solidFill>
+                            <a:schemeClr val="bg2"/>
+                          </a:solidFill>
                           <a:latin typeface="Proxima Nova"/>
                           <a:ea typeface="Proxima Nova"/>
                           <a:cs typeface="Proxima Nova"/>
@@ -23241,7 +23339,10 @@
                         </a:rPr>
                         <a:t>1</a:t>
                       </a:r>
-                      <a:endParaRPr>
+                      <a:endParaRPr dirty="0">
+                        <a:solidFill>
+                          <a:schemeClr val="bg2"/>
+                        </a:solidFill>
                         <a:latin typeface="Proxima Nova"/>
                         <a:ea typeface="Proxima Nova"/>
                         <a:cs typeface="Proxima Nova"/>
@@ -23312,14 +23413,20 @@
                       </a:pPr>
                       <a:r>
                         <a:rPr lang="en-GB" dirty="0">
+                          <a:solidFill>
+                            <a:schemeClr val="bg2"/>
+                          </a:solidFill>
                           <a:latin typeface="Proxima Nova"/>
                           <a:ea typeface="Proxima Nova"/>
                           <a:cs typeface="Proxima Nova"/>
                           <a:sym typeface="Proxima Nova"/>
                         </a:rPr>
-                        <a:t>10/8</a:t>
+                        <a:t>13/8</a:t>
                       </a:r>
                       <a:endParaRPr dirty="0">
+                        <a:solidFill>
+                          <a:schemeClr val="bg2"/>
+                        </a:solidFill>
                         <a:latin typeface="Proxima Nova"/>
                         <a:ea typeface="Proxima Nova"/>
                         <a:cs typeface="Proxima Nova"/>
@@ -23390,6 +23497,9 @@
                       </a:pPr>
                       <a:r>
                         <a:rPr lang="en-GB" dirty="0">
+                          <a:solidFill>
+                            <a:schemeClr val="bg2"/>
+                          </a:solidFill>
                           <a:latin typeface="Proxima Nova"/>
                           <a:ea typeface="Proxima Nova"/>
                           <a:cs typeface="Proxima Nova"/>
@@ -23399,6 +23509,9 @@
                       </a:r>
                       <a:r>
                         <a:rPr lang="en-GB" dirty="0" err="1">
+                          <a:solidFill>
+                            <a:schemeClr val="bg2"/>
+                          </a:solidFill>
                           <a:latin typeface="Proxima Nova"/>
                           <a:ea typeface="Proxima Nova"/>
                           <a:cs typeface="Proxima Nova"/>
@@ -23408,6 +23521,9 @@
                       </a:r>
                       <a:r>
                         <a:rPr lang="en-GB" dirty="0">
+                          <a:solidFill>
+                            <a:schemeClr val="bg2"/>
+                          </a:solidFill>
                           <a:latin typeface="Proxima Nova"/>
                           <a:ea typeface="Proxima Nova"/>
                           <a:cs typeface="Proxima Nova"/>
@@ -23417,6 +23533,9 @@
                       </a:r>
                       <a:r>
                         <a:rPr lang="en-GB" dirty="0" err="1">
+                          <a:solidFill>
+                            <a:schemeClr val="bg2"/>
+                          </a:solidFill>
                           <a:latin typeface="Proxima Nova"/>
                           <a:ea typeface="Proxima Nova"/>
                           <a:cs typeface="Proxima Nova"/>
@@ -23426,6 +23545,9 @@
                       </a:r>
                       <a:r>
                         <a:rPr lang="en-GB" dirty="0">
+                          <a:solidFill>
+                            <a:schemeClr val="bg2"/>
+                          </a:solidFill>
                           <a:latin typeface="Proxima Nova"/>
                           <a:ea typeface="Proxima Nova"/>
                           <a:cs typeface="Proxima Nova"/>
@@ -23434,6 +23556,9 @@
                         <a:t>, trade-offs</a:t>
                       </a:r>
                       <a:endParaRPr dirty="0">
+                        <a:solidFill>
+                          <a:schemeClr val="bg2"/>
+                        </a:solidFill>
                         <a:latin typeface="Proxima Nova"/>
                         <a:ea typeface="Proxima Nova"/>
                         <a:cs typeface="Proxima Nova"/>
@@ -23504,6 +23629,9 @@
                       </a:pPr>
                       <a:r>
                         <a:rPr lang="en-GB" sz="1200" dirty="0">
+                          <a:solidFill>
+                            <a:schemeClr val="bg2"/>
+                          </a:solidFill>
                           <a:latin typeface="Proxima Nova"/>
                           <a:ea typeface="Proxima Nova"/>
                           <a:cs typeface="Proxima Nova"/>
@@ -23512,6 +23640,9 @@
                         <a:t>Cap 2 ISLR + Cap 1 TMR + Caps 4 y 5 IMS</a:t>
                       </a:r>
                       <a:endParaRPr sz="1200" dirty="0">
+                        <a:solidFill>
+                          <a:schemeClr val="bg2"/>
+                        </a:solidFill>
                         <a:latin typeface="Proxima Nova"/>
                         <a:ea typeface="Proxima Nova"/>
                         <a:cs typeface="Proxima Nova"/>
@@ -23672,7 +23803,7 @@
                           <a:cs typeface="Proxima Nova"/>
                           <a:sym typeface="Proxima Nova"/>
                         </a:rPr>
-                        <a:t>17/8</a:t>
+                        <a:t>20/8</a:t>
                       </a:r>
                     </a:p>
                   </a:txBody>
@@ -24071,7 +24202,7 @@
                           <a:cs typeface="Proxima Nova"/>
                           <a:sym typeface="Proxima Nova"/>
                         </a:rPr>
-                        <a:t>24/8</a:t>
+                        <a:t>27/8</a:t>
                       </a:r>
                     </a:p>
                   </a:txBody>
@@ -24441,7 +24572,7 @@
                           <a:cs typeface="Proxima Nova"/>
                           <a:sym typeface="Proxima Nova"/>
                         </a:rPr>
-                        <a:t>31/8</a:t>
+                        <a:t>3/9</a:t>
                       </a:r>
                     </a:p>
                   </a:txBody>
@@ -24829,7 +24960,7 @@
                           <a:cs typeface="Proxima Nova"/>
                           <a:sym typeface="Proxima Nova"/>
                         </a:rPr>
-                        <a:t>7/9</a:t>
+                        <a:t>10/9</a:t>
                       </a:r>
                     </a:p>
                   </a:txBody>
@@ -25169,7 +25300,7 @@
                           <a:cs typeface="Proxima Nova"/>
                           <a:sym typeface="Proxima Nova"/>
                         </a:rPr>
-                        <a:t>14/9</a:t>
+                        <a:t>17/9</a:t>
                       </a:r>
                     </a:p>
                   </a:txBody>

</xml_diff>

<commit_message>
corrijo hoja de ruta, sumo a Santiago
</commit_message>
<xml_diff>
--- a/clase1/teorica_1.pptx
+++ b/clase1/teorica_1.pptx
@@ -65,15 +65,19 @@
   <p:notesSz cx="6858000" cy="9144000"/>
   <p:embeddedFontLst>
     <p:embeddedFont>
-      <p:font typeface="Cambria Math" panose="02040503050406030204" pitchFamily="18" charset="0"/>
+      <p:font typeface="MS Mincho" panose="02020609040205080304" pitchFamily="49" charset="-128"/>
       <p:regular r:id="rId55"/>
     </p:embeddedFont>
     <p:embeddedFont>
+      <p:font typeface="Cambria Math" panose="02040503050406030204" pitchFamily="18" charset="0"/>
+      <p:regular r:id="rId56"/>
+    </p:embeddedFont>
+    <p:embeddedFont>
       <p:font typeface="Proxima Nova" panose="020B0604020202020204" charset="0"/>
-      <p:regular r:id="rId56"/>
-      <p:bold r:id="rId57"/>
-      <p:italic r:id="rId58"/>
-      <p:boldItalic r:id="rId59"/>
+      <p:regular r:id="rId57"/>
+      <p:bold r:id="rId58"/>
+      <p:italic r:id="rId59"/>
+      <p:boldItalic r:id="rId60"/>
     </p:embeddedFont>
   </p:embeddedFontLst>
   <p:defaultTextStyle>
@@ -12186,7 +12190,7 @@
         </p:spPr>
         <p:txBody>
           <a:bodyPr spcFirstLastPara="1" wrap="square" lIns="91425" tIns="91425" rIns="91425" bIns="91425" anchor="t" anchorCtr="0">
-            <a:normAutofit/>
+            <a:normAutofit lnSpcReduction="10000"/>
           </a:bodyPr>
           <a:lstStyle/>
           <a:p>
@@ -12195,7 +12199,7 @@
                 <a:spcPct val="150000"/>
               </a:lnSpc>
               <a:spcBef>
-                <a:spcPts val="0"/>
+                <a:spcPts val="1000"/>
               </a:spcBef>
               <a:spcAft>
                 <a:spcPts val="0"/>
@@ -12203,7 +12207,7 @@
               <a:buNone/>
             </a:pPr>
             <a:r>
-              <a:rPr lang="en-GB" sz="2400" b="1" dirty="0" err="1">
+              <a:rPr lang="en-GB" sz="2800" b="1" dirty="0" err="1">
                 <a:solidFill>
                   <a:schemeClr val="lt1"/>
                 </a:solidFill>
@@ -12419,7 +12423,7 @@
         </p:spPr>
         <p:txBody>
           <a:bodyPr spcFirstLastPara="1" wrap="square" lIns="91425" tIns="91425" rIns="91425" bIns="91425" anchor="t" anchorCtr="0">
-            <a:normAutofit lnSpcReduction="10000"/>
+            <a:normAutofit/>
           </a:bodyPr>
           <a:lstStyle/>
           <a:p>
@@ -12436,7 +12440,7 @@
               <a:buNone/>
             </a:pPr>
             <a:r>
-              <a:rPr lang="en-GB" sz="3400" b="1" dirty="0" err="1">
+              <a:rPr lang="en-GB" sz="2800" b="1" dirty="0" err="1">
                 <a:solidFill>
                   <a:schemeClr val="bg2"/>
                 </a:solidFill>
@@ -12598,7 +12602,7 @@
         <p:spPr>
           <a:xfrm>
             <a:off x="311699" y="1152475"/>
-            <a:ext cx="6871615" cy="3416400"/>
+            <a:ext cx="8045317" cy="3416400"/>
           </a:xfrm>
           <a:prstGeom prst="rect">
             <a:avLst/>
@@ -12615,7 +12619,7 @@
               <a:buChar char="§"/>
             </a:pPr>
             <a:r>
-              <a:rPr lang="es-AR" i="1" dirty="0">
+              <a:rPr lang="es-AR" sz="2000" i="1" dirty="0">
                 <a:solidFill>
                   <a:schemeClr val="bg2"/>
                 </a:solidFill>
@@ -12623,11 +12627,11 @@
               <a:t>f</a:t>
             </a:r>
             <a:r>
-              <a:rPr lang="es-AR" dirty="0"/>
+              <a:rPr lang="es-AR" sz="2000" dirty="0"/>
               <a:t> puede funcionar como una </a:t>
             </a:r>
             <a:r>
-              <a:rPr lang="es-AR" b="1" dirty="0"/>
+              <a:rPr lang="es-AR" sz="2000" b="1" dirty="0"/>
               <a:t>caja negra.</a:t>
             </a:r>
           </a:p>
@@ -12635,7 +12639,7 @@
             <a:pPr marL="0" indent="0">
               <a:buNone/>
             </a:pPr>
-            <a:endParaRPr lang="es-AR" b="1" dirty="0"/>
+            <a:endParaRPr lang="es-AR" sz="2000" b="1" dirty="0"/>
           </a:p>
           <a:p>
             <a:pPr marL="285750" indent="-285750">
@@ -12643,17 +12647,23 @@
               <a:buChar char="§"/>
             </a:pPr>
             <a:r>
-              <a:rPr lang="es-AR" dirty="0"/>
+              <a:rPr lang="es-AR" sz="2000" dirty="0"/>
               <a:t>El </a:t>
             </a:r>
             <a:r>
-              <a:rPr lang="es-AR" b="1" dirty="0"/>
+              <a:rPr lang="es-AR" sz="2000" b="1" dirty="0"/>
               <a:t>error</a:t>
             </a:r>
             <a:r>
-              <a:rPr lang="es-AR" dirty="0"/>
+              <a:rPr lang="es-AR" sz="2000" dirty="0"/>
               <a:t> de nuestras predicciones se puede descomponer en dos partes:</a:t>
             </a:r>
+          </a:p>
+          <a:p>
+            <a:pPr marL="0" indent="0">
+              <a:buNone/>
+            </a:pPr>
+            <a:endParaRPr lang="es-AR" sz="2000" dirty="0"/>
           </a:p>
           <a:p>
             <a:pPr marL="742950" lvl="1" indent="-285750">
@@ -12661,11 +12671,11 @@
               <a:buChar char="§"/>
             </a:pPr>
             <a:r>
-              <a:rPr lang="es-AR" dirty="0"/>
+              <a:rPr lang="es-AR" sz="2000" dirty="0"/>
               <a:t>Reducible: mejorar </a:t>
             </a:r>
             <a:r>
-              <a:rPr lang="es-AR" dirty="0">
+              <a:rPr lang="es-AR" sz="2000" dirty="0">
                 <a:solidFill>
                   <a:schemeClr val="bg2"/>
                 </a:solidFill>
@@ -12679,11 +12689,11 @@
               <a:buChar char="§"/>
             </a:pPr>
             <a:r>
-              <a:rPr lang="es-AR" dirty="0"/>
+              <a:rPr lang="es-AR" sz="2000" dirty="0"/>
               <a:t>Irreducible: </a:t>
             </a:r>
             <a:r>
-              <a:rPr lang="el-GR" dirty="0">
+              <a:rPr lang="el-GR" sz="2000" dirty="0">
                 <a:solidFill>
                   <a:schemeClr val="bg2"/>
                 </a:solidFill>
@@ -12691,7 +12701,7 @@
               <a:t>ϵ</a:t>
             </a:r>
             <a:r>
-              <a:rPr lang="es-AR" dirty="0">
+              <a:rPr lang="es-AR" sz="2000" dirty="0">
                 <a:solidFill>
                   <a:schemeClr val="bg2"/>
                 </a:solidFill>
@@ -12699,7 +12709,7 @@
               <a:t> </a:t>
             </a:r>
             <a:r>
-              <a:rPr lang="es-AR" dirty="0"/>
+              <a:rPr lang="es-AR" sz="2000" dirty="0"/>
               <a:t>(variables que no incluimos o no podemos medir)</a:t>
             </a:r>
           </a:p>
@@ -12708,7 +12718,7 @@
               <a:buFont typeface="Wingdings" panose="05000000000000000000" pitchFamily="2" charset="2"/>
               <a:buChar char="§"/>
             </a:pPr>
-            <a:endParaRPr b="1" dirty="0"/>
+            <a:endParaRPr sz="2000" b="1" dirty="0"/>
           </a:p>
         </p:txBody>
       </p:sp>
@@ -12858,7 +12868,7 @@
               <a:buChar char="§"/>
             </a:pPr>
             <a:r>
-              <a:rPr lang="es-AR" i="1" dirty="0">
+              <a:rPr lang="es-AR" sz="2000" i="1" dirty="0">
                 <a:solidFill>
                   <a:schemeClr val="bg2"/>
                 </a:solidFill>
@@ -12866,19 +12876,19 @@
               <a:t>f</a:t>
             </a:r>
             <a:r>
-              <a:rPr lang="es-AR" dirty="0"/>
+              <a:rPr lang="es-AR" sz="2000" dirty="0"/>
               <a:t> </a:t>
             </a:r>
             <a:r>
-              <a:rPr lang="es-AR" b="1" u="sng" dirty="0"/>
+              <a:rPr lang="es-AR" sz="2000" b="1" u="sng" dirty="0"/>
               <a:t>no</a:t>
             </a:r>
             <a:r>
-              <a:rPr lang="es-AR" dirty="0"/>
+              <a:rPr lang="es-AR" sz="2000" dirty="0"/>
               <a:t> puede funcionar como una </a:t>
             </a:r>
             <a:r>
-              <a:rPr lang="es-AR" b="1" dirty="0"/>
+              <a:rPr lang="es-AR" sz="2000" b="1" dirty="0"/>
               <a:t>caja negra.</a:t>
             </a:r>
           </a:p>
@@ -12886,7 +12896,7 @@
             <a:pPr marL="0" indent="0">
               <a:buNone/>
             </a:pPr>
-            <a:endParaRPr lang="es-AR" b="1" dirty="0"/>
+            <a:endParaRPr lang="es-AR" sz="2000" b="1" dirty="0"/>
           </a:p>
           <a:p>
             <a:pPr marL="285750" indent="-285750">
@@ -12894,31 +12904,23 @@
               <a:buChar char="§"/>
             </a:pPr>
             <a:r>
-              <a:rPr lang="es-AR" dirty="0"/>
+              <a:rPr lang="es-AR" sz="2000" dirty="0"/>
               <a:t>La </a:t>
             </a:r>
             <a:r>
-              <a:rPr lang="es-AR" b="1" dirty="0"/>
+              <a:rPr lang="es-AR" sz="2000" b="1" dirty="0"/>
               <a:t>calidad</a:t>
             </a:r>
             <a:r>
-              <a:rPr lang="es-AR" dirty="0"/>
-              <a:t> de nuestros </a:t>
-            </a:r>
-            <a:r>
-              <a:rPr lang="es-AR"/>
-              <a:t>resultados depende </a:t>
-            </a:r>
-            <a:r>
-              <a:rPr lang="es-AR" dirty="0"/>
-              <a:t>de una serie de </a:t>
-            </a:r>
-            <a:r>
-              <a:rPr lang="es-AR" b="1" dirty="0"/>
+              <a:rPr lang="es-AR" sz="2000" dirty="0"/>
+              <a:t> de nuestros resultados depende de una serie de </a:t>
+            </a:r>
+            <a:r>
+              <a:rPr lang="es-AR" sz="2000" b="1" dirty="0"/>
               <a:t>supuestos</a:t>
             </a:r>
             <a:r>
-              <a:rPr lang="es-AR" dirty="0"/>
+              <a:rPr lang="es-AR" sz="2000" dirty="0"/>
               <a:t> acerca de la distribución de los datos.</a:t>
             </a:r>
           </a:p>
@@ -12926,7 +12928,7 @@
             <a:pPr marL="0" indent="0">
               <a:buNone/>
             </a:pPr>
-            <a:endParaRPr lang="es-AR" dirty="0"/>
+            <a:endParaRPr lang="es-AR" sz="2000" dirty="0"/>
           </a:p>
           <a:p>
             <a:pPr marL="285750" indent="-285750">
@@ -12934,8 +12936,8 @@
               <a:buChar char="§"/>
             </a:pPr>
             <a:r>
-              <a:rPr lang="es-AR" dirty="0"/>
-              <a:t>Nuestro interés principal son preguntas cómo:</a:t>
+              <a:rPr lang="es-AR" sz="2000" dirty="0"/>
+              <a:t>Nuestro interés principal son preguntas como:</a:t>
             </a:r>
           </a:p>
           <a:p>
@@ -12944,7 +12946,7 @@
               <a:buChar char="§"/>
             </a:pPr>
             <a:r>
-              <a:rPr lang="es-AR" dirty="0"/>
+              <a:rPr lang="es-AR" sz="1600" dirty="0"/>
               <a:t>¿Qué variables X están relacionadas con Y?</a:t>
             </a:r>
           </a:p>
@@ -12954,7 +12956,7 @@
               <a:buChar char="§"/>
             </a:pPr>
             <a:r>
-              <a:rPr lang="es-AR" dirty="0"/>
+              <a:rPr lang="es-AR" sz="1600" dirty="0"/>
               <a:t>¿Qué dirección tienen estas relaciones?</a:t>
             </a:r>
           </a:p>
@@ -12964,7 +12966,7 @@
               <a:buChar char="§"/>
             </a:pPr>
             <a:r>
-              <a:rPr lang="es-AR" dirty="0"/>
+              <a:rPr lang="es-AR" sz="1600" dirty="0"/>
               <a:t>¿Qué efecto tiene cada variable X en la variable Y?</a:t>
             </a:r>
           </a:p>
@@ -12974,7 +12976,7 @@
               <a:buChar char="§"/>
             </a:pPr>
             <a:r>
-              <a:rPr lang="es-AR" dirty="0"/>
+              <a:rPr lang="es-AR" sz="1600" dirty="0"/>
               <a:t>¿Las relaciones son lineales o no lineales?</a:t>
             </a:r>
           </a:p>
@@ -12983,7 +12985,7 @@
               <a:buFont typeface="Wingdings" panose="05000000000000000000" pitchFamily="2" charset="2"/>
               <a:buChar char="§"/>
             </a:pPr>
-            <a:endParaRPr lang="es-AR" dirty="0"/>
+            <a:endParaRPr lang="es-AR" sz="2000" dirty="0"/>
           </a:p>
           <a:p>
             <a:pPr marL="0" lvl="0" indent="0" algn="l" rtl="0">
@@ -12995,7 +12997,7 @@
               </a:spcAft>
               <a:buNone/>
             </a:pPr>
-            <a:endParaRPr dirty="0"/>
+            <a:endParaRPr sz="2000" dirty="0"/>
           </a:p>
         </p:txBody>
       </p:sp>
@@ -13136,6 +13138,9 @@
               <a:rPr lang="es-AR" sz="3700" dirty="0"/>
               <a:t>¿qué pasa si nuestro modelo de inferencia no predice bien?</a:t>
             </a:r>
+            <a:br>
+              <a:rPr lang="es-AR" sz="3700" dirty="0"/>
+            </a:br>
             <a:br>
               <a:rPr lang="es-AR" sz="3700" dirty="0"/>
             </a:br>
@@ -13609,7 +13614,7 @@
                 <a:spcPct val="150000"/>
               </a:lnSpc>
               <a:spcBef>
-                <a:spcPts val="0"/>
+                <a:spcPts val="1000"/>
               </a:spcBef>
               <a:spcAft>
                 <a:spcPts val="0"/>
@@ -13617,14 +13622,38 @@
               <a:buNone/>
             </a:pPr>
             <a:r>
-              <a:rPr lang="en-GB" sz="2400" b="1">
+              <a:rPr lang="en-GB" sz="2600" b="1" dirty="0" err="1">
                 <a:solidFill>
                   <a:schemeClr val="lt1"/>
                 </a:solidFill>
               </a:rPr>
-              <a:t>Aprendizaje supervisado (supervised learning)</a:t>
-            </a:r>
-            <a:endParaRPr sz="2400" b="1">
+              <a:t>Aprendizaje</a:t>
+            </a:r>
+            <a:r>
+              <a:rPr lang="en-GB" sz="2600" b="1" dirty="0">
+                <a:solidFill>
+                  <a:schemeClr val="lt1"/>
+                </a:solidFill>
+              </a:rPr>
+              <a:t> </a:t>
+            </a:r>
+            <a:r>
+              <a:rPr lang="en-GB" sz="2600" b="1" dirty="0" err="1">
+                <a:solidFill>
+                  <a:schemeClr val="lt1"/>
+                </a:solidFill>
+              </a:rPr>
+              <a:t>supervisado</a:t>
+            </a:r>
+            <a:r>
+              <a:rPr lang="en-GB" sz="2600" b="1" dirty="0">
+                <a:solidFill>
+                  <a:schemeClr val="lt1"/>
+                </a:solidFill>
+              </a:rPr>
+              <a:t> (supervised learning)</a:t>
+            </a:r>
+            <a:endParaRPr sz="2600" b="1" dirty="0">
               <a:solidFill>
                 <a:schemeClr val="lt1"/>
               </a:solidFill>
@@ -13644,15 +13673,87 @@
               <a:buNone/>
             </a:pPr>
             <a:r>
-              <a:rPr lang="en-GB" sz="2000">
+              <a:rPr lang="en-GB" sz="2000" dirty="0" err="1">
                 <a:solidFill>
                   <a:schemeClr val="lt1"/>
                 </a:solidFill>
               </a:rPr>
-              <a:t>Conocemos los valores de Y para un set de casos y estimamos la función </a:t>
-            </a:r>
-            <a:r>
-              <a:rPr lang="en-GB" sz="2000" i="1">
+              <a:t>Conocemos</a:t>
+            </a:r>
+            <a:r>
+              <a:rPr lang="en-GB" sz="2000" dirty="0">
+                <a:solidFill>
+                  <a:schemeClr val="lt1"/>
+                </a:solidFill>
+              </a:rPr>
+              <a:t> los </a:t>
+            </a:r>
+            <a:r>
+              <a:rPr lang="en-GB" sz="2000" dirty="0" err="1">
+                <a:solidFill>
+                  <a:schemeClr val="lt1"/>
+                </a:solidFill>
+              </a:rPr>
+              <a:t>valores</a:t>
+            </a:r>
+            <a:r>
+              <a:rPr lang="en-GB" sz="2000" dirty="0">
+                <a:solidFill>
+                  <a:schemeClr val="lt1"/>
+                </a:solidFill>
+              </a:rPr>
+              <a:t> de Y para un set de </a:t>
+            </a:r>
+            <a:r>
+              <a:rPr lang="en-GB" sz="2000" dirty="0" err="1">
+                <a:solidFill>
+                  <a:schemeClr val="lt1"/>
+                </a:solidFill>
+              </a:rPr>
+              <a:t>casos</a:t>
+            </a:r>
+            <a:r>
+              <a:rPr lang="en-GB" sz="2000" dirty="0">
+                <a:solidFill>
+                  <a:schemeClr val="lt1"/>
+                </a:solidFill>
+              </a:rPr>
+              <a:t> y </a:t>
+            </a:r>
+            <a:r>
+              <a:rPr lang="en-GB" sz="2000" dirty="0" err="1">
+                <a:solidFill>
+                  <a:schemeClr val="lt1"/>
+                </a:solidFill>
+              </a:rPr>
+              <a:t>estimamos</a:t>
+            </a:r>
+            <a:r>
+              <a:rPr lang="en-GB" sz="2000" dirty="0">
+                <a:solidFill>
+                  <a:schemeClr val="lt1"/>
+                </a:solidFill>
+              </a:rPr>
+              <a:t> la </a:t>
+            </a:r>
+            <a:r>
+              <a:rPr lang="en-GB" sz="2000" dirty="0" err="1">
+                <a:solidFill>
+                  <a:schemeClr val="lt1"/>
+                </a:solidFill>
+              </a:rPr>
+              <a:t>función</a:t>
+            </a:r>
+            <a:r>
+              <a:rPr lang="en-GB" sz="2000" dirty="0">
+                <a:solidFill>
+                  <a:schemeClr val="lt1"/>
+                </a:solidFill>
+              </a:rPr>
+              <a:t> </a:t>
+            </a:r>
+            <a:r>
+              <a:rPr lang="en-GB" sz="2000" i="1" dirty="0">
                 <a:solidFill>
                   <a:schemeClr val="lt1"/>
                 </a:solidFill>
@@ -13660,14 +13761,126 @@
               <a:t>f</a:t>
             </a:r>
             <a:r>
-              <a:rPr lang="en-GB" sz="2000">
+              <a:rPr lang="en-GB" sz="2000" dirty="0">
                 <a:solidFill>
                   <a:schemeClr val="lt1"/>
                 </a:solidFill>
               </a:rPr>
-              <a:t> que relaciona X con Y para predecir Y futuros o inferir relaciones (regresiones, clasificaciones, etc.)</a:t>
-            </a:r>
-            <a:endParaRPr sz="2400" b="1">
+              <a:t> que </a:t>
+            </a:r>
+            <a:r>
+              <a:rPr lang="en-GB" sz="2000" dirty="0" err="1">
+                <a:solidFill>
+                  <a:schemeClr val="lt1"/>
+                </a:solidFill>
+              </a:rPr>
+              <a:t>relaciona</a:t>
+            </a:r>
+            <a:r>
+              <a:rPr lang="en-GB" sz="2000" dirty="0">
+                <a:solidFill>
+                  <a:schemeClr val="lt1"/>
+                </a:solidFill>
+              </a:rPr>
+              <a:t> X con Y para </a:t>
+            </a:r>
+            <a:r>
+              <a:rPr lang="en-GB" sz="2000" dirty="0" err="1">
+                <a:solidFill>
+                  <a:schemeClr val="lt1"/>
+                </a:solidFill>
+              </a:rPr>
+              <a:t>predecir</a:t>
+            </a:r>
+            <a:r>
+              <a:rPr lang="en-GB" sz="2000" dirty="0">
+                <a:solidFill>
+                  <a:schemeClr val="lt1"/>
+                </a:solidFill>
+              </a:rPr>
+              <a:t> Y </a:t>
+            </a:r>
+            <a:r>
+              <a:rPr lang="en-GB" sz="2000" dirty="0" err="1">
+                <a:solidFill>
+                  <a:schemeClr val="lt1"/>
+                </a:solidFill>
+              </a:rPr>
+              <a:t>futuros</a:t>
+            </a:r>
+            <a:r>
+              <a:rPr lang="en-GB" sz="2000" dirty="0">
+                <a:solidFill>
+                  <a:schemeClr val="lt1"/>
+                </a:solidFill>
+              </a:rPr>
+              <a:t> o </a:t>
+            </a:r>
+            <a:r>
+              <a:rPr lang="en-GB" sz="2000" dirty="0" err="1">
+                <a:solidFill>
+                  <a:schemeClr val="lt1"/>
+                </a:solidFill>
+              </a:rPr>
+              <a:t>inferir</a:t>
+            </a:r>
+            <a:r>
+              <a:rPr lang="en-GB" sz="2000" dirty="0">
+                <a:solidFill>
+                  <a:schemeClr val="lt1"/>
+                </a:solidFill>
+              </a:rPr>
+              <a:t> </a:t>
+            </a:r>
+            <a:r>
+              <a:rPr lang="en-GB" sz="2000" dirty="0" err="1">
+                <a:solidFill>
+                  <a:schemeClr val="lt1"/>
+                </a:solidFill>
+              </a:rPr>
+              <a:t>relaciones</a:t>
+            </a:r>
+            <a:r>
+              <a:rPr lang="en-GB" sz="2000" dirty="0">
+                <a:solidFill>
+                  <a:schemeClr val="lt1"/>
+                </a:solidFill>
+              </a:rPr>
+              <a:t> (</a:t>
+            </a:r>
+            <a:r>
+              <a:rPr lang="en-GB" sz="2000" dirty="0" err="1">
+                <a:solidFill>
+                  <a:schemeClr val="lt1"/>
+                </a:solidFill>
+              </a:rPr>
+              <a:t>regresiones</a:t>
+            </a:r>
+            <a:r>
+              <a:rPr lang="en-GB" sz="2000" dirty="0">
+                <a:solidFill>
+                  <a:schemeClr val="lt1"/>
+                </a:solidFill>
+              </a:rPr>
+              <a:t>, </a:t>
+            </a:r>
+            <a:r>
+              <a:rPr lang="en-GB" sz="2000" dirty="0" err="1">
+                <a:solidFill>
+                  <a:schemeClr val="lt1"/>
+                </a:solidFill>
+              </a:rPr>
+              <a:t>clasificaciones</a:t>
+            </a:r>
+            <a:r>
+              <a:rPr lang="en-GB" sz="2000" dirty="0">
+                <a:solidFill>
+                  <a:schemeClr val="lt1"/>
+                </a:solidFill>
+              </a:rPr>
+              <a:t>, etc.)</a:t>
+            </a:r>
+            <a:endParaRPr sz="2400" b="1" dirty="0">
               <a:solidFill>
                 <a:schemeClr val="lt1"/>
               </a:solidFill>
@@ -13722,10 +13935,22 @@
               <a:buNone/>
             </a:pPr>
             <a:r>
-              <a:rPr lang="en-GB" sz="2200" b="1"/>
-              <a:t>Aprendizaje no supervisado (unsupervised learning)</a:t>
-            </a:r>
-            <a:endParaRPr sz="2200" b="1"/>
+              <a:rPr lang="en-GB" sz="2200" b="1" dirty="0" err="1"/>
+              <a:t>Aprendizaje</a:t>
+            </a:r>
+            <a:r>
+              <a:rPr lang="en-GB" sz="2200" b="1" dirty="0"/>
+              <a:t> no </a:t>
+            </a:r>
+            <a:r>
+              <a:rPr lang="en-GB" sz="2200" b="1" dirty="0" err="1"/>
+              <a:t>supervisado</a:t>
+            </a:r>
+            <a:r>
+              <a:rPr lang="en-GB" sz="2200" b="1" dirty="0"/>
+              <a:t> (unsupervised learning)</a:t>
+            </a:r>
+            <a:endParaRPr sz="2200" b="1" dirty="0"/>
           </a:p>
           <a:p>
             <a:pPr marL="0" lvl="0" indent="0" algn="ctr" rtl="0">
@@ -13741,10 +13966,58 @@
               <a:buNone/>
             </a:pPr>
             <a:r>
-              <a:rPr lang="en-GB" sz="2000"/>
-              <a:t>No conocemos los posibles valores objetivo de Y que buscamos (por ejemplo, clustering).</a:t>
-            </a:r>
-            <a:endParaRPr sz="2000"/>
+              <a:rPr lang="en-GB" sz="1700" dirty="0"/>
+              <a:t>No </a:t>
+            </a:r>
+            <a:r>
+              <a:rPr lang="en-GB" sz="1700" dirty="0" err="1"/>
+              <a:t>conocemos</a:t>
+            </a:r>
+            <a:r>
+              <a:rPr lang="en-GB" sz="1700" dirty="0"/>
+              <a:t> los </a:t>
+            </a:r>
+            <a:r>
+              <a:rPr lang="en-GB" sz="1700" dirty="0" err="1"/>
+              <a:t>posibles</a:t>
+            </a:r>
+            <a:r>
+              <a:rPr lang="en-GB" sz="1700" dirty="0"/>
+              <a:t> </a:t>
+            </a:r>
+            <a:r>
+              <a:rPr lang="en-GB" sz="1700" dirty="0" err="1"/>
+              <a:t>valores</a:t>
+            </a:r>
+            <a:r>
+              <a:rPr lang="en-GB" sz="1700" dirty="0"/>
+              <a:t> </a:t>
+            </a:r>
+            <a:r>
+              <a:rPr lang="en-GB" sz="1700" dirty="0" err="1"/>
+              <a:t>objetivo</a:t>
+            </a:r>
+            <a:r>
+              <a:rPr lang="en-GB" sz="1700" dirty="0"/>
+              <a:t> de Y que </a:t>
+            </a:r>
+            <a:r>
+              <a:rPr lang="en-GB" sz="1700" dirty="0" err="1"/>
+              <a:t>buscamos</a:t>
+            </a:r>
+            <a:r>
+              <a:rPr lang="en-GB" sz="1700" dirty="0"/>
+              <a:t> (por </a:t>
+            </a:r>
+            <a:r>
+              <a:rPr lang="en-GB" sz="1700" dirty="0" err="1"/>
+              <a:t>ejemplo</a:t>
+            </a:r>
+            <a:r>
+              <a:rPr lang="en-GB" sz="1700" dirty="0"/>
+              <a:t>, clustering).</a:t>
+            </a:r>
+            <a:endParaRPr sz="1700" dirty="0"/>
           </a:p>
         </p:txBody>
       </p:sp>
@@ -13987,6 +14260,391 @@
               <a:buNone/>
             </a:pPr>
             <a:endParaRPr dirty="0"/>
+          </a:p>
+        </p:txBody>
+      </p:sp>
+      <p:sp>
+        <p:nvSpPr>
+          <p:cNvPr id="4" name="Google Shape;73;p15">
+            <a:extLst>
+              <a:ext uri="{FF2B5EF4-FFF2-40B4-BE49-F238E27FC236}">
+                <a16:creationId xmlns:a16="http://schemas.microsoft.com/office/drawing/2014/main" id="{2AA8CB28-E164-49C3-950B-D6A9DE0066A1}"/>
+              </a:ext>
+            </a:extLst>
+          </p:cNvPr>
+          <p:cNvSpPr txBox="1">
+            <a:spLocks/>
+          </p:cNvSpPr>
+          <p:nvPr/>
+        </p:nvSpPr>
+        <p:spPr>
+          <a:xfrm>
+            <a:off x="4771800" y="1152475"/>
+            <a:ext cx="4060500" cy="3416400"/>
+          </a:xfrm>
+          <a:prstGeom prst="rect">
+            <a:avLst/>
+          </a:prstGeom>
+          <a:noFill/>
+          <a:ln w="19050" cap="flat" cmpd="sng">
+            <a:solidFill>
+              <a:schemeClr val="dk2"/>
+            </a:solidFill>
+            <a:prstDash val="solid"/>
+            <a:round/>
+            <a:headEnd type="none" w="sm" len="sm"/>
+            <a:tailEnd type="none" w="sm" len="sm"/>
+          </a:ln>
+        </p:spPr>
+        <p:txBody>
+          <a:bodyPr spcFirstLastPara="1" wrap="square" lIns="91425" tIns="91425" rIns="91425" bIns="91425" anchor="t" anchorCtr="0">
+            <a:normAutofit/>
+          </a:bodyPr>
+          <a:lstStyle>
+            <a:defPPr marR="0" lvl="0" algn="l" rtl="0">
+              <a:lnSpc>
+                <a:spcPct val="100000"/>
+              </a:lnSpc>
+              <a:spcBef>
+                <a:spcPts val="0"/>
+              </a:spcBef>
+              <a:spcAft>
+                <a:spcPts val="0"/>
+              </a:spcAft>
+            </a:defPPr>
+            <a:lvl1pPr marL="457200" marR="0" lvl="0" indent="-342900" algn="l" rtl="0">
+              <a:lnSpc>
+                <a:spcPct val="115000"/>
+              </a:lnSpc>
+              <a:spcBef>
+                <a:spcPts val="0"/>
+              </a:spcBef>
+              <a:spcAft>
+                <a:spcPts val="0"/>
+              </a:spcAft>
+              <a:buClr>
+                <a:schemeClr val="accent3"/>
+              </a:buClr>
+              <a:buSzPts val="1800"/>
+              <a:buFont typeface="Proxima Nova"/>
+              <a:buChar char="●"/>
+              <a:defRPr sz="1800" b="0" i="0" u="none" strike="noStrike" cap="none">
+                <a:solidFill>
+                  <a:schemeClr val="accent3"/>
+                </a:solidFill>
+                <a:latin typeface="Proxima Nova"/>
+                <a:ea typeface="Proxima Nova"/>
+                <a:cs typeface="Proxima Nova"/>
+                <a:sym typeface="Proxima Nova"/>
+              </a:defRPr>
+            </a:lvl1pPr>
+            <a:lvl2pPr marL="914400" marR="0" lvl="1" indent="-317500" algn="l" rtl="0">
+              <a:lnSpc>
+                <a:spcPct val="115000"/>
+              </a:lnSpc>
+              <a:spcBef>
+                <a:spcPts val="0"/>
+              </a:spcBef>
+              <a:spcAft>
+                <a:spcPts val="0"/>
+              </a:spcAft>
+              <a:buClr>
+                <a:schemeClr val="accent3"/>
+              </a:buClr>
+              <a:buSzPts val="1400"/>
+              <a:buFont typeface="Proxima Nova"/>
+              <a:buChar char="○"/>
+              <a:defRPr sz="1400" b="0" i="0" u="none" strike="noStrike" cap="none">
+                <a:solidFill>
+                  <a:schemeClr val="accent3"/>
+                </a:solidFill>
+                <a:latin typeface="Proxima Nova"/>
+                <a:ea typeface="Proxima Nova"/>
+                <a:cs typeface="Proxima Nova"/>
+                <a:sym typeface="Proxima Nova"/>
+              </a:defRPr>
+            </a:lvl2pPr>
+            <a:lvl3pPr marL="1371600" marR="0" lvl="2" indent="-317500" algn="l" rtl="0">
+              <a:lnSpc>
+                <a:spcPct val="115000"/>
+              </a:lnSpc>
+              <a:spcBef>
+                <a:spcPts val="0"/>
+              </a:spcBef>
+              <a:spcAft>
+                <a:spcPts val="0"/>
+              </a:spcAft>
+              <a:buClr>
+                <a:schemeClr val="accent3"/>
+              </a:buClr>
+              <a:buSzPts val="1400"/>
+              <a:buFont typeface="Proxima Nova"/>
+              <a:buChar char="■"/>
+              <a:defRPr sz="1400" b="0" i="0" u="none" strike="noStrike" cap="none">
+                <a:solidFill>
+                  <a:schemeClr val="accent3"/>
+                </a:solidFill>
+                <a:latin typeface="Proxima Nova"/>
+                <a:ea typeface="Proxima Nova"/>
+                <a:cs typeface="Proxima Nova"/>
+                <a:sym typeface="Proxima Nova"/>
+              </a:defRPr>
+            </a:lvl3pPr>
+            <a:lvl4pPr marL="1828800" marR="0" lvl="3" indent="-317500" algn="l" rtl="0">
+              <a:lnSpc>
+                <a:spcPct val="115000"/>
+              </a:lnSpc>
+              <a:spcBef>
+                <a:spcPts val="0"/>
+              </a:spcBef>
+              <a:spcAft>
+                <a:spcPts val="0"/>
+              </a:spcAft>
+              <a:buClr>
+                <a:schemeClr val="accent3"/>
+              </a:buClr>
+              <a:buSzPts val="1400"/>
+              <a:buFont typeface="Proxima Nova"/>
+              <a:buChar char="●"/>
+              <a:defRPr sz="1400" b="0" i="0" u="none" strike="noStrike" cap="none">
+                <a:solidFill>
+                  <a:schemeClr val="accent3"/>
+                </a:solidFill>
+                <a:latin typeface="Proxima Nova"/>
+                <a:ea typeface="Proxima Nova"/>
+                <a:cs typeface="Proxima Nova"/>
+                <a:sym typeface="Proxima Nova"/>
+              </a:defRPr>
+            </a:lvl4pPr>
+            <a:lvl5pPr marL="2286000" marR="0" lvl="4" indent="-317500" algn="l" rtl="0">
+              <a:lnSpc>
+                <a:spcPct val="115000"/>
+              </a:lnSpc>
+              <a:spcBef>
+                <a:spcPts val="0"/>
+              </a:spcBef>
+              <a:spcAft>
+                <a:spcPts val="0"/>
+              </a:spcAft>
+              <a:buClr>
+                <a:schemeClr val="accent3"/>
+              </a:buClr>
+              <a:buSzPts val="1400"/>
+              <a:buFont typeface="Proxima Nova"/>
+              <a:buChar char="○"/>
+              <a:defRPr sz="1400" b="0" i="0" u="none" strike="noStrike" cap="none">
+                <a:solidFill>
+                  <a:schemeClr val="accent3"/>
+                </a:solidFill>
+                <a:latin typeface="Proxima Nova"/>
+                <a:ea typeface="Proxima Nova"/>
+                <a:cs typeface="Proxima Nova"/>
+                <a:sym typeface="Proxima Nova"/>
+              </a:defRPr>
+            </a:lvl5pPr>
+            <a:lvl6pPr marL="2743200" marR="0" lvl="5" indent="-317500" algn="l" rtl="0">
+              <a:lnSpc>
+                <a:spcPct val="115000"/>
+              </a:lnSpc>
+              <a:spcBef>
+                <a:spcPts val="0"/>
+              </a:spcBef>
+              <a:spcAft>
+                <a:spcPts val="0"/>
+              </a:spcAft>
+              <a:buClr>
+                <a:schemeClr val="accent3"/>
+              </a:buClr>
+              <a:buSzPts val="1400"/>
+              <a:buFont typeface="Proxima Nova"/>
+              <a:buChar char="■"/>
+              <a:defRPr sz="1400" b="0" i="0" u="none" strike="noStrike" cap="none">
+                <a:solidFill>
+                  <a:schemeClr val="accent3"/>
+                </a:solidFill>
+                <a:latin typeface="Proxima Nova"/>
+                <a:ea typeface="Proxima Nova"/>
+                <a:cs typeface="Proxima Nova"/>
+                <a:sym typeface="Proxima Nova"/>
+              </a:defRPr>
+            </a:lvl6pPr>
+            <a:lvl7pPr marL="3200400" marR="0" lvl="6" indent="-317500" algn="l" rtl="0">
+              <a:lnSpc>
+                <a:spcPct val="115000"/>
+              </a:lnSpc>
+              <a:spcBef>
+                <a:spcPts val="0"/>
+              </a:spcBef>
+              <a:spcAft>
+                <a:spcPts val="0"/>
+              </a:spcAft>
+              <a:buClr>
+                <a:schemeClr val="accent3"/>
+              </a:buClr>
+              <a:buSzPts val="1400"/>
+              <a:buFont typeface="Proxima Nova"/>
+              <a:buChar char="●"/>
+              <a:defRPr sz="1400" b="0" i="0" u="none" strike="noStrike" cap="none">
+                <a:solidFill>
+                  <a:schemeClr val="accent3"/>
+                </a:solidFill>
+                <a:latin typeface="Proxima Nova"/>
+                <a:ea typeface="Proxima Nova"/>
+                <a:cs typeface="Proxima Nova"/>
+                <a:sym typeface="Proxima Nova"/>
+              </a:defRPr>
+            </a:lvl7pPr>
+            <a:lvl8pPr marL="3657600" marR="0" lvl="7" indent="-317500" algn="l" rtl="0">
+              <a:lnSpc>
+                <a:spcPct val="115000"/>
+              </a:lnSpc>
+              <a:spcBef>
+                <a:spcPts val="0"/>
+              </a:spcBef>
+              <a:spcAft>
+                <a:spcPts val="0"/>
+              </a:spcAft>
+              <a:buClr>
+                <a:schemeClr val="accent3"/>
+              </a:buClr>
+              <a:buSzPts val="1400"/>
+              <a:buFont typeface="Proxima Nova"/>
+              <a:buChar char="○"/>
+              <a:defRPr sz="1400" b="0" i="0" u="none" strike="noStrike" cap="none">
+                <a:solidFill>
+                  <a:schemeClr val="accent3"/>
+                </a:solidFill>
+                <a:latin typeface="Proxima Nova"/>
+                <a:ea typeface="Proxima Nova"/>
+                <a:cs typeface="Proxima Nova"/>
+                <a:sym typeface="Proxima Nova"/>
+              </a:defRPr>
+            </a:lvl8pPr>
+            <a:lvl9pPr marL="4114800" marR="0" lvl="8" indent="-317500" algn="l" rtl="0">
+              <a:lnSpc>
+                <a:spcPct val="115000"/>
+              </a:lnSpc>
+              <a:spcBef>
+                <a:spcPts val="0"/>
+              </a:spcBef>
+              <a:spcAft>
+                <a:spcPts val="0"/>
+              </a:spcAft>
+              <a:buClr>
+                <a:schemeClr val="accent3"/>
+              </a:buClr>
+              <a:buSzPts val="1400"/>
+              <a:buFont typeface="Proxima Nova"/>
+              <a:buChar char="■"/>
+              <a:defRPr sz="1400" b="0" i="0" u="none" strike="noStrike" cap="none">
+                <a:solidFill>
+                  <a:schemeClr val="accent3"/>
+                </a:solidFill>
+                <a:latin typeface="Proxima Nova"/>
+                <a:ea typeface="Proxima Nova"/>
+                <a:cs typeface="Proxima Nova"/>
+                <a:sym typeface="Proxima Nova"/>
+              </a:defRPr>
+            </a:lvl9pPr>
+          </a:lstStyle>
+          <a:p>
+            <a:pPr marL="0" indent="0">
+              <a:buFont typeface="Proxima Nova"/>
+              <a:buNone/>
+            </a:pPr>
+            <a:r>
+              <a:rPr lang="es-MX" sz="2400" b="1" dirty="0">
+                <a:solidFill>
+                  <a:schemeClr val="bg2"/>
+                </a:solidFill>
+              </a:rPr>
+              <a:t>Santiago</a:t>
+            </a:r>
+          </a:p>
+          <a:p>
+            <a:pPr marL="0" indent="0">
+              <a:buFont typeface="Proxima Nova"/>
+              <a:buNone/>
+            </a:pPr>
+            <a:r>
+              <a:rPr lang="es-MX" sz="2400" b="1" dirty="0" err="1">
+                <a:solidFill>
+                  <a:schemeClr val="bg2"/>
+                </a:solidFill>
+              </a:rPr>
+              <a:t>Núnez</a:t>
+            </a:r>
+            <a:r>
+              <a:rPr lang="es-MX" sz="2400" b="1" dirty="0">
+                <a:solidFill>
+                  <a:schemeClr val="bg2"/>
+                </a:solidFill>
+              </a:rPr>
+              <a:t> </a:t>
+            </a:r>
+            <a:r>
+              <a:rPr lang="es-MX" sz="2400" b="1" dirty="0" err="1">
+                <a:solidFill>
+                  <a:schemeClr val="bg2"/>
+                </a:solidFill>
+              </a:rPr>
+              <a:t>Rimedio</a:t>
+            </a:r>
+            <a:endParaRPr lang="es-MX" sz="2400" b="1" dirty="0">
+              <a:solidFill>
+                <a:schemeClr val="bg2"/>
+              </a:solidFill>
+            </a:endParaRPr>
+          </a:p>
+          <a:p>
+            <a:pPr marL="114300" indent="0">
+              <a:buFont typeface="Proxima Nova"/>
+              <a:buNone/>
+            </a:pPr>
+            <a:endParaRPr lang="es-MX" sz="2400" dirty="0"/>
+          </a:p>
+          <a:p>
+            <a:pPr>
+              <a:buFont typeface="Wingdings" panose="05000000000000000000" pitchFamily="2" charset="2"/>
+              <a:buChar char="§"/>
+            </a:pPr>
+            <a:r>
+              <a:rPr lang="es-MX" dirty="0"/>
+              <a:t>Estudiante de Antropología Social UNSAM</a:t>
+            </a:r>
+          </a:p>
+          <a:p>
+            <a:pPr>
+              <a:buFont typeface="Wingdings" panose="05000000000000000000" pitchFamily="2" charset="2"/>
+              <a:buChar char="§"/>
+            </a:pPr>
+            <a:r>
+              <a:rPr lang="es-MX" dirty="0"/>
+              <a:t>Asistente de investigación </a:t>
+            </a:r>
+            <a:r>
+              <a:rPr lang="es-MX" dirty="0" err="1"/>
+              <a:t>factor</a:t>
+            </a:r>
+            <a:r>
+              <a:rPr lang="es-MX" sz="1200" dirty="0" err="1"/>
+              <a:t>~</a:t>
+            </a:r>
+            <a:r>
+              <a:rPr lang="es-MX" dirty="0" err="1"/>
+              <a:t>data</a:t>
+            </a:r>
+            <a:endParaRPr lang="es-MX" dirty="0"/>
+          </a:p>
+          <a:p>
+            <a:pPr marL="0" indent="0">
+              <a:spcAft>
+                <a:spcPts val="1200"/>
+              </a:spcAft>
+              <a:buFont typeface="Proxima Nova"/>
+              <a:buNone/>
+            </a:pPr>
+            <a:endParaRPr lang="es-MX" dirty="0"/>
           </a:p>
         </p:txBody>
       </p:sp>
@@ -14828,7 +15486,7 @@
         </p:blipFill>
         <p:spPr>
           <a:xfrm>
-            <a:off x="4862273" y="1878900"/>
+            <a:off x="4862273" y="1946355"/>
             <a:ext cx="3970025" cy="3084451"/>
           </a:xfrm>
           <a:prstGeom prst="rect">
@@ -14856,7 +15514,7 @@
         </p:blipFill>
         <p:spPr>
           <a:xfrm>
-            <a:off x="152400" y="1856224"/>
+            <a:off x="152400" y="1923679"/>
             <a:ext cx="3885219" cy="3084450"/>
           </a:xfrm>
           <a:prstGeom prst="rect">
@@ -14889,7 +15547,7 @@
         </p:spPr>
         <p:txBody>
           <a:bodyPr spcFirstLastPara="1" wrap="square" lIns="91425" tIns="91425" rIns="91425" bIns="91425" anchor="t" anchorCtr="0">
-            <a:normAutofit fontScale="92500"/>
+            <a:noAutofit/>
           </a:bodyPr>
           <a:lstStyle/>
           <a:p>
@@ -14906,35 +15564,35 @@
               <a:buNone/>
             </a:pPr>
             <a:r>
-              <a:rPr lang="en-GB" sz="1200" dirty="0"/>
+              <a:rPr lang="en-GB" dirty="0"/>
               <a:t>Los </a:t>
             </a:r>
             <a:r>
-              <a:rPr lang="en-GB" sz="1200" dirty="0" err="1"/>
+              <a:rPr lang="en-GB" dirty="0" err="1"/>
               <a:t>modelos</a:t>
             </a:r>
             <a:r>
-              <a:rPr lang="en-GB" sz="1200" dirty="0"/>
+              <a:rPr lang="en-GB" dirty="0"/>
               <a:t> </a:t>
             </a:r>
             <a:r>
-              <a:rPr lang="en-GB" sz="1200" b="1" dirty="0" err="1"/>
+              <a:rPr lang="en-GB" b="1" dirty="0" err="1"/>
               <a:t>paramétricos</a:t>
             </a:r>
             <a:r>
-              <a:rPr lang="en-GB" sz="1200" dirty="0"/>
+              <a:rPr lang="en-GB" dirty="0"/>
               <a:t> </a:t>
             </a:r>
             <a:r>
-              <a:rPr lang="en-GB" sz="1200" dirty="0" err="1"/>
+              <a:rPr lang="en-GB" dirty="0" err="1"/>
               <a:t>asumen</a:t>
             </a:r>
             <a:r>
-              <a:rPr lang="en-GB" sz="1200" dirty="0"/>
+              <a:rPr lang="en-GB" dirty="0"/>
               <a:t> la </a:t>
             </a:r>
             <a:r>
-              <a:rPr lang="en-GB" sz="1200" dirty="0">
+              <a:rPr lang="en-GB" dirty="0">
                 <a:highlight>
                   <a:schemeClr val="lt2"/>
                 </a:highlight>
@@ -14942,7 +15600,7 @@
               <a:t>forma de la </a:t>
             </a:r>
             <a:r>
-              <a:rPr lang="en-GB" sz="1200" dirty="0" err="1">
+              <a:rPr lang="en-GB" dirty="0" err="1">
                 <a:highlight>
                   <a:schemeClr val="lt2"/>
                 </a:highlight>
@@ -14950,31 +15608,31 @@
               <a:t>función</a:t>
             </a:r>
             <a:r>
-              <a:rPr lang="en-GB" sz="1200" dirty="0"/>
+              <a:rPr lang="en-GB" dirty="0"/>
               <a:t>. Los </a:t>
             </a:r>
             <a:r>
-              <a:rPr lang="en-GB" sz="1200" dirty="0" err="1"/>
+              <a:rPr lang="en-GB" dirty="0" err="1"/>
               <a:t>métodos</a:t>
             </a:r>
             <a:r>
-              <a:rPr lang="en-GB" sz="1200" dirty="0"/>
+              <a:rPr lang="en-GB" dirty="0"/>
               <a:t> </a:t>
             </a:r>
             <a:r>
-              <a:rPr lang="en-GB" sz="1200" b="1" dirty="0"/>
+              <a:rPr lang="en-GB" b="1" dirty="0"/>
               <a:t>no </a:t>
             </a:r>
             <a:r>
-              <a:rPr lang="en-GB" sz="1200" b="1" dirty="0" err="1"/>
+              <a:rPr lang="en-GB" b="1" dirty="0" err="1"/>
               <a:t>paramétricos</a:t>
             </a:r>
             <a:r>
-              <a:rPr lang="en-GB" sz="1200" dirty="0"/>
+              <a:rPr lang="en-GB" dirty="0"/>
               <a:t>, </a:t>
             </a:r>
             <a:r>
-              <a:rPr lang="en-GB" sz="1200" dirty="0">
+              <a:rPr lang="en-GB" dirty="0">
                 <a:highlight>
                   <a:schemeClr val="lt2"/>
                 </a:highlight>
@@ -14982,58 +15640,58 @@
               <a:t>no</a:t>
             </a:r>
             <a:r>
-              <a:rPr lang="en-GB" sz="1200" dirty="0"/>
+              <a:rPr lang="en-GB" dirty="0"/>
               <a:t>, y </a:t>
             </a:r>
             <a:r>
-              <a:rPr lang="en-GB" sz="1200" dirty="0" err="1"/>
+              <a:rPr lang="en-GB" dirty="0" err="1"/>
               <a:t>pueden</a:t>
             </a:r>
             <a:r>
-              <a:rPr lang="en-GB" sz="1200" dirty="0"/>
+              <a:rPr lang="en-GB" dirty="0"/>
               <a:t> </a:t>
             </a:r>
             <a:r>
-              <a:rPr lang="en-GB" sz="1200" dirty="0" err="1"/>
+              <a:rPr lang="en-GB" dirty="0" err="1"/>
               <a:t>tener</a:t>
             </a:r>
             <a:r>
-              <a:rPr lang="en-GB" sz="1200" dirty="0"/>
+              <a:rPr lang="en-GB" dirty="0"/>
               <a:t> </a:t>
             </a:r>
             <a:r>
-              <a:rPr lang="en-GB" sz="1200" dirty="0" err="1"/>
+              <a:rPr lang="en-GB" dirty="0" err="1"/>
               <a:t>diferentes</a:t>
             </a:r>
             <a:r>
-              <a:rPr lang="en-GB" sz="1200" dirty="0"/>
+              <a:rPr lang="en-GB" dirty="0"/>
               <a:t> </a:t>
             </a:r>
             <a:r>
-              <a:rPr lang="en-GB" sz="1200" dirty="0" err="1"/>
+              <a:rPr lang="en-GB" dirty="0" err="1"/>
               <a:t>formas</a:t>
             </a:r>
             <a:r>
-              <a:rPr lang="en-GB" sz="1200" dirty="0"/>
+              <a:rPr lang="en-GB" dirty="0"/>
               <a:t> para </a:t>
             </a:r>
             <a:r>
-              <a:rPr lang="en-GB" sz="1200" dirty="0" err="1"/>
+              <a:rPr lang="en-GB" dirty="0" err="1"/>
               <a:t>diferentes</a:t>
             </a:r>
             <a:r>
-              <a:rPr lang="en-GB" sz="1200" dirty="0"/>
+              <a:rPr lang="en-GB" dirty="0"/>
               <a:t> </a:t>
             </a:r>
             <a:r>
-              <a:rPr lang="en-GB" sz="1200" dirty="0" err="1"/>
+              <a:rPr lang="en-GB" dirty="0" err="1"/>
               <a:t>valores</a:t>
             </a:r>
             <a:r>
-              <a:rPr lang="en-GB" sz="1200" dirty="0"/>
+              <a:rPr lang="en-GB" dirty="0"/>
               <a:t> de X.</a:t>
             </a:r>
-            <a:endParaRPr sz="1200" dirty="0"/>
+            <a:endParaRPr dirty="0"/>
           </a:p>
         </p:txBody>
       </p:sp>
@@ -15141,7 +15799,7 @@
         <p:spPr>
           <a:xfrm>
             <a:off x="311699" y="1152475"/>
-            <a:ext cx="6871615" cy="3416400"/>
+            <a:ext cx="8607449" cy="3416400"/>
           </a:xfrm>
           <a:prstGeom prst="rect">
             <a:avLst/>
@@ -15149,7 +15807,7 @@
         </p:spPr>
         <p:txBody>
           <a:bodyPr spcFirstLastPara="1" wrap="square" lIns="91425" tIns="91425" rIns="91425" bIns="91425" anchor="t" anchorCtr="0">
-            <a:normAutofit/>
+            <a:noAutofit/>
           </a:bodyPr>
           <a:lstStyle/>
           <a:p>
@@ -15172,11 +15830,11 @@
               <a:buAutoNum type="arabicPeriod"/>
             </a:pPr>
             <a:r>
-              <a:rPr lang="es-AR" dirty="0"/>
-              <a:t>Asumimos la forma funcional de </a:t>
-            </a:r>
-            <a:r>
-              <a:rPr lang="es-AR" i="1" dirty="0">
+              <a:rPr lang="es-AR" sz="1800" dirty="0"/>
+              <a:t>Suponemos que </a:t>
+            </a:r>
+            <a:r>
+              <a:rPr lang="es-AR" sz="1800" i="1" dirty="0">
                 <a:solidFill>
                   <a:schemeClr val="bg2"/>
                 </a:solidFill>
@@ -15184,8 +15842,8 @@
               <a:t>f</a:t>
             </a:r>
             <a:r>
-              <a:rPr lang="es-AR" dirty="0"/>
-              <a:t>.</a:t>
+              <a:rPr lang="es-AR" sz="1800" dirty="0"/>
+              <a:t> tiene cierta forma funcional.</a:t>
             </a:r>
           </a:p>
           <a:p>
@@ -15194,7 +15852,7 @@
               <a:buAutoNum type="arabicPeriod"/>
             </a:pPr>
             <a:r>
-              <a:rPr lang="es-AR" dirty="0"/>
+              <a:rPr lang="es-AR" sz="1800" dirty="0"/>
               <a:t>Ajustamos el modelo.</a:t>
             </a:r>
           </a:p>
@@ -15221,20 +15879,8 @@
               <a:buChar char="§"/>
             </a:pPr>
             <a:r>
-              <a:rPr lang="es-AR" dirty="0"/>
-              <a:t>Asumir una forma funcional para </a:t>
-            </a:r>
-            <a:r>
-              <a:rPr lang="es-AR" i="1" dirty="0">
-                <a:solidFill>
-                  <a:schemeClr val="bg2"/>
-                </a:solidFill>
-              </a:rPr>
-              <a:t>f</a:t>
-            </a:r>
-            <a:r>
-              <a:rPr lang="es-AR" dirty="0"/>
-              <a:t> simplifica la estimación de los parámetros.</a:t>
+              <a:rPr lang="es-AR" sz="1800" dirty="0"/>
+              <a:t>Suponer una forma funcional simplifica la estimación de los parámetros.</a:t>
             </a:r>
           </a:p>
           <a:p>
@@ -15260,11 +15906,11 @@
               <a:buChar char="§"/>
             </a:pPr>
             <a:r>
-              <a:rPr lang="es-AR" dirty="0"/>
-              <a:t>La forma funcional que elegimos difícilmente se ajusta a la forma real de </a:t>
-            </a:r>
-            <a:r>
-              <a:rPr lang="es-AR" i="1" dirty="0">
+              <a:rPr lang="es-AR" sz="1800" dirty="0"/>
+              <a:t>La forma funcional que elegimos difícilmente coincida con la forma real de </a:t>
+            </a:r>
+            <a:r>
+              <a:rPr lang="es-AR" sz="1800" i="1" dirty="0">
                 <a:solidFill>
                   <a:schemeClr val="bg2"/>
                 </a:solidFill>
@@ -15272,10 +15918,10 @@
               <a:t>f</a:t>
             </a:r>
             <a:r>
-              <a:rPr lang="es-AR" dirty="0"/>
+              <a:rPr lang="es-AR" sz="1800" dirty="0"/>
               <a:t> .</a:t>
             </a:r>
-            <a:endParaRPr lang="es-AR" i="1" dirty="0">
+            <a:endParaRPr lang="es-AR" sz="1800" i="1" dirty="0">
               <a:solidFill>
                 <a:schemeClr val="bg2"/>
               </a:solidFill>
@@ -15457,7 +16103,7 @@
         <p:spPr>
           <a:xfrm>
             <a:off x="311699" y="1152475"/>
-            <a:ext cx="6871615" cy="3416400"/>
+            <a:ext cx="7955376" cy="3416400"/>
           </a:xfrm>
           <a:prstGeom prst="rect">
             <a:avLst/>
@@ -15484,19 +16130,19 @@
               <a:buChar char="§"/>
             </a:pPr>
             <a:r>
-              <a:rPr lang="es-AR" dirty="0"/>
-              <a:t>Al no asumir una forma funcional para f, tienen el potencial de ajustarse con </a:t>
-            </a:r>
-            <a:r>
-              <a:rPr lang="es-AR" b="1" dirty="0"/>
+              <a:rPr lang="es-AR" sz="1800" dirty="0"/>
+              <a:t>Al no suponer una forma funcional para f, tienen el potencial de ajustarse con </a:t>
+            </a:r>
+            <a:r>
+              <a:rPr lang="es-AR" sz="1800" b="1" dirty="0"/>
               <a:t>precisión</a:t>
             </a:r>
             <a:r>
-              <a:rPr lang="es-AR" dirty="0"/>
+              <a:rPr lang="es-AR" sz="1800" dirty="0"/>
               <a:t> a una gama más amplia de formas posibles para </a:t>
             </a:r>
             <a:r>
-              <a:rPr lang="es-AR" i="1" dirty="0">
+              <a:rPr lang="es-AR" sz="1800" i="1" dirty="0">
                 <a:solidFill>
                   <a:schemeClr val="bg2"/>
                 </a:solidFill>
@@ -15504,7 +16150,7 @@
               <a:t>f</a:t>
             </a:r>
             <a:r>
-              <a:rPr lang="es-AR" dirty="0"/>
+              <a:rPr lang="es-AR" sz="1800" dirty="0"/>
               <a:t>.</a:t>
             </a:r>
           </a:p>
@@ -15531,15 +16177,15 @@
               <a:buChar char="§"/>
             </a:pPr>
             <a:r>
-              <a:rPr lang="es-AR" dirty="0"/>
+              <a:rPr lang="es-AR" sz="1800" dirty="0"/>
               <a:t>Necesitamos una </a:t>
             </a:r>
             <a:r>
-              <a:rPr lang="es-AR" b="1" dirty="0"/>
+              <a:rPr lang="es-AR" sz="1800" b="1" dirty="0"/>
               <a:t>cantidad de observaciones </a:t>
             </a:r>
             <a:r>
-              <a:rPr lang="es-AR" dirty="0"/>
+              <a:rPr lang="es-AR" sz="1800" dirty="0"/>
               <a:t>mayor que en el caso de los modelos paramétricos.</a:t>
             </a:r>
           </a:p>
@@ -15549,15 +16195,15 @@
               <a:buChar char="§"/>
             </a:pPr>
             <a:r>
-              <a:rPr lang="es-AR" dirty="0"/>
+              <a:rPr lang="es-AR" sz="1800" dirty="0"/>
               <a:t>Peligro de </a:t>
             </a:r>
             <a:r>
-              <a:rPr lang="es-AR" b="1" dirty="0" err="1"/>
+              <a:rPr lang="es-AR" sz="1800" b="1" dirty="0" err="1"/>
               <a:t>overfitting</a:t>
             </a:r>
             <a:r>
-              <a:rPr lang="es-AR" dirty="0"/>
+              <a:rPr lang="es-AR" sz="1800" dirty="0"/>
               <a:t>.</a:t>
             </a:r>
           </a:p>
@@ -16083,7 +16729,7 @@
             <a:endParaRPr sz="2400" b="1" dirty="0"/>
           </a:p>
           <a:p>
-            <a:pPr marL="457200" lvl="0" indent="-381000" algn="ctr" rtl="0">
+            <a:pPr lvl="0" indent="-187325" algn="ctr" rtl="0">
               <a:lnSpc>
                 <a:spcPct val="150000"/>
               </a:lnSpc>
@@ -16093,7 +16739,7 @@
               <a:spcAft>
                 <a:spcPts val="0"/>
               </a:spcAft>
-              <a:buSzPts val="2400"/>
+              <a:buSzPct val="50000"/>
               <a:buChar char="●"/>
             </a:pPr>
             <a:r>
@@ -16139,7 +16785,7 @@
             <a:endParaRPr sz="2000" dirty="0"/>
           </a:p>
           <a:p>
-            <a:pPr marL="457200" lvl="0" indent="-355600" algn="ctr" rtl="0">
+            <a:pPr lvl="0" indent="-187325" algn="ctr" rtl="0">
               <a:lnSpc>
                 <a:spcPct val="150000"/>
               </a:lnSpc>
@@ -16149,7 +16795,7 @@
               <a:spcAft>
                 <a:spcPts val="0"/>
               </a:spcAft>
-              <a:buSzPts val="2000"/>
+              <a:buSzPct val="50000"/>
               <a:buChar char="●"/>
             </a:pPr>
             <a:r>
@@ -17672,8 +18318,8 @@
         </p:nvSpPr>
         <p:spPr>
           <a:xfrm>
-            <a:off x="2838893" y="2456121"/>
-            <a:ext cx="6015945" cy="2179673"/>
+            <a:off x="2838893" y="2305060"/>
+            <a:ext cx="6015945" cy="2732113"/>
           </a:xfrm>
           <a:prstGeom prst="rect">
             <a:avLst/>
@@ -17936,15 +18582,26 @@
           </a:lstStyle>
           <a:p>
             <a:pPr marL="285750" indent="-285750">
+              <a:spcBef>
+                <a:spcPts val="600"/>
+              </a:spcBef>
+              <a:buClr>
+                <a:schemeClr val="accent3"/>
+              </a:buClr>
+              <a:buSzPct val="100000"/>
               <a:buFont typeface="Arial" panose="020B0604020202020204" pitchFamily="34" charset="0"/>
               <a:buChar char="•"/>
             </a:pPr>
             <a:r>
-              <a:rPr lang="es-MX" sz="1600" dirty="0"/>
+              <a:rPr lang="es-MX" sz="1800" dirty="0">
+                <a:solidFill>
+                  <a:schemeClr val="accent3"/>
+                </a:solidFill>
+              </a:rPr>
               <a:t>El problema está centralmente ligado a la </a:t>
             </a:r>
             <a:r>
-              <a:rPr lang="es-MX" sz="1600" b="1" dirty="0">
+              <a:rPr lang="es-MX" sz="1800" b="1" dirty="0">
                 <a:solidFill>
                   <a:schemeClr val="accent3"/>
                 </a:solidFill>
@@ -17957,21 +18614,43 @@
           </a:p>
           <a:p>
             <a:pPr marL="285750" indent="-285750">
+              <a:spcBef>
+                <a:spcPts val="600"/>
+              </a:spcBef>
+              <a:buClr>
+                <a:schemeClr val="accent3"/>
+              </a:buClr>
+              <a:buSzPct val="100000"/>
               <a:buFont typeface="Arial" panose="020B0604020202020204" pitchFamily="34" charset="0"/>
               <a:buChar char="•"/>
             </a:pPr>
             <a:r>
-              <a:rPr lang="es-MX" sz="1600" dirty="0"/>
+              <a:rPr lang="es-MX" sz="1800" dirty="0">
+                <a:solidFill>
+                  <a:schemeClr val="accent3"/>
+                </a:solidFill>
+              </a:rPr>
               <a:t>Nuestro interés no es que el modelo tenga buenas métricas en los datos con los que se entrenó, sino que sea bueno para predecir datos nuevos</a:t>
             </a:r>
           </a:p>
           <a:p>
             <a:pPr marL="285750" indent="-285750">
+              <a:spcBef>
+                <a:spcPts val="600"/>
+              </a:spcBef>
+              <a:buClr>
+                <a:schemeClr val="accent3"/>
+              </a:buClr>
+              <a:buSzPct val="100000"/>
               <a:buFont typeface="Arial" panose="020B0604020202020204" pitchFamily="34" charset="0"/>
               <a:buChar char="•"/>
             </a:pPr>
             <a:r>
-              <a:rPr lang="es-MX" sz="1600" dirty="0"/>
+              <a:rPr lang="es-MX" sz="1800" dirty="0">
+                <a:solidFill>
+                  <a:schemeClr val="accent3"/>
+                </a:solidFill>
+              </a:rPr>
               <a:t>Overfitting se puede producir por varias causas. Ej: polinomios de muy alto grado, utilización de una gran cantidad de variables, valores de parámetros que otorgan mucha flexibilidad</a:t>
             </a:r>
           </a:p>
@@ -18433,8 +19112,8 @@
         </p:nvSpPr>
         <p:spPr>
           <a:xfrm>
-            <a:off x="5007330" y="825293"/>
-            <a:ext cx="3913386" cy="3874298"/>
+            <a:off x="5007329" y="679025"/>
+            <a:ext cx="3994263" cy="4357669"/>
           </a:xfrm>
           <a:prstGeom prst="rect">
             <a:avLst/>
@@ -18446,7 +19125,7 @@
         </p:spPr>
         <p:txBody>
           <a:bodyPr spcFirstLastPara="1" wrap="square" lIns="91425" tIns="91425" rIns="91425" bIns="91425" anchor="t" anchorCtr="0">
-            <a:normAutofit fontScale="90000" lnSpcReduction="20000"/>
+            <a:normAutofit fontScale="90000" lnSpcReduction="10000"/>
           </a:bodyPr>
           <a:lstStyle>
             <a:defPPr marR="0" lvl="0" algn="l" rtl="0">
@@ -18697,48 +19376,123 @@
           </a:lstStyle>
           <a:p>
             <a:pPr marL="285750" indent="-285750">
+              <a:buClr>
+                <a:schemeClr val="accent3"/>
+              </a:buClr>
+              <a:buSzPct val="100000"/>
               <a:buFont typeface="Arial" panose="020B0604020202020204" pitchFamily="34" charset="0"/>
               <a:buChar char="•"/>
             </a:pPr>
             <a:r>
-              <a:rPr lang="es-MX" sz="1600" dirty="0"/>
-              <a:t>Técnica para lidiar con el overfitting: Se evalua la calidad de las predicciones sobre datos no utilizados para entrenar el modelo. ¿En qué consiste?</a:t>
+              <a:rPr lang="es-MX" sz="1800" dirty="0">
+                <a:solidFill>
+                  <a:schemeClr val="accent3"/>
+                </a:solidFill>
+              </a:rPr>
+              <a:t>Técnica para lidiar con el overfitting: Se evalua la calidad de las predicciones sobre </a:t>
+            </a:r>
+            <a:r>
+              <a:rPr lang="es-MX" sz="1800" dirty="0">
+                <a:solidFill>
+                  <a:schemeClr val="accent3"/>
+                </a:solidFill>
+                <a:highlight>
+                  <a:schemeClr val="lt2"/>
+                </a:highlight>
+              </a:rPr>
+              <a:t>datos no utilizados para entrenar el modelo</a:t>
+            </a:r>
+            <a:r>
+              <a:rPr lang="es-MX" sz="1800" dirty="0">
+                <a:solidFill>
+                  <a:schemeClr val="accent3"/>
+                </a:solidFill>
+              </a:rPr>
+              <a:t> </a:t>
             </a:r>
           </a:p>
           <a:p>
             <a:pPr marL="285750" indent="-285750">
+              <a:buClr>
+                <a:schemeClr val="accent3"/>
+              </a:buClr>
+              <a:buSzPct val="100000"/>
               <a:buFont typeface="Arial" panose="020B0604020202020204" pitchFamily="34" charset="0"/>
               <a:buChar char="•"/>
             </a:pPr>
-            <a:endParaRPr lang="es-MX" sz="1600" dirty="0"/>
+            <a:endParaRPr lang="es-MX" sz="1800" dirty="0">
+              <a:solidFill>
+                <a:schemeClr val="accent3"/>
+              </a:solidFill>
+            </a:endParaRPr>
           </a:p>
           <a:p>
             <a:pPr marL="285750" indent="-285750">
+              <a:buClr>
+                <a:schemeClr val="accent3"/>
+              </a:buClr>
+              <a:buSzPct val="100000"/>
               <a:buFont typeface="Arial" panose="020B0604020202020204" pitchFamily="34" charset="0"/>
               <a:buChar char="•"/>
             </a:pPr>
             <a:r>
-              <a:rPr lang="es-MX" sz="1600" dirty="0"/>
-              <a:t>Se divide el dataset (usualmente 80% - 20%) utilizando una parte para entrenamiento del modelo y otra para testeo</a:t>
+              <a:rPr lang="es-MX" sz="1800" dirty="0">
+                <a:solidFill>
+                  <a:schemeClr val="accent3"/>
+                </a:solidFill>
+              </a:rPr>
+              <a:t>Se divide el </a:t>
+            </a:r>
+            <a:r>
+              <a:rPr lang="es-MX" sz="1800" dirty="0" err="1">
+                <a:solidFill>
+                  <a:schemeClr val="accent3"/>
+                </a:solidFill>
+              </a:rPr>
+              <a:t>dataset</a:t>
+            </a:r>
+            <a:r>
+              <a:rPr lang="es-MX" sz="1800" dirty="0">
+                <a:solidFill>
+                  <a:schemeClr val="accent3"/>
+                </a:solidFill>
+              </a:rPr>
+              <a:t> utilizando una parte para entrenamiento del modelo y otra para testeo</a:t>
             </a:r>
           </a:p>
           <a:p>
             <a:pPr marL="285750" indent="-285750">
+              <a:buClr>
+                <a:schemeClr val="accent3"/>
+              </a:buClr>
+              <a:buSzPct val="100000"/>
               <a:buFont typeface="Arial" panose="020B0604020202020204" pitchFamily="34" charset="0"/>
               <a:buChar char="•"/>
             </a:pPr>
-            <a:endParaRPr lang="es-MX" sz="1600" dirty="0"/>
+            <a:endParaRPr lang="es-MX" sz="1800" dirty="0">
+              <a:solidFill>
+                <a:schemeClr val="accent3"/>
+              </a:solidFill>
+            </a:endParaRPr>
           </a:p>
           <a:p>
             <a:pPr marL="285750" indent="-285750">
+              <a:buClr>
+                <a:schemeClr val="accent3"/>
+              </a:buClr>
+              <a:buSzPct val="100000"/>
               <a:buFont typeface="Arial" panose="020B0604020202020204" pitchFamily="34" charset="0"/>
               <a:buChar char="•"/>
             </a:pPr>
             <a:r>
-              <a:rPr lang="es-MX" sz="1600" dirty="0"/>
+              <a:rPr lang="es-MX" sz="1800" dirty="0">
+                <a:solidFill>
+                  <a:schemeClr val="accent3"/>
+                </a:solidFill>
+              </a:rPr>
               <a:t>Se estiman las métricas de calidad de las predicciones en la base de testeo (es decir sobre casos que no fueron utilizados para entrenar el modelo)</a:t>
             </a:r>
-            <a:endParaRPr lang="es-MX" sz="1600" b="1" dirty="0">
+            <a:endParaRPr lang="es-MX" sz="1800" b="1" dirty="0">
               <a:solidFill>
                 <a:schemeClr val="accent3"/>
               </a:solidFill>
@@ -18749,47 +19503,89 @@
           </a:p>
           <a:p>
             <a:pPr marL="285750" indent="-285750">
+              <a:buClr>
+                <a:schemeClr val="accent3"/>
+              </a:buClr>
+              <a:buSzPct val="100000"/>
               <a:buFont typeface="Arial" panose="020B0604020202020204" pitchFamily="34" charset="0"/>
               <a:buChar char="•"/>
             </a:pPr>
-            <a:endParaRPr lang="es-MX" sz="1600" dirty="0"/>
+            <a:endParaRPr lang="es-MX" sz="1800" dirty="0">
+              <a:solidFill>
+                <a:schemeClr val="accent3"/>
+              </a:solidFill>
+            </a:endParaRPr>
           </a:p>
           <a:p>
             <a:pPr marL="285750" indent="-285750">
+              <a:buClr>
+                <a:schemeClr val="accent3"/>
+              </a:buClr>
+              <a:buSzPct val="100000"/>
               <a:buFont typeface="Arial" panose="020B0604020202020204" pitchFamily="34" charset="0"/>
               <a:buChar char="•"/>
             </a:pPr>
             <a:r>
-              <a:rPr lang="es-MX" sz="1600" dirty="0"/>
-              <a:t>(Adelanto de temas a ver desde clase 5): En modelos que cuentan con </a:t>
-            </a:r>
-            <a:r>
-              <a:rPr lang="es-MX" sz="1600" b="1" i="1" dirty="0" err="1"/>
+              <a:rPr lang="es-MX" sz="1800" dirty="0">
+                <a:solidFill>
+                  <a:schemeClr val="accent3"/>
+                </a:solidFill>
+              </a:rPr>
+              <a:t>Para elegir modelos o </a:t>
+            </a:r>
+            <a:r>
+              <a:rPr lang="es-MX" sz="1800" b="1" dirty="0" err="1">
+                <a:solidFill>
+                  <a:schemeClr val="accent3"/>
+                </a:solidFill>
+                <a:highlight>
+                  <a:schemeClr val="lt2"/>
+                </a:highlight>
+              </a:rPr>
               <a:t>hiperparámetros</a:t>
             </a:r>
             <a:r>
-              <a:rPr lang="es-MX" sz="1600" b="1" i="1" dirty="0"/>
+              <a:rPr lang="es-MX" sz="1800" b="1" i="1" dirty="0">
+                <a:solidFill>
+                  <a:schemeClr val="accent3"/>
+                </a:solidFill>
+              </a:rPr>
               <a:t>,</a:t>
             </a:r>
             <a:r>
-              <a:rPr lang="es-MX" sz="1600" dirty="0"/>
-              <a:t> antes de pasar a evaluar en el </a:t>
-            </a:r>
-            <a:r>
-              <a:rPr lang="es-MX" sz="1600" i="1" dirty="0"/>
+              <a:rPr lang="es-MX" sz="1800" dirty="0">
+                <a:solidFill>
+                  <a:schemeClr val="accent3"/>
+                </a:solidFill>
+              </a:rPr>
+              <a:t> antes de evaluar en el </a:t>
+            </a:r>
+            <a:r>
+              <a:rPr lang="es-MX" sz="1800" i="1" dirty="0">
+                <a:solidFill>
+                  <a:schemeClr val="accent3"/>
+                </a:solidFill>
+              </a:rPr>
               <a:t>test </a:t>
             </a:r>
             <a:r>
-              <a:rPr lang="es-MX" sz="1600" dirty="0"/>
-              <a:t>set se utilizan técnicas de validación para encontrar los valores óptimos de los </a:t>
-            </a:r>
-            <a:r>
-              <a:rPr lang="es-MX" sz="1600" dirty="0" err="1"/>
-              <a:t>hiperparámetros</a:t>
-            </a:r>
-            <a:r>
-              <a:rPr lang="es-MX" sz="1600" dirty="0"/>
-              <a:t>.</a:t>
+              <a:rPr lang="es-MX" sz="1800" dirty="0">
+                <a:solidFill>
+                  <a:schemeClr val="accent3"/>
+                </a:solidFill>
+              </a:rPr>
+              <a:t>set se utilizan técnicas de </a:t>
+            </a:r>
+            <a:r>
+              <a:rPr lang="es-MX" sz="1800" dirty="0">
+                <a:solidFill>
+                  <a:schemeClr val="accent3"/>
+                </a:solidFill>
+                <a:highlight>
+                  <a:schemeClr val="lt2"/>
+                </a:highlight>
+              </a:rPr>
+              <a:t>validación</a:t>
             </a:r>
           </a:p>
         </p:txBody>
@@ -19009,8 +19805,8 @@
           </a:p>
         </p:txBody>
       </p:sp>
-      <mc:AlternateContent xmlns:mc="http://schemas.openxmlformats.org/markup-compatibility/2006" xmlns:a14="http://schemas.microsoft.com/office/drawing/2010/main">
-        <mc:Choice Requires="a14">
+      <mc:AlternateContent xmlns:mc="http://schemas.openxmlformats.org/markup-compatibility/2006">
+        <mc:Choice xmlns:a14="http://schemas.microsoft.com/office/drawing/2010/main" Requires="a14">
           <p:sp>
             <p:nvSpPr>
               <p:cNvPr id="3" name="Marcador de texto 2">
@@ -19034,18 +19830,20 @@
               </a:xfrm>
             </p:spPr>
             <p:txBody>
-              <a:bodyPr/>
+              <a:bodyPr>
+                <a:normAutofit/>
+              </a:bodyPr>
               <a:lstStyle/>
               <a:p>
-                <a:pPr marL="114300" indent="0" algn="ctr">
+                <a:pPr marL="114300" indent="0">
                   <a:buNone/>
                 </a:pPr>
                 <a:r>
-                  <a:rPr lang="es-AR" dirty="0"/>
+                  <a:rPr lang="es-AR" sz="2000" dirty="0"/>
                   <a:t>Una primera medida para </a:t>
                 </a:r>
                 <a:r>
-                  <a:rPr lang="es-AR" sz="1700" b="1" dirty="0">
+                  <a:rPr lang="es-AR" sz="2000" b="1" dirty="0">
                     <a:highlight>
                       <a:schemeClr val="lt2"/>
                     </a:highlight>
@@ -19053,7 +19851,7 @@
                   <a:t>evaluar nuestro modelo</a:t>
                 </a:r>
                 <a:r>
-                  <a:rPr lang="es-AR" dirty="0"/>
+                  <a:rPr lang="es-AR" sz="2000" dirty="0"/>
                   <a:t>:</a:t>
                 </a:r>
               </a:p>
@@ -19061,7 +19859,7 @@
                 <a:pPr marL="114300" indent="0" algn="ctr">
                   <a:buNone/>
                 </a:pPr>
-                <a:endParaRPr lang="es-AR" dirty="0"/>
+                <a:endParaRPr lang="es-AR" sz="2000" dirty="0"/>
               </a:p>
               <a:p>
                 <a:pPr marL="114300" indent="0" algn="ctr">
@@ -19074,13 +19872,13 @@
                     </m:oMathParaPr>
                     <m:oMath xmlns:m="http://schemas.openxmlformats.org/officeDocument/2006/math">
                       <m:r>
-                        <a:rPr lang="es-AR" b="0" i="1" smtClean="0">
+                        <a:rPr lang="es-AR" sz="2000" b="0" i="1" smtClean="0">
                           <a:latin typeface="Cambria Math" panose="02040503050406030204" pitchFamily="18" charset="0"/>
                         </a:rPr>
                         <m:t>𝑀𝑆𝐸</m:t>
                       </m:r>
                       <m:r>
-                        <a:rPr lang="es-AR" b="0" i="1" smtClean="0">
+                        <a:rPr lang="es-AR" sz="2000" b="0" i="1" smtClean="0">
                           <a:latin typeface="Cambria Math" panose="02040503050406030204" pitchFamily="18" charset="0"/>
                         </a:rPr>
                         <m:t>= </m:t>
@@ -19088,14 +19886,14 @@
                       <m:f>
                         <m:fPr>
                           <m:ctrlPr>
-                            <a:rPr lang="es-AR" b="0" i="1" smtClean="0">
+                            <a:rPr lang="es-AR" sz="2000" b="0" i="1" smtClean="0">
                               <a:latin typeface="Cambria Math" panose="02040503050406030204" pitchFamily="18" charset="0"/>
                             </a:rPr>
                           </m:ctrlPr>
                         </m:fPr>
                         <m:num>
                           <m:r>
-                            <a:rPr lang="es-AR" b="0" i="1" smtClean="0">
+                            <a:rPr lang="es-AR" sz="2000" b="0" i="1" smtClean="0">
                               <a:latin typeface="Cambria Math" panose="02040503050406030204" pitchFamily="18" charset="0"/>
                             </a:rPr>
                             <m:t>1</m:t>
@@ -19103,7 +19901,7 @@
                         </m:num>
                         <m:den>
                           <m:r>
-                            <a:rPr lang="es-AR" b="0" i="1" smtClean="0">
+                            <a:rPr lang="es-AR" sz="2000" b="0" i="1" smtClean="0">
                               <a:latin typeface="Cambria Math" panose="02040503050406030204" pitchFamily="18" charset="0"/>
                             </a:rPr>
                             <m:t>𝑛</m:t>
@@ -19114,7 +19912,7 @@
                         <m:naryPr>
                           <m:chr m:val="∑"/>
                           <m:ctrlPr>
-                            <a:rPr lang="es-AR" b="0" i="1" smtClean="0">
+                            <a:rPr lang="es-AR" sz="2000" b="0" i="1" smtClean="0">
                               <a:latin typeface="Cambria Math" panose="02040503050406030204" pitchFamily="18" charset="0"/>
                             </a:rPr>
                           </m:ctrlPr>
@@ -19124,13 +19922,13 @@
                             <m:rPr>
                               <m:brk m:alnAt="23"/>
                             </m:rPr>
-                            <a:rPr lang="es-AR" b="0" i="1" smtClean="0">
+                            <a:rPr lang="es-AR" sz="2000" b="0" i="1" smtClean="0">
                               <a:latin typeface="Cambria Math" panose="02040503050406030204" pitchFamily="18" charset="0"/>
                             </a:rPr>
                             <m:t>𝑖</m:t>
                           </m:r>
                           <m:r>
-                            <a:rPr lang="es-AR" b="0" i="1" smtClean="0">
+                            <a:rPr lang="es-AR" sz="2000" b="0" i="1" smtClean="0">
                               <a:latin typeface="Cambria Math" panose="02040503050406030204" pitchFamily="18" charset="0"/>
                             </a:rPr>
                             <m:t>=1</m:t>
@@ -19138,7 +19936,7 @@
                         </m:sub>
                         <m:sup>
                           <m:r>
-                            <a:rPr lang="es-AR" b="0" i="1" smtClean="0">
+                            <a:rPr lang="es-AR" sz="2000" b="0" i="1" smtClean="0">
                               <a:latin typeface="Cambria Math" panose="02040503050406030204" pitchFamily="18" charset="0"/>
                             </a:rPr>
                             <m:t>𝑛</m:t>
@@ -19146,7 +19944,7 @@
                         </m:sup>
                         <m:e>
                           <m:r>
-                            <a:rPr lang="es-AR" b="0" i="1" smtClean="0">
+                            <a:rPr lang="es-AR" sz="2000" b="0" i="1" smtClean="0">
                               <a:latin typeface="Cambria Math" panose="02040503050406030204" pitchFamily="18" charset="0"/>
                             </a:rPr>
                             <m:t>(</m:t>
@@ -19154,14 +19952,14 @@
                           <m:sSub>
                             <m:sSubPr>
                               <m:ctrlPr>
-                                <a:rPr lang="es-AR" b="0" i="1" smtClean="0">
+                                <a:rPr lang="es-AR" sz="2000" b="0" i="1" smtClean="0">
                                   <a:latin typeface="Cambria Math" panose="02040503050406030204" pitchFamily="18" charset="0"/>
                                 </a:rPr>
                               </m:ctrlPr>
                             </m:sSubPr>
                             <m:e>
                               <m:r>
-                                <a:rPr lang="es-AR" b="0" i="1" smtClean="0">
+                                <a:rPr lang="es-AR" sz="2000" b="0" i="1" smtClean="0">
                                   <a:latin typeface="Cambria Math" panose="02040503050406030204" pitchFamily="18" charset="0"/>
                                 </a:rPr>
                                 <m:t>𝑦</m:t>
@@ -19169,7 +19967,7 @@
                             </m:e>
                             <m:sub>
                               <m:r>
-                                <a:rPr lang="es-AR" b="0" i="1" smtClean="0">
+                                <a:rPr lang="es-AR" sz="2000" b="0" i="1" smtClean="0">
                                   <a:latin typeface="Cambria Math" panose="02040503050406030204" pitchFamily="18" charset="0"/>
                                 </a:rPr>
                                 <m:t>𝑖</m:t>
@@ -19177,7 +19975,7 @@
                             </m:sub>
                           </m:sSub>
                           <m:r>
-                            <a:rPr lang="es-AR" b="0" i="1" smtClean="0">
+                            <a:rPr lang="es-AR" sz="2000" b="0" i="1" smtClean="0">
                               <a:latin typeface="Cambria Math" panose="02040503050406030204" pitchFamily="18" charset="0"/>
                             </a:rPr>
                             <m:t> − </m:t>
@@ -19186,14 +19984,14 @@
                             <m:accPr>
                               <m:chr m:val="̂"/>
                               <m:ctrlPr>
-                                <a:rPr lang="es-AR" b="0" i="1" smtClean="0">
+                                <a:rPr lang="es-AR" sz="2000" b="0" i="1" smtClean="0">
                                   <a:latin typeface="Cambria Math" panose="02040503050406030204" pitchFamily="18" charset="0"/>
                                 </a:rPr>
                               </m:ctrlPr>
                             </m:accPr>
                             <m:e>
                               <m:r>
-                                <a:rPr lang="es-AR" b="0" i="1" smtClean="0">
+                                <a:rPr lang="es-AR" sz="2000" b="0" i="1" smtClean="0">
                                   <a:latin typeface="Cambria Math" panose="02040503050406030204" pitchFamily="18" charset="0"/>
                                 </a:rPr>
                                 <m:t>𝑓</m:t>
@@ -19203,7 +20001,7 @@
                           <m:d>
                             <m:dPr>
                               <m:ctrlPr>
-                                <a:rPr lang="es-AR" b="0" i="1" smtClean="0">
+                                <a:rPr lang="es-AR" sz="2000" b="0" i="1" smtClean="0">
                                   <a:latin typeface="Cambria Math" panose="02040503050406030204" pitchFamily="18" charset="0"/>
                                 </a:rPr>
                               </m:ctrlPr>
@@ -19212,14 +20010,14 @@
                               <m:sSub>
                                 <m:sSubPr>
                                   <m:ctrlPr>
-                                    <a:rPr lang="es-AR" b="0" i="1" smtClean="0">
+                                    <a:rPr lang="es-AR" sz="2000" b="0" i="1" smtClean="0">
                                       <a:latin typeface="Cambria Math" panose="02040503050406030204" pitchFamily="18" charset="0"/>
                                     </a:rPr>
                                   </m:ctrlPr>
                                 </m:sSubPr>
                                 <m:e>
                                   <m:r>
-                                    <a:rPr lang="es-AR" b="0" i="1" smtClean="0">
+                                    <a:rPr lang="es-AR" sz="2000" b="0" i="1" smtClean="0">
                                       <a:latin typeface="Cambria Math" panose="02040503050406030204" pitchFamily="18" charset="0"/>
                                     </a:rPr>
                                     <m:t>𝑥</m:t>
@@ -19227,7 +20025,7 @@
                                 </m:e>
                                 <m:sub>
                                   <m:r>
-                                    <a:rPr lang="es-AR" b="0" i="1" smtClean="0">
+                                    <a:rPr lang="es-AR" sz="2000" b="0" i="1" smtClean="0">
                                       <a:latin typeface="Cambria Math" panose="02040503050406030204" pitchFamily="18" charset="0"/>
                                     </a:rPr>
                                     <m:t>𝑖</m:t>
@@ -19239,14 +20037,14 @@
                           <m:sSup>
                             <m:sSupPr>
                               <m:ctrlPr>
-                                <a:rPr lang="es-AR" b="0" i="1" smtClean="0">
+                                <a:rPr lang="es-AR" sz="2000" b="0" i="1" smtClean="0">
                                   <a:latin typeface="Cambria Math" panose="02040503050406030204" pitchFamily="18" charset="0"/>
                                 </a:rPr>
                               </m:ctrlPr>
                             </m:sSupPr>
                             <m:e>
                               <m:r>
-                                <a:rPr lang="es-AR" b="0" i="1" smtClean="0">
+                                <a:rPr lang="es-AR" sz="2000" b="0" i="1" smtClean="0">
                                   <a:latin typeface="Cambria Math" panose="02040503050406030204" pitchFamily="18" charset="0"/>
                                 </a:rPr>
                                 <m:t>)</m:t>
@@ -19254,7 +20052,7 @@
                             </m:e>
                             <m:sup>
                               <m:r>
-                                <a:rPr lang="es-AR" b="0" i="1" smtClean="0">
+                                <a:rPr lang="es-AR" sz="2000" b="0" i="1" smtClean="0">
                                   <a:latin typeface="Cambria Math" panose="02040503050406030204" pitchFamily="18" charset="0"/>
                                 </a:rPr>
                                 <m:t>2</m:t>
@@ -19262,7 +20060,7 @@
                             </m:sup>
                           </m:sSup>
                           <m:r>
-                            <a:rPr lang="es-AR" b="0" i="1" smtClean="0">
+                            <a:rPr lang="es-AR" sz="2000" b="0" i="1" smtClean="0">
                               <a:latin typeface="Cambria Math" panose="02040503050406030204" pitchFamily="18" charset="0"/>
                             </a:rPr>
                             <m:t> </m:t>
@@ -19272,49 +20070,49 @@
                     </m:oMath>
                   </m:oMathPara>
                 </a14:m>
-                <a:endParaRPr lang="es-AR" dirty="0"/>
+                <a:endParaRPr lang="es-AR" sz="2000" dirty="0"/>
               </a:p>
               <a:p>
                 <a:pPr marL="114300" indent="0" algn="ctr">
                   <a:buNone/>
                 </a:pPr>
-                <a:endParaRPr lang="es-AR" dirty="0"/>
+                <a:endParaRPr lang="es-AR" sz="2000" dirty="0"/>
               </a:p>
               <a:p>
                 <a:pPr marL="114300" indent="0">
                   <a:buNone/>
                 </a:pPr>
-                <a:endParaRPr lang="es-AR" dirty="0"/>
+                <a:endParaRPr lang="es-AR" sz="2000" dirty="0"/>
               </a:p>
               <a:p>
                 <a:pPr marL="114300" indent="0">
                   <a:buNone/>
                 </a:pPr>
                 <a:r>
-                  <a:rPr lang="es-AR" dirty="0"/>
+                  <a:rPr lang="es-AR" sz="2000" dirty="0"/>
                   <a:t>El error cuadrático medio será </a:t>
                 </a:r>
                 <a:r>
-                  <a:rPr lang="es-AR" b="1" dirty="0"/>
+                  <a:rPr lang="es-AR" sz="2000" b="1" dirty="0"/>
                   <a:t>menor</a:t>
                 </a:r>
                 <a:r>
-                  <a:rPr lang="es-AR" dirty="0"/>
+                  <a:rPr lang="es-AR" sz="2000" dirty="0"/>
                   <a:t> cuanto más </a:t>
                 </a:r>
                 <a:r>
-                  <a:rPr lang="es-AR" b="1" dirty="0"/>
+                  <a:rPr lang="es-AR" sz="2000" b="1" dirty="0"/>
                   <a:t>cercanas</a:t>
                 </a:r>
                 <a:r>
-                  <a:rPr lang="es-AR" dirty="0"/>
+                  <a:rPr lang="es-AR" sz="2000" dirty="0"/>
                   <a:t> sean nuestras predicciones a los valores reales. </a:t>
                 </a:r>
               </a:p>
             </p:txBody>
           </p:sp>
         </mc:Choice>
-        <mc:Fallback xmlns="">
+        <mc:Fallback>
           <p:sp>
             <p:nvSpPr>
               <p:cNvPr id="3" name="Marcador de texto 2">
@@ -19339,7 +20137,7 @@
               <a:blipFill>
                 <a:blip r:embed="rId3"/>
                 <a:stretch>
-                  <a:fillRect/>
+                  <a:fillRect b="-933"/>
                 </a:stretch>
               </a:blipFill>
             </p:spPr>
@@ -19942,7 +20740,7 @@
         </p:nvSpPr>
         <p:spPr>
           <a:xfrm>
-            <a:off x="5425037" y="2827039"/>
+            <a:off x="5425037" y="1646313"/>
             <a:ext cx="3414300" cy="1434300"/>
           </a:xfrm>
           <a:prstGeom prst="rect">
@@ -22780,7 +23578,7 @@
           <p:nvPr>
             <p:extLst>
               <p:ext uri="{D42A27DB-BD31-4B8C-83A1-F6EECF244321}">
-                <p14:modId xmlns:p14="http://schemas.microsoft.com/office/powerpoint/2010/main" val="2174547603"/>
+                <p14:modId xmlns:p14="http://schemas.microsoft.com/office/powerpoint/2010/main" val="444140434"/>
               </p:ext>
             </p:extLst>
           </p:nvPr>
@@ -22838,6 +23636,9 @@
                       </a:pPr>
                       <a:r>
                         <a:rPr lang="es-MX" sz="1000" dirty="0">
+                          <a:solidFill>
+                            <a:schemeClr val="accent3"/>
+                          </a:solidFill>
                           <a:latin typeface="Proxima Nova" panose="020B0604020202020204" charset="0"/>
                         </a:rPr>
                         <a:t>Hay que importar los datos, unir las bases, convertir en numéricas</a:t>
@@ -22890,11 +23691,17 @@
                     <a:p>
                       <a:r>
                         <a:rPr lang="es-MX" sz="1000" dirty="0">
+                          <a:solidFill>
+                            <a:schemeClr val="accent3"/>
+                          </a:solidFill>
                           <a:latin typeface="Proxima Nova" panose="020B0604020202020204" charset="0"/>
                         </a:rPr>
                         <a:t>Limpieza</a:t>
                       </a:r>
                       <a:endParaRPr lang="es-AR" sz="1000" dirty="0">
+                        <a:solidFill>
+                          <a:schemeClr val="accent3"/>
+                        </a:solidFill>
                         <a:latin typeface="Proxima Nova" panose="020B0604020202020204" charset="0"/>
                       </a:endParaRPr>
                     </a:p>
@@ -22971,6 +23778,9 @@
                       </a:pPr>
                       <a:r>
                         <a:rPr lang="es-MX" sz="1000" dirty="0">
+                          <a:solidFill>
+                            <a:schemeClr val="accent3"/>
+                          </a:solidFill>
                           <a:latin typeface="Proxima Nova" panose="020B0604020202020204" charset="0"/>
                         </a:rPr>
                         <a:t>Codifiquemos las variables cualitativas</a:t>
@@ -23023,11 +23833,17 @@
                     <a:p>
                       <a:r>
                         <a:rPr lang="es-MX" sz="1000" dirty="0">
+                          <a:solidFill>
+                            <a:schemeClr val="accent3"/>
+                          </a:solidFill>
                           <a:latin typeface="Proxima Nova" panose="020B0604020202020204" charset="0"/>
                         </a:rPr>
                         <a:t>Limpieza</a:t>
                       </a:r>
                       <a:endParaRPr lang="es-AR" sz="1000" dirty="0">
+                        <a:solidFill>
+                          <a:schemeClr val="accent3"/>
+                        </a:solidFill>
                         <a:latin typeface="Proxima Nova" panose="020B0604020202020204" charset="0"/>
                       </a:endParaRPr>
                     </a:p>
@@ -23104,6 +23920,9 @@
                       </a:pPr>
                       <a:r>
                         <a:rPr lang="es-MX" sz="1000" dirty="0">
+                          <a:solidFill>
+                            <a:schemeClr val="accent3"/>
+                          </a:solidFill>
                           <a:latin typeface="Proxima Nova" panose="020B0604020202020204" charset="0"/>
                         </a:rPr>
                         <a:t>Hay una correlación alta entre X_1 y X_2</a:t>
@@ -23156,11 +23975,17 @@
                     <a:p>
                       <a:r>
                         <a:rPr lang="es-MX" sz="1000" dirty="0">
+                          <a:solidFill>
+                            <a:schemeClr val="accent3"/>
+                          </a:solidFill>
                           <a:latin typeface="Proxima Nova" panose="020B0604020202020204" charset="0"/>
                         </a:rPr>
                         <a:t>Exploración</a:t>
                       </a:r>
                       <a:endParaRPr lang="es-AR" sz="1000" dirty="0">
+                        <a:solidFill>
+                          <a:schemeClr val="accent3"/>
+                        </a:solidFill>
                         <a:latin typeface="Proxima Nova" panose="020B0604020202020204" charset="0"/>
                       </a:endParaRPr>
                     </a:p>
@@ -23237,6 +24062,9 @@
                       </a:pPr>
                       <a:r>
                         <a:rPr lang="es-MX" sz="1000" dirty="0">
+                          <a:solidFill>
+                            <a:schemeClr val="accent3"/>
+                          </a:solidFill>
                           <a:latin typeface="Proxima Nova" panose="020B0604020202020204" charset="0"/>
                         </a:rPr>
                         <a:t>Hay un valor de X_3 que es atípicamente alto</a:t>
@@ -23289,11 +24117,17 @@
                     <a:p>
                       <a:r>
                         <a:rPr lang="es-MX" sz="1000" dirty="0">
+                          <a:solidFill>
+                            <a:schemeClr val="accent3"/>
+                          </a:solidFill>
                           <a:latin typeface="Proxima Nova" panose="020B0604020202020204" charset="0"/>
                         </a:rPr>
                         <a:t>Exploración</a:t>
                       </a:r>
                       <a:endParaRPr lang="es-AR" sz="1000" dirty="0">
+                        <a:solidFill>
+                          <a:schemeClr val="accent3"/>
+                        </a:solidFill>
                         <a:latin typeface="Proxima Nova" panose="020B0604020202020204" charset="0"/>
                       </a:endParaRPr>
                     </a:p>
@@ -23370,6 +24204,9 @@
                       </a:pPr>
                       <a:r>
                         <a:rPr lang="es-MX" sz="1000" dirty="0">
+                          <a:solidFill>
+                            <a:schemeClr val="accent3"/>
+                          </a:solidFill>
                           <a:latin typeface="Proxima Nova" panose="020B0604020202020204" charset="0"/>
                         </a:rPr>
                         <a:t>¿Cómo se correlaciona Y con las X?</a:t>
@@ -23422,11 +24259,17 @@
                     <a:p>
                       <a:r>
                         <a:rPr lang="es-MX" sz="1000" dirty="0">
+                          <a:solidFill>
+                            <a:schemeClr val="accent3"/>
+                          </a:solidFill>
                           <a:latin typeface="Proxima Nova" panose="020B0604020202020204" charset="0"/>
                         </a:rPr>
                         <a:t>Exploración</a:t>
                       </a:r>
                       <a:endParaRPr lang="es-AR" sz="1000" dirty="0">
+                        <a:solidFill>
+                          <a:schemeClr val="accent3"/>
+                        </a:solidFill>
                         <a:latin typeface="Proxima Nova" panose="020B0604020202020204" charset="0"/>
                       </a:endParaRPr>
                     </a:p>
@@ -23503,6 +24346,9 @@
                       </a:pPr>
                       <a:r>
                         <a:rPr lang="es-MX" sz="1000" dirty="0">
+                          <a:solidFill>
+                            <a:schemeClr val="accent3"/>
+                          </a:solidFill>
                           <a:latin typeface="Proxima Nova" panose="020B0604020202020204" charset="0"/>
                         </a:rPr>
                         <a:t>Habría que estandarizar las X</a:t>
@@ -23555,11 +24401,17 @@
                     <a:p>
                       <a:r>
                         <a:rPr lang="es-MX" sz="1000" dirty="0">
+                          <a:solidFill>
+                            <a:schemeClr val="accent3"/>
+                          </a:solidFill>
                           <a:latin typeface="Proxima Nova" panose="020B0604020202020204" charset="0"/>
                         </a:rPr>
                         <a:t>Transformación</a:t>
                       </a:r>
                       <a:endParaRPr lang="es-AR" sz="1000" dirty="0">
+                        <a:solidFill>
+                          <a:schemeClr val="accent3"/>
+                        </a:solidFill>
                         <a:latin typeface="Proxima Nova" panose="020B0604020202020204" charset="0"/>
                       </a:endParaRPr>
                     </a:p>
@@ -23636,6 +24488,9 @@
                       </a:pPr>
                       <a:r>
                         <a:rPr lang="es-MX" sz="1000" dirty="0">
+                          <a:solidFill>
+                            <a:schemeClr val="accent3"/>
+                          </a:solidFill>
                           <a:latin typeface="Proxima Nova" panose="020B0604020202020204" charset="0"/>
                         </a:rPr>
                         <a:t>Agreguemos los datos diarios en mensuales</a:t>
@@ -23688,11 +24543,17 @@
                     <a:p>
                       <a:r>
                         <a:rPr lang="es-MX" sz="1000" dirty="0">
+                          <a:solidFill>
+                            <a:schemeClr val="accent3"/>
+                          </a:solidFill>
                           <a:latin typeface="Proxima Nova" panose="020B0604020202020204" charset="0"/>
                         </a:rPr>
                         <a:t>Transformación</a:t>
                       </a:r>
                       <a:endParaRPr lang="es-AR" sz="1000" dirty="0">
+                        <a:solidFill>
+                          <a:schemeClr val="accent3"/>
+                        </a:solidFill>
                         <a:latin typeface="Proxima Nova" panose="020B0604020202020204" charset="0"/>
                       </a:endParaRPr>
                     </a:p>
@@ -23769,18 +24630,27 @@
                       </a:pPr>
                       <a:r>
                         <a:rPr lang="es-MX" sz="1000" dirty="0">
+                          <a:solidFill>
+                            <a:schemeClr val="accent3"/>
+                          </a:solidFill>
                           <a:latin typeface="Proxima Nova" panose="020B0604020202020204" charset="0"/>
                         </a:rPr>
                         <a:t>Apliquemos log a Y </a:t>
                       </a:r>
                       <a:r>
                         <a:rPr lang="es-MX" sz="1000" dirty="0" err="1">
+                          <a:solidFill>
+                            <a:schemeClr val="accent3"/>
+                          </a:solidFill>
                           <a:latin typeface="Proxima Nova" panose="020B0604020202020204" charset="0"/>
                         </a:rPr>
                         <a:t>y</a:t>
                       </a:r>
                       <a:r>
                         <a:rPr lang="es-MX" sz="1000" dirty="0">
+                          <a:solidFill>
+                            <a:schemeClr val="accent3"/>
+                          </a:solidFill>
                           <a:latin typeface="Proxima Nova" panose="020B0604020202020204" charset="0"/>
                         </a:rPr>
                         <a:t> X</a:t>
@@ -23833,11 +24703,17 @@
                     <a:p>
                       <a:r>
                         <a:rPr lang="es-MX" sz="1000" dirty="0">
+                          <a:solidFill>
+                            <a:schemeClr val="accent3"/>
+                          </a:solidFill>
                           <a:latin typeface="Proxima Nova" panose="020B0604020202020204" charset="0"/>
                         </a:rPr>
                         <a:t>Transformación</a:t>
                       </a:r>
                       <a:endParaRPr lang="es-AR" sz="1000" dirty="0">
+                        <a:solidFill>
+                          <a:schemeClr val="accent3"/>
+                        </a:solidFill>
                         <a:latin typeface="Proxima Nova" panose="020B0604020202020204" charset="0"/>
                       </a:endParaRPr>
                     </a:p>
@@ -23914,6 +24790,9 @@
                       </a:pPr>
                       <a:r>
                         <a:rPr lang="es-MX" sz="1000" dirty="0">
+                          <a:solidFill>
+                            <a:schemeClr val="accent3"/>
+                          </a:solidFill>
                           <a:latin typeface="Proxima Nova" panose="020B0604020202020204" charset="0"/>
                         </a:rPr>
                         <a:t>Tal vez apliquemos PCA a las X</a:t>
@@ -23966,11 +24845,17 @@
                     <a:p>
                       <a:r>
                         <a:rPr lang="es-MX" sz="1000" dirty="0">
+                          <a:solidFill>
+                            <a:schemeClr val="accent3"/>
+                          </a:solidFill>
                           <a:latin typeface="Proxima Nova" panose="020B0604020202020204" charset="0"/>
                         </a:rPr>
                         <a:t>Transformación</a:t>
                       </a:r>
                       <a:endParaRPr lang="es-AR" sz="1000" dirty="0">
+                        <a:solidFill>
+                          <a:schemeClr val="accent3"/>
+                        </a:solidFill>
                         <a:latin typeface="Proxima Nova" panose="020B0604020202020204" charset="0"/>
                       </a:endParaRPr>
                     </a:p>
@@ -24047,6 +24932,9 @@
                       </a:pPr>
                       <a:r>
                         <a:rPr lang="es-MX" sz="1000" dirty="0">
+                          <a:solidFill>
+                            <a:schemeClr val="accent3"/>
+                          </a:solidFill>
                           <a:latin typeface="Proxima Nova" panose="020B0604020202020204" charset="0"/>
                         </a:rPr>
                         <a:t>Probemos una regresión lineal, KNN y un LDA</a:t>
@@ -24099,11 +24987,17 @@
                     <a:p>
                       <a:r>
                         <a:rPr lang="es-MX" sz="1000" dirty="0">
+                          <a:solidFill>
+                            <a:schemeClr val="accent3"/>
+                          </a:solidFill>
                           <a:latin typeface="Proxima Nova" panose="020B0604020202020204" charset="0"/>
                         </a:rPr>
                         <a:t>Estimación de modelos</a:t>
                       </a:r>
                       <a:endParaRPr lang="es-AR" sz="1000" dirty="0">
+                        <a:solidFill>
+                          <a:schemeClr val="accent3"/>
+                        </a:solidFill>
                         <a:latin typeface="Proxima Nova" panose="020B0604020202020204" charset="0"/>
                       </a:endParaRPr>
                     </a:p>
@@ -24180,6 +25074,9 @@
                       </a:pPr>
                       <a:r>
                         <a:rPr lang="es-MX" sz="1000" dirty="0">
+                          <a:solidFill>
+                            <a:schemeClr val="accent3"/>
+                          </a:solidFill>
                           <a:latin typeface="Proxima Nova" panose="020B0604020202020204" charset="0"/>
                         </a:rPr>
                         <a:t>¿Qué K elegimos para el KNN? Cuál parece óptimo según alguna métrica?</a:t>
@@ -24232,11 +25129,17 @@
                     <a:p>
                       <a:r>
                         <a:rPr lang="es-MX" sz="1000" dirty="0">
+                          <a:solidFill>
+                            <a:schemeClr val="accent3"/>
+                          </a:solidFill>
                           <a:latin typeface="Proxima Nova" panose="020B0604020202020204" charset="0"/>
                         </a:rPr>
                         <a:t>Pulir modelo</a:t>
                       </a:r>
                       <a:endParaRPr lang="es-AR" sz="1000" dirty="0">
+                        <a:solidFill>
+                          <a:schemeClr val="accent3"/>
+                        </a:solidFill>
                         <a:latin typeface="Proxima Nova" panose="020B0604020202020204" charset="0"/>
                       </a:endParaRPr>
                     </a:p>
@@ -24313,6 +25216,9 @@
                       </a:pPr>
                       <a:r>
                         <a:rPr lang="es-MX" sz="1000" dirty="0">
+                          <a:solidFill>
+                            <a:schemeClr val="accent3"/>
+                          </a:solidFill>
                           <a:latin typeface="Proxima Nova" panose="020B0604020202020204" charset="0"/>
                         </a:rPr>
                         <a:t>¿Incluimos términos cuadráticos en la regresión?</a:t>
@@ -24365,11 +25271,17 @@
                     <a:p>
                       <a:r>
                         <a:rPr lang="es-MX" sz="1000" dirty="0">
+                          <a:solidFill>
+                            <a:schemeClr val="accent3"/>
+                          </a:solidFill>
                           <a:latin typeface="Proxima Nova" panose="020B0604020202020204" charset="0"/>
                         </a:rPr>
                         <a:t>Pulir modelo</a:t>
                       </a:r>
                       <a:endParaRPr lang="es-AR" sz="1000" dirty="0">
+                        <a:solidFill>
+                          <a:schemeClr val="accent3"/>
+                        </a:solidFill>
                         <a:latin typeface="Proxima Nova" panose="020B0604020202020204" charset="0"/>
                       </a:endParaRPr>
                     </a:p>
@@ -24446,6 +25358,9 @@
                       </a:pPr>
                       <a:r>
                         <a:rPr lang="es-MX" sz="1000" dirty="0">
+                          <a:solidFill>
+                            <a:schemeClr val="accent3"/>
+                          </a:solidFill>
                           <a:latin typeface="Proxima Nova" panose="020B0604020202020204" charset="0"/>
                         </a:rPr>
                         <a:t>¿Qué modelo tiene el menor MSE?</a:t>
@@ -24498,11 +25413,17 @@
                     <a:p>
                       <a:r>
                         <a:rPr lang="es-MX" sz="1000" dirty="0">
+                          <a:solidFill>
+                            <a:schemeClr val="accent3"/>
+                          </a:solidFill>
                           <a:latin typeface="Proxima Nova" panose="020B0604020202020204" charset="0"/>
                         </a:rPr>
                         <a:t>Evaluación de modelos</a:t>
                       </a:r>
                       <a:endParaRPr lang="es-AR" sz="1000" dirty="0">
+                        <a:solidFill>
+                          <a:schemeClr val="accent3"/>
+                        </a:solidFill>
                         <a:latin typeface="Proxima Nova" panose="020B0604020202020204" charset="0"/>
                       </a:endParaRPr>
                     </a:p>
@@ -24579,6 +25500,9 @@
                       </a:pPr>
                       <a:r>
                         <a:rPr lang="es-MX" sz="1000" dirty="0">
+                          <a:solidFill>
+                            <a:schemeClr val="accent3"/>
+                          </a:solidFill>
                           <a:latin typeface="Proxima Nova" panose="020B0604020202020204" charset="0"/>
                         </a:rPr>
                         <a:t>¿Qué valores de Y tienen residuos de predicción más altos? </a:t>
@@ -24631,11 +25555,17 @@
                     <a:p>
                       <a:r>
                         <a:rPr lang="es-MX" sz="1000" dirty="0">
+                          <a:solidFill>
+                            <a:schemeClr val="accent3"/>
+                          </a:solidFill>
                           <a:latin typeface="Proxima Nova" panose="020B0604020202020204" charset="0"/>
                         </a:rPr>
                         <a:t>Exploración</a:t>
                       </a:r>
                       <a:endParaRPr lang="es-AR" sz="1000" dirty="0">
+                        <a:solidFill>
+                          <a:schemeClr val="accent3"/>
+                        </a:solidFill>
                         <a:latin typeface="Proxima Nova" panose="020B0604020202020204" charset="0"/>
                       </a:endParaRPr>
                     </a:p>
@@ -24712,6 +25642,9 @@
                       </a:pPr>
                       <a:r>
                         <a:rPr lang="es-MX" sz="1000" dirty="0">
+                          <a:solidFill>
+                            <a:schemeClr val="accent3"/>
+                          </a:solidFill>
                           <a:latin typeface="Proxima Nova" panose="020B0604020202020204" charset="0"/>
                         </a:rPr>
                         <a:t>Eliminemos X_2, que no está aportando</a:t>
@@ -24764,11 +25697,17 @@
                     <a:p>
                       <a:r>
                         <a:rPr lang="es-MX" sz="1000" dirty="0">
+                          <a:solidFill>
+                            <a:schemeClr val="accent3"/>
+                          </a:solidFill>
                           <a:latin typeface="Proxima Nova" panose="020B0604020202020204" charset="0"/>
                         </a:rPr>
                         <a:t>Evaluación de modelos</a:t>
                       </a:r>
                       <a:endParaRPr lang="es-AR" sz="1000" dirty="0">
+                        <a:solidFill>
+                          <a:schemeClr val="accent3"/>
+                        </a:solidFill>
                         <a:latin typeface="Proxima Nova" panose="020B0604020202020204" charset="0"/>
                       </a:endParaRPr>
                     </a:p>
@@ -24845,6 +25784,9 @@
                       </a:pPr>
                       <a:r>
                         <a:rPr lang="es-MX" sz="1000" dirty="0">
+                          <a:solidFill>
+                            <a:schemeClr val="accent3"/>
+                          </a:solidFill>
                           <a:latin typeface="Proxima Nova" panose="020B0604020202020204" charset="0"/>
                         </a:rPr>
                         <a:t>Las predicciones mejoran si transformamos X_3</a:t>
@@ -24897,11 +25839,17 @@
                     <a:p>
                       <a:r>
                         <a:rPr lang="es-MX" sz="1000" dirty="0">
+                          <a:solidFill>
+                            <a:schemeClr val="accent3"/>
+                          </a:solidFill>
                           <a:latin typeface="Proxima Nova" panose="020B0604020202020204" charset="0"/>
                         </a:rPr>
                         <a:t>Transformación</a:t>
                       </a:r>
                       <a:endParaRPr lang="es-AR" sz="1000" dirty="0">
+                        <a:solidFill>
+                          <a:schemeClr val="accent3"/>
+                        </a:solidFill>
                         <a:latin typeface="Proxima Nova" panose="020B0604020202020204" charset="0"/>
                       </a:endParaRPr>
                     </a:p>
@@ -24978,6 +25926,9 @@
                       </a:pPr>
                       <a:r>
                         <a:rPr lang="es-MX" sz="1000" dirty="0">
+                          <a:solidFill>
+                            <a:schemeClr val="accent3"/>
+                          </a:solidFill>
                           <a:latin typeface="Proxima Nova" panose="020B0604020202020204" charset="0"/>
                         </a:rPr>
                         <a:t>LDA no da buenos resultados, lo dejamos de lado</a:t>
@@ -25030,11 +25981,17 @@
                     <a:p>
                       <a:r>
                         <a:rPr lang="es-MX" sz="1000" dirty="0">
+                          <a:solidFill>
+                            <a:schemeClr val="accent3"/>
+                          </a:solidFill>
                           <a:latin typeface="Proxima Nova" panose="020B0604020202020204" charset="0"/>
                         </a:rPr>
                         <a:t>Evaluación de modelos</a:t>
                       </a:r>
                       <a:endParaRPr lang="es-AR" sz="1000" dirty="0">
+                        <a:solidFill>
+                          <a:schemeClr val="accent3"/>
+                        </a:solidFill>
                         <a:latin typeface="Proxima Nova" panose="020B0604020202020204" charset="0"/>
                       </a:endParaRPr>
                     </a:p>
@@ -25337,7 +26294,7 @@
         </p:spPr>
         <p:txBody>
           <a:bodyPr spcFirstLastPara="1" wrap="square" lIns="91425" tIns="91425" rIns="91425" bIns="91425" anchor="t" anchorCtr="0">
-            <a:normAutofit fontScale="92500"/>
+            <a:noAutofit/>
           </a:bodyPr>
           <a:lstStyle/>
           <a:p>
@@ -25352,15 +26309,15 @@
               <a:buChar char="§"/>
             </a:pPr>
             <a:r>
-              <a:rPr lang="es-AR" dirty="0"/>
+              <a:rPr lang="es-AR" sz="1600" dirty="0"/>
               <a:t>Fácil de </a:t>
             </a:r>
             <a:r>
-              <a:rPr lang="es-AR" b="1" dirty="0"/>
+              <a:rPr lang="es-AR" sz="1600" b="1" dirty="0"/>
               <a:t>entender</a:t>
             </a:r>
             <a:r>
-              <a:rPr lang="es-AR" dirty="0"/>
+              <a:rPr lang="es-AR" sz="1600" dirty="0"/>
               <a:t>: condición necesaria para trabajar en equipo.</a:t>
             </a:r>
           </a:p>
@@ -25376,19 +26333,19 @@
               <a:buChar char="§"/>
             </a:pPr>
             <a:r>
-              <a:rPr lang="es-AR" b="1" dirty="0"/>
+              <a:rPr lang="es-AR" sz="1600" b="1" dirty="0"/>
               <a:t>Continuidad</a:t>
             </a:r>
             <a:r>
-              <a:rPr lang="es-AR" dirty="0"/>
+              <a:rPr lang="es-AR" sz="1600" dirty="0"/>
               <a:t> con la sintaxis </a:t>
             </a:r>
             <a:r>
-              <a:rPr lang="es-AR" dirty="0" err="1"/>
+              <a:rPr lang="es-AR" sz="1600" dirty="0" err="1"/>
               <a:t>tidyverse</a:t>
             </a:r>
             <a:r>
-              <a:rPr lang="es-AR" dirty="0"/>
+              <a:rPr lang="es-AR" sz="1600" dirty="0"/>
               <a:t>.</a:t>
             </a:r>
           </a:p>
@@ -25404,23 +26361,23 @@
               <a:buChar char="§"/>
             </a:pPr>
             <a:r>
-              <a:rPr lang="es-AR" dirty="0"/>
+              <a:rPr lang="es-AR" sz="1600" dirty="0"/>
               <a:t>Mantener </a:t>
             </a:r>
             <a:r>
-              <a:rPr lang="es-AR" b="1" dirty="0"/>
+              <a:rPr lang="es-AR" sz="1600" b="1" dirty="0"/>
               <a:t>estructuras de datos </a:t>
             </a:r>
             <a:r>
-              <a:rPr lang="es-AR" dirty="0"/>
+              <a:rPr lang="es-AR" sz="1600" dirty="0"/>
               <a:t>(</a:t>
             </a:r>
             <a:r>
-              <a:rPr lang="es-AR" dirty="0" err="1"/>
+              <a:rPr lang="es-AR" sz="1600" dirty="0" err="1"/>
               <a:t>dataframe</a:t>
             </a:r>
             <a:r>
-              <a:rPr lang="es-AR" dirty="0"/>
+              <a:rPr lang="es-AR" sz="1600" dirty="0"/>
               <a:t>).</a:t>
             </a:r>
           </a:p>
@@ -25435,7 +26392,7 @@
               <a:buFont typeface="Wingdings" panose="05000000000000000000" pitchFamily="2" charset="2"/>
               <a:buChar char="§"/>
             </a:pPr>
-            <a:endParaRPr lang="es-AR" dirty="0"/>
+            <a:endParaRPr lang="es-AR" sz="1600" dirty="0"/>
           </a:p>
           <a:p>
             <a:pPr marL="285750" lvl="0" indent="-285750" algn="l" rtl="0">
@@ -25449,11 +26406,11 @@
               <a:buChar char="§"/>
             </a:pPr>
             <a:r>
-              <a:rPr lang="es-AR" dirty="0"/>
+              <a:rPr lang="es-AR" sz="1600" dirty="0"/>
               <a:t>Fundamental: </a:t>
             </a:r>
             <a:r>
-              <a:rPr lang="es-AR" b="1" dirty="0">
+              <a:rPr lang="es-AR" sz="1600" b="1" dirty="0">
                 <a:solidFill>
                   <a:schemeClr val="tx1"/>
                 </a:solidFill>
@@ -25464,7 +26421,7 @@
               <a:t>Pipes</a:t>
             </a:r>
             <a:r>
-              <a:rPr lang="es-AR" dirty="0"/>
+              <a:rPr lang="es-AR" sz="1600" dirty="0"/>
               <a:t> (%&gt;%) para encadenar secuencias complejas</a:t>
             </a:r>
           </a:p>
@@ -25478,10 +26435,10 @@
               </a:spcAft>
               <a:buNone/>
             </a:pPr>
-            <a:endParaRPr lang="es-AR" dirty="0"/>
+            <a:endParaRPr lang="es-AR" sz="1600" dirty="0"/>
           </a:p>
           <a:p>
-            <a:pPr marL="0" lvl="0" indent="0" algn="l" rtl="0">
+            <a:pPr marL="0" lvl="0" indent="0" rtl="0">
               <a:spcBef>
                 <a:spcPts val="0"/>
               </a:spcBef>
@@ -25491,15 +26448,15 @@
               <a:buNone/>
             </a:pPr>
             <a:r>
-              <a:rPr lang="es-AR" dirty="0">
+              <a:rPr lang="es-AR" sz="1600" b="1" dirty="0">
                 <a:solidFill>
                   <a:schemeClr val="bg2"/>
                 </a:solidFill>
               </a:rPr>
-              <a:t>	Ejemplo</a:t>
-            </a:r>
-            <a:r>
-              <a:rPr lang="es-AR" dirty="0"/>
+              <a:t>Ejemplo</a:t>
+            </a:r>
+            <a:r>
+              <a:rPr lang="es-AR" sz="1600" dirty="0"/>
               <a:t>. Dos formas de escribir:</a:t>
             </a:r>
           </a:p>
@@ -25514,23 +26471,35 @@
               <a:buNone/>
             </a:pPr>
             <a:r>
-              <a:rPr lang="en-US" sz="1200" dirty="0"/>
+              <a:rPr lang="en-US" sz="1600" dirty="0"/>
               <a:t>	</a:t>
             </a:r>
             <a:r>
-              <a:rPr lang="en-US" sz="1200" dirty="0" err="1"/>
+              <a:rPr lang="en-US" sz="1600" dirty="0" err="1">
+                <a:latin typeface="MS Mincho" panose="02020609040205080304" pitchFamily="49" charset="-128"/>
+                <a:ea typeface="MS Mincho" panose="02020609040205080304" pitchFamily="49" charset="-128"/>
+              </a:rPr>
               <a:t>small_mtcars</a:t>
             </a:r>
             <a:r>
-              <a:rPr lang="en-US" sz="1200" dirty="0"/>
+              <a:rPr lang="en-US" sz="1600" dirty="0">
+                <a:latin typeface="MS Mincho" panose="02020609040205080304" pitchFamily="49" charset="-128"/>
+                <a:ea typeface="MS Mincho" panose="02020609040205080304" pitchFamily="49" charset="-128"/>
+              </a:rPr>
               <a:t> &lt;- slice(arrange(</a:t>
             </a:r>
             <a:r>
-              <a:rPr lang="en-US" sz="1200" dirty="0" err="1"/>
+              <a:rPr lang="en-US" sz="1600" dirty="0" err="1">
+                <a:latin typeface="MS Mincho" panose="02020609040205080304" pitchFamily="49" charset="-128"/>
+                <a:ea typeface="MS Mincho" panose="02020609040205080304" pitchFamily="49" charset="-128"/>
+              </a:rPr>
               <a:t>mtcars</a:t>
             </a:r>
             <a:r>
-              <a:rPr lang="en-US" sz="1200" dirty="0"/>
+              <a:rPr lang="en-US" sz="1600" dirty="0">
+                <a:latin typeface="MS Mincho" panose="02020609040205080304" pitchFamily="49" charset="-128"/>
+                <a:ea typeface="MS Mincho" panose="02020609040205080304" pitchFamily="49" charset="-128"/>
+              </a:rPr>
               <a:t>, gear), 1:10)</a:t>
             </a:r>
           </a:p>
@@ -25544,7 +26513,10 @@
               </a:spcAft>
               <a:buNone/>
             </a:pPr>
-            <a:endParaRPr lang="en-US" sz="1200" dirty="0"/>
+            <a:endParaRPr lang="en-US" sz="1600" dirty="0">
+              <a:latin typeface="MS Mincho" panose="02020609040205080304" pitchFamily="49" charset="-128"/>
+              <a:ea typeface="MS Mincho" panose="02020609040205080304" pitchFamily="49" charset="-128"/>
+            </a:endParaRPr>
           </a:p>
           <a:p>
             <a:pPr marL="0" lvl="0" indent="0" algn="l" rtl="0">
@@ -25557,23 +26529,38 @@
               <a:buNone/>
             </a:pPr>
             <a:r>
-              <a:rPr lang="en-US" sz="1200" dirty="0"/>
+              <a:rPr lang="en-US" sz="1600" dirty="0">
+                <a:latin typeface="MS Mincho" panose="02020609040205080304" pitchFamily="49" charset="-128"/>
+                <a:ea typeface="MS Mincho" panose="02020609040205080304" pitchFamily="49" charset="-128"/>
+              </a:rPr>
               <a:t>	</a:t>
             </a:r>
             <a:r>
-              <a:rPr lang="en-US" sz="1200" dirty="0" err="1"/>
+              <a:rPr lang="en-US" sz="1600" dirty="0" err="1">
+                <a:latin typeface="MS Mincho" panose="02020609040205080304" pitchFamily="49" charset="-128"/>
+                <a:ea typeface="MS Mincho" panose="02020609040205080304" pitchFamily="49" charset="-128"/>
+              </a:rPr>
               <a:t>small_mtcars</a:t>
             </a:r>
             <a:r>
-              <a:rPr lang="en-US" sz="1200" dirty="0"/>
+              <a:rPr lang="en-US" sz="1600" dirty="0">
+                <a:latin typeface="MS Mincho" panose="02020609040205080304" pitchFamily="49" charset="-128"/>
+                <a:ea typeface="MS Mincho" panose="02020609040205080304" pitchFamily="49" charset="-128"/>
+              </a:rPr>
               <a:t> &lt;- </a:t>
             </a:r>
             <a:r>
-              <a:rPr lang="en-US" sz="1200" dirty="0" err="1"/>
+              <a:rPr lang="en-US" sz="1600" dirty="0" err="1">
+                <a:latin typeface="MS Mincho" panose="02020609040205080304" pitchFamily="49" charset="-128"/>
+                <a:ea typeface="MS Mincho" panose="02020609040205080304" pitchFamily="49" charset="-128"/>
+              </a:rPr>
               <a:t>mtcars</a:t>
             </a:r>
             <a:r>
-              <a:rPr lang="en-US" sz="1200" dirty="0"/>
+              <a:rPr lang="en-US" sz="1600" dirty="0">
+                <a:latin typeface="MS Mincho" panose="02020609040205080304" pitchFamily="49" charset="-128"/>
+                <a:ea typeface="MS Mincho" panose="02020609040205080304" pitchFamily="49" charset="-128"/>
+              </a:rPr>
               <a:t> %&gt;% </a:t>
             </a:r>
           </a:p>
@@ -25588,7 +26575,10 @@
               <a:buNone/>
             </a:pPr>
             <a:r>
-              <a:rPr lang="en-US" sz="1200" dirty="0"/>
+              <a:rPr lang="en-US" sz="1600" dirty="0">
+                <a:latin typeface="MS Mincho" panose="02020609040205080304" pitchFamily="49" charset="-128"/>
+                <a:ea typeface="MS Mincho" panose="02020609040205080304" pitchFamily="49" charset="-128"/>
+              </a:rPr>
               <a:t> 	     arrange(gear) %&gt;% </a:t>
             </a:r>
           </a:p>
@@ -25603,10 +26593,16 @@
               <a:buNone/>
             </a:pPr>
             <a:r>
-              <a:rPr lang="en-US" sz="1200" dirty="0"/>
+              <a:rPr lang="en-US" sz="1600" dirty="0">
+                <a:latin typeface="MS Mincho" panose="02020609040205080304" pitchFamily="49" charset="-128"/>
+                <a:ea typeface="MS Mincho" panose="02020609040205080304" pitchFamily="49" charset="-128"/>
+              </a:rPr>
               <a:t> 	     slice(1:10)</a:t>
             </a:r>
-            <a:endParaRPr lang="es-AR" sz="1200" dirty="0"/>
+            <a:endParaRPr lang="es-AR" sz="1600" dirty="0">
+              <a:latin typeface="MS Mincho" panose="02020609040205080304" pitchFamily="49" charset="-128"/>
+              <a:ea typeface="MS Mincho" panose="02020609040205080304" pitchFamily="49" charset="-128"/>
+            </a:endParaRPr>
           </a:p>
           <a:p>
             <a:pPr marL="285750" lvl="0" indent="-285750" algn="l" rtl="0">
@@ -25619,7 +26615,7 @@
               <a:buFont typeface="Wingdings" panose="05000000000000000000" pitchFamily="2" charset="2"/>
               <a:buChar char="§"/>
             </a:pPr>
-            <a:endParaRPr dirty="0"/>
+            <a:endParaRPr sz="1600" dirty="0"/>
           </a:p>
         </p:txBody>
       </p:sp>
@@ -26363,204 +27359,6 @@
                 <a:latin typeface="Proxima Nova" panose="020B0604020202020204" charset="0"/>
               </a:rPr>
               <a:t>PCA</a:t>
-            </a:r>
-            <a:endParaRPr lang="es-AR" sz="1050" dirty="0">
-              <a:solidFill>
-                <a:schemeClr val="accent2"/>
-              </a:solidFill>
-              <a:latin typeface="Proxima Nova" panose="020B0604020202020204" charset="0"/>
-            </a:endParaRPr>
-          </a:p>
-        </p:txBody>
-      </p:sp>
-      <p:sp>
-        <p:nvSpPr>
-          <p:cNvPr id="20" name="Hexágono 19">
-            <a:extLst>
-              <a:ext uri="{FF2B5EF4-FFF2-40B4-BE49-F238E27FC236}">
-                <a16:creationId xmlns:a16="http://schemas.microsoft.com/office/drawing/2014/main" id="{C213F2BA-31F1-48E9-92AE-02682E122CBA}"/>
-              </a:ext>
-            </a:extLst>
-          </p:cNvPr>
-          <p:cNvSpPr/>
-          <p:nvPr/>
-        </p:nvSpPr>
-        <p:spPr>
-          <a:xfrm>
-            <a:off x="3003699" y="3935665"/>
-            <a:ext cx="1087946" cy="720000"/>
-          </a:xfrm>
-          <a:prstGeom prst="hexagon">
-            <a:avLst/>
-          </a:prstGeom>
-          <a:noFill/>
-          <a:ln w="19050">
-            <a:solidFill>
-              <a:schemeClr val="tx2"/>
-            </a:solidFill>
-          </a:ln>
-        </p:spPr>
-        <p:style>
-          <a:lnRef idx="2">
-            <a:schemeClr val="accent1">
-              <a:shade val="50000"/>
-            </a:schemeClr>
-          </a:lnRef>
-          <a:fillRef idx="1">
-            <a:schemeClr val="accent1"/>
-          </a:fillRef>
-          <a:effectRef idx="0">
-            <a:schemeClr val="accent1"/>
-          </a:effectRef>
-          <a:fontRef idx="minor">
-            <a:schemeClr val="lt1"/>
-          </a:fontRef>
-        </p:style>
-        <p:txBody>
-          <a:bodyPr rtlCol="0" anchor="ctr"/>
-          <a:lstStyle/>
-          <a:p>
-            <a:pPr algn="ctr"/>
-            <a:r>
-              <a:rPr lang="es-MX" sz="1050" dirty="0">
-                <a:solidFill>
-                  <a:schemeClr val="accent2"/>
-                </a:solidFill>
-                <a:latin typeface="Proxima Nova" panose="020B0604020202020204" charset="0"/>
-              </a:rPr>
-              <a:t>KNN</a:t>
-            </a:r>
-            <a:endParaRPr lang="es-AR" sz="1050" dirty="0">
-              <a:solidFill>
-                <a:schemeClr val="accent2"/>
-              </a:solidFill>
-              <a:latin typeface="Proxima Nova" panose="020B0604020202020204" charset="0"/>
-            </a:endParaRPr>
-          </a:p>
-        </p:txBody>
-      </p:sp>
-      <p:sp>
-        <p:nvSpPr>
-          <p:cNvPr id="21" name="Hexágono 20">
-            <a:extLst>
-              <a:ext uri="{FF2B5EF4-FFF2-40B4-BE49-F238E27FC236}">
-                <a16:creationId xmlns:a16="http://schemas.microsoft.com/office/drawing/2014/main" id="{97216F1F-A4F2-4D04-B1C8-9E2FFD92A4E4}"/>
-              </a:ext>
-            </a:extLst>
-          </p:cNvPr>
-          <p:cNvSpPr/>
-          <p:nvPr/>
-        </p:nvSpPr>
-        <p:spPr>
-          <a:xfrm>
-            <a:off x="4465909" y="3943782"/>
-            <a:ext cx="1087946" cy="720000"/>
-          </a:xfrm>
-          <a:prstGeom prst="hexagon">
-            <a:avLst/>
-          </a:prstGeom>
-          <a:noFill/>
-          <a:ln w="19050">
-            <a:solidFill>
-              <a:schemeClr val="tx2"/>
-            </a:solidFill>
-          </a:ln>
-        </p:spPr>
-        <p:style>
-          <a:lnRef idx="2">
-            <a:schemeClr val="accent1">
-              <a:shade val="50000"/>
-            </a:schemeClr>
-          </a:lnRef>
-          <a:fillRef idx="1">
-            <a:schemeClr val="accent1"/>
-          </a:fillRef>
-          <a:effectRef idx="0">
-            <a:schemeClr val="accent1"/>
-          </a:effectRef>
-          <a:fontRef idx="minor">
-            <a:schemeClr val="lt1"/>
-          </a:fontRef>
-        </p:style>
-        <p:txBody>
-          <a:bodyPr rtlCol="0" anchor="ctr"/>
-          <a:lstStyle/>
-          <a:p>
-            <a:pPr algn="ctr"/>
-            <a:r>
-              <a:rPr lang="es-MX" sz="1050" dirty="0">
-                <a:solidFill>
-                  <a:schemeClr val="accent2"/>
-                </a:solidFill>
-                <a:latin typeface="Proxima Nova" panose="020B0604020202020204" charset="0"/>
-              </a:rPr>
-              <a:t>Regresión logística</a:t>
-            </a:r>
-            <a:endParaRPr lang="es-AR" sz="1050" dirty="0">
-              <a:solidFill>
-                <a:schemeClr val="accent2"/>
-              </a:solidFill>
-              <a:latin typeface="Proxima Nova" panose="020B0604020202020204" charset="0"/>
-            </a:endParaRPr>
-          </a:p>
-        </p:txBody>
-      </p:sp>
-      <p:sp>
-        <p:nvSpPr>
-          <p:cNvPr id="22" name="Hexágono 21">
-            <a:extLst>
-              <a:ext uri="{FF2B5EF4-FFF2-40B4-BE49-F238E27FC236}">
-                <a16:creationId xmlns:a16="http://schemas.microsoft.com/office/drawing/2014/main" id="{9448D5DB-40E2-440C-B311-7317E78E6ED1}"/>
-              </a:ext>
-            </a:extLst>
-          </p:cNvPr>
-          <p:cNvSpPr/>
-          <p:nvPr/>
-        </p:nvSpPr>
-        <p:spPr>
-          <a:xfrm>
-            <a:off x="5594499" y="3943782"/>
-            <a:ext cx="1087946" cy="720000"/>
-          </a:xfrm>
-          <a:prstGeom prst="hexagon">
-            <a:avLst/>
-          </a:prstGeom>
-          <a:noFill/>
-          <a:ln w="19050">
-            <a:solidFill>
-              <a:schemeClr val="tx2"/>
-            </a:solidFill>
-          </a:ln>
-        </p:spPr>
-        <p:style>
-          <a:lnRef idx="2">
-            <a:schemeClr val="accent1">
-              <a:shade val="50000"/>
-            </a:schemeClr>
-          </a:lnRef>
-          <a:fillRef idx="1">
-            <a:schemeClr val="accent1"/>
-          </a:fillRef>
-          <a:effectRef idx="0">
-            <a:schemeClr val="accent1"/>
-          </a:effectRef>
-          <a:fontRef idx="minor">
-            <a:schemeClr val="lt1"/>
-          </a:fontRef>
-        </p:style>
-        <p:txBody>
-          <a:bodyPr rtlCol="0" anchor="ctr"/>
-          <a:lstStyle/>
-          <a:p>
-            <a:pPr algn="ctr"/>
-            <a:r>
-              <a:rPr lang="es-MX" sz="1050" dirty="0">
-                <a:solidFill>
-                  <a:schemeClr val="accent2"/>
-                </a:solidFill>
-                <a:latin typeface="Proxima Nova" panose="020B0604020202020204" charset="0"/>
-              </a:rPr>
-              <a:t>LDA</a:t>
             </a:r>
             <a:endParaRPr lang="es-AR" sz="1050" dirty="0">
               <a:solidFill>
@@ -27162,50 +27960,6 @@
       </p:cxnSp>
       <p:cxnSp>
         <p:nvCxnSpPr>
-          <p:cNvPr id="52" name="Conector recto 51">
-            <a:extLst>
-              <a:ext uri="{FF2B5EF4-FFF2-40B4-BE49-F238E27FC236}">
-                <a16:creationId xmlns:a16="http://schemas.microsoft.com/office/drawing/2014/main" id="{D05382A2-D7D6-4418-91FA-F06975755EFA}"/>
-              </a:ext>
-            </a:extLst>
-          </p:cNvPr>
-          <p:cNvCxnSpPr>
-            <a:cxnSpLocks/>
-            <a:stCxn id="23" idx="2"/>
-          </p:cNvCxnSpPr>
-          <p:nvPr/>
-        </p:nvCxnSpPr>
-        <p:spPr>
-          <a:xfrm>
-            <a:off x="3547672" y="3668258"/>
-            <a:ext cx="0" cy="252000"/>
-          </a:xfrm>
-          <a:prstGeom prst="line">
-            <a:avLst/>
-          </a:prstGeom>
-          <a:ln w="19050">
-            <a:solidFill>
-              <a:schemeClr val="tx2"/>
-            </a:solidFill>
-          </a:ln>
-        </p:spPr>
-        <p:style>
-          <a:lnRef idx="1">
-            <a:schemeClr val="accent1"/>
-          </a:lnRef>
-          <a:fillRef idx="0">
-            <a:schemeClr val="accent1"/>
-          </a:fillRef>
-          <a:effectRef idx="0">
-            <a:schemeClr val="accent1"/>
-          </a:effectRef>
-          <a:fontRef idx="minor">
-            <a:schemeClr val="tx1"/>
-          </a:fontRef>
-        </p:style>
-      </p:cxnSp>
-      <p:cxnSp>
-        <p:nvCxnSpPr>
           <p:cNvPr id="55" name="Conector recto 54">
             <a:extLst>
               <a:ext uri="{FF2B5EF4-FFF2-40B4-BE49-F238E27FC236}">
@@ -27361,6 +28115,451 @@
           <a:ln w="19050">
             <a:solidFill>
               <a:schemeClr val="accent4"/>
+            </a:solidFill>
+          </a:ln>
+        </p:spPr>
+        <p:style>
+          <a:lnRef idx="1">
+            <a:schemeClr val="accent1"/>
+          </a:lnRef>
+          <a:fillRef idx="0">
+            <a:schemeClr val="accent1"/>
+          </a:fillRef>
+          <a:effectRef idx="0">
+            <a:schemeClr val="accent1"/>
+          </a:effectRef>
+          <a:fontRef idx="minor">
+            <a:schemeClr val="tx1"/>
+          </a:fontRef>
+        </p:style>
+      </p:cxnSp>
+      <p:sp>
+        <p:nvSpPr>
+          <p:cNvPr id="32" name="Hexágono 31">
+            <a:extLst>
+              <a:ext uri="{FF2B5EF4-FFF2-40B4-BE49-F238E27FC236}">
+                <a16:creationId xmlns:a16="http://schemas.microsoft.com/office/drawing/2014/main" id="{A78DF77B-EFC4-4CCD-B18D-08C8C8F8473D}"/>
+              </a:ext>
+            </a:extLst>
+          </p:cNvPr>
+          <p:cNvSpPr/>
+          <p:nvPr/>
+        </p:nvSpPr>
+        <p:spPr>
+          <a:xfrm>
+            <a:off x="2231068" y="3939723"/>
+            <a:ext cx="1087946" cy="720000"/>
+          </a:xfrm>
+          <a:prstGeom prst="hexagon">
+            <a:avLst/>
+          </a:prstGeom>
+          <a:noFill/>
+          <a:ln w="28575">
+            <a:solidFill>
+              <a:srgbClr val="63D297"/>
+            </a:solidFill>
+          </a:ln>
+        </p:spPr>
+        <p:style>
+          <a:lnRef idx="2">
+            <a:schemeClr val="accent1">
+              <a:shade val="50000"/>
+            </a:schemeClr>
+          </a:lnRef>
+          <a:fillRef idx="1">
+            <a:schemeClr val="accent1"/>
+          </a:fillRef>
+          <a:effectRef idx="0">
+            <a:schemeClr val="accent1"/>
+          </a:effectRef>
+          <a:fontRef idx="minor">
+            <a:schemeClr val="lt1"/>
+          </a:fontRef>
+        </p:style>
+        <p:txBody>
+          <a:bodyPr rtlCol="0" anchor="ctr"/>
+          <a:lstStyle/>
+          <a:p>
+            <a:pPr algn="ctr"/>
+            <a:r>
+              <a:rPr lang="es-MX" sz="1050">
+                <a:solidFill>
+                  <a:schemeClr val="accent2"/>
+                </a:solidFill>
+                <a:latin typeface="Proxima Nova" panose="020B0604020202020204" charset="0"/>
+              </a:rPr>
+              <a:t>KNN</a:t>
+            </a:r>
+            <a:endParaRPr lang="es-AR" sz="1050" dirty="0">
+              <a:solidFill>
+                <a:schemeClr val="accent2"/>
+              </a:solidFill>
+              <a:latin typeface="Proxima Nova" panose="020B0604020202020204" charset="0"/>
+            </a:endParaRPr>
+          </a:p>
+        </p:txBody>
+      </p:sp>
+      <p:sp>
+        <p:nvSpPr>
+          <p:cNvPr id="34" name="Hexágono 33">
+            <a:extLst>
+              <a:ext uri="{FF2B5EF4-FFF2-40B4-BE49-F238E27FC236}">
+                <a16:creationId xmlns:a16="http://schemas.microsoft.com/office/drawing/2014/main" id="{2FD35B72-9731-44C8-9702-7B02D2407CF5}"/>
+              </a:ext>
+            </a:extLst>
+          </p:cNvPr>
+          <p:cNvSpPr/>
+          <p:nvPr/>
+        </p:nvSpPr>
+        <p:spPr>
+          <a:xfrm>
+            <a:off x="4465909" y="3939723"/>
+            <a:ext cx="1087946" cy="720000"/>
+          </a:xfrm>
+          <a:prstGeom prst="hexagon">
+            <a:avLst/>
+          </a:prstGeom>
+          <a:noFill/>
+          <a:ln w="28575">
+            <a:solidFill>
+              <a:schemeClr val="tx2"/>
+            </a:solidFill>
+          </a:ln>
+        </p:spPr>
+        <p:style>
+          <a:lnRef idx="2">
+            <a:schemeClr val="accent1">
+              <a:shade val="50000"/>
+            </a:schemeClr>
+          </a:lnRef>
+          <a:fillRef idx="1">
+            <a:schemeClr val="accent1"/>
+          </a:fillRef>
+          <a:effectRef idx="0">
+            <a:schemeClr val="accent1"/>
+          </a:effectRef>
+          <a:fontRef idx="minor">
+            <a:schemeClr val="lt1"/>
+          </a:fontRef>
+        </p:style>
+        <p:txBody>
+          <a:bodyPr rtlCol="0" anchor="ctr"/>
+          <a:lstStyle/>
+          <a:p>
+            <a:pPr algn="ctr"/>
+            <a:r>
+              <a:rPr lang="es-MX" sz="1050" dirty="0">
+                <a:solidFill>
+                  <a:schemeClr val="accent2"/>
+                </a:solidFill>
+                <a:latin typeface="Proxima Nova" panose="020B0604020202020204" charset="0"/>
+              </a:rPr>
+              <a:t>Regresión logística</a:t>
+            </a:r>
+            <a:endParaRPr lang="es-AR" sz="1050" dirty="0">
+              <a:solidFill>
+                <a:schemeClr val="accent2"/>
+              </a:solidFill>
+              <a:latin typeface="Proxima Nova" panose="020B0604020202020204" charset="0"/>
+            </a:endParaRPr>
+          </a:p>
+        </p:txBody>
+      </p:sp>
+      <p:sp>
+        <p:nvSpPr>
+          <p:cNvPr id="35" name="Hexágono 34">
+            <a:extLst>
+              <a:ext uri="{FF2B5EF4-FFF2-40B4-BE49-F238E27FC236}">
+                <a16:creationId xmlns:a16="http://schemas.microsoft.com/office/drawing/2014/main" id="{E6DBC3B9-349D-44B6-A3CD-27783E182BBB}"/>
+              </a:ext>
+            </a:extLst>
+          </p:cNvPr>
+          <p:cNvSpPr/>
+          <p:nvPr/>
+        </p:nvSpPr>
+        <p:spPr>
+          <a:xfrm>
+            <a:off x="5594499" y="3939723"/>
+            <a:ext cx="1087946" cy="720000"/>
+          </a:xfrm>
+          <a:prstGeom prst="hexagon">
+            <a:avLst/>
+          </a:prstGeom>
+          <a:noFill/>
+          <a:ln w="28575">
+            <a:solidFill>
+              <a:srgbClr val="63D297"/>
+            </a:solidFill>
+          </a:ln>
+        </p:spPr>
+        <p:style>
+          <a:lnRef idx="2">
+            <a:schemeClr val="accent1">
+              <a:shade val="50000"/>
+            </a:schemeClr>
+          </a:lnRef>
+          <a:fillRef idx="1">
+            <a:schemeClr val="accent1"/>
+          </a:fillRef>
+          <a:effectRef idx="0">
+            <a:schemeClr val="accent1"/>
+          </a:effectRef>
+          <a:fontRef idx="minor">
+            <a:schemeClr val="lt1"/>
+          </a:fontRef>
+        </p:style>
+        <p:txBody>
+          <a:bodyPr rtlCol="0" anchor="ctr"/>
+          <a:lstStyle/>
+          <a:p>
+            <a:pPr algn="ctr"/>
+            <a:r>
+              <a:rPr lang="es-MX" sz="1050" dirty="0">
+                <a:solidFill>
+                  <a:schemeClr val="accent2"/>
+                </a:solidFill>
+                <a:latin typeface="Proxima Nova" panose="020B0604020202020204" charset="0"/>
+              </a:rPr>
+              <a:t>LDA/QDA</a:t>
+            </a:r>
+            <a:endParaRPr lang="es-AR" sz="1050" dirty="0">
+              <a:solidFill>
+                <a:schemeClr val="accent2"/>
+              </a:solidFill>
+              <a:latin typeface="Proxima Nova" panose="020B0604020202020204" charset="0"/>
+            </a:endParaRPr>
+          </a:p>
+        </p:txBody>
+      </p:sp>
+      <p:cxnSp>
+        <p:nvCxnSpPr>
+          <p:cNvPr id="37" name="Conector recto 36">
+            <a:extLst>
+              <a:ext uri="{FF2B5EF4-FFF2-40B4-BE49-F238E27FC236}">
+                <a16:creationId xmlns:a16="http://schemas.microsoft.com/office/drawing/2014/main" id="{B8981D67-8D8A-49B9-BD78-B0097DA717E4}"/>
+              </a:ext>
+            </a:extLst>
+          </p:cNvPr>
+          <p:cNvCxnSpPr>
+            <a:cxnSpLocks/>
+          </p:cNvCxnSpPr>
+          <p:nvPr/>
+        </p:nvCxnSpPr>
+        <p:spPr>
+          <a:xfrm flipH="1">
+            <a:off x="2785730" y="3668258"/>
+            <a:ext cx="761942" cy="258700"/>
+          </a:xfrm>
+          <a:prstGeom prst="line">
+            <a:avLst/>
+          </a:prstGeom>
+          <a:ln w="19050">
+            <a:solidFill>
+              <a:schemeClr val="tx2"/>
+            </a:solidFill>
+          </a:ln>
+        </p:spPr>
+        <p:style>
+          <a:lnRef idx="1">
+            <a:schemeClr val="accent1"/>
+          </a:lnRef>
+          <a:fillRef idx="0">
+            <a:schemeClr val="accent1"/>
+          </a:fillRef>
+          <a:effectRef idx="0">
+            <a:schemeClr val="accent1"/>
+          </a:effectRef>
+          <a:fontRef idx="minor">
+            <a:schemeClr val="tx1"/>
+          </a:fontRef>
+        </p:style>
+      </p:cxnSp>
+      <p:cxnSp>
+        <p:nvCxnSpPr>
+          <p:cNvPr id="38" name="Conector recto 37">
+            <a:extLst>
+              <a:ext uri="{FF2B5EF4-FFF2-40B4-BE49-F238E27FC236}">
+                <a16:creationId xmlns:a16="http://schemas.microsoft.com/office/drawing/2014/main" id="{8675A32A-54E3-49E2-B6EA-F57A43BAE636}"/>
+              </a:ext>
+            </a:extLst>
+          </p:cNvPr>
+          <p:cNvCxnSpPr>
+            <a:cxnSpLocks/>
+          </p:cNvCxnSpPr>
+          <p:nvPr/>
+        </p:nvCxnSpPr>
+        <p:spPr>
+          <a:xfrm flipH="1">
+            <a:off x="5009882" y="3666366"/>
+            <a:ext cx="526486" cy="275524"/>
+          </a:xfrm>
+          <a:prstGeom prst="line">
+            <a:avLst/>
+          </a:prstGeom>
+          <a:ln w="19050">
+            <a:solidFill>
+              <a:schemeClr val="tx2"/>
+            </a:solidFill>
+          </a:ln>
+        </p:spPr>
+        <p:style>
+          <a:lnRef idx="1">
+            <a:schemeClr val="accent1"/>
+          </a:lnRef>
+          <a:fillRef idx="0">
+            <a:schemeClr val="accent1"/>
+          </a:fillRef>
+          <a:effectRef idx="0">
+            <a:schemeClr val="accent1"/>
+          </a:effectRef>
+          <a:fontRef idx="minor">
+            <a:schemeClr val="tx1"/>
+          </a:fontRef>
+        </p:style>
+      </p:cxnSp>
+      <p:cxnSp>
+        <p:nvCxnSpPr>
+          <p:cNvPr id="40" name="Conector recto 39">
+            <a:extLst>
+              <a:ext uri="{FF2B5EF4-FFF2-40B4-BE49-F238E27FC236}">
+                <a16:creationId xmlns:a16="http://schemas.microsoft.com/office/drawing/2014/main" id="{9F9FEDC0-CDA9-4CE1-9A4B-598AD14A98F1}"/>
+              </a:ext>
+            </a:extLst>
+          </p:cNvPr>
+          <p:cNvCxnSpPr>
+            <a:cxnSpLocks/>
+          </p:cNvCxnSpPr>
+          <p:nvPr/>
+        </p:nvCxnSpPr>
+        <p:spPr>
+          <a:xfrm>
+            <a:off x="5536368" y="3666366"/>
+            <a:ext cx="602104" cy="275524"/>
+          </a:xfrm>
+          <a:prstGeom prst="line">
+            <a:avLst/>
+          </a:prstGeom>
+          <a:ln w="19050">
+            <a:solidFill>
+              <a:schemeClr val="tx2"/>
+            </a:solidFill>
+          </a:ln>
+        </p:spPr>
+        <p:style>
+          <a:lnRef idx="1">
+            <a:schemeClr val="accent1"/>
+          </a:lnRef>
+          <a:fillRef idx="0">
+            <a:schemeClr val="accent1"/>
+          </a:fillRef>
+          <a:effectRef idx="0">
+            <a:schemeClr val="accent1"/>
+          </a:effectRef>
+          <a:fontRef idx="minor">
+            <a:schemeClr val="tx1"/>
+          </a:fontRef>
+        </p:style>
+      </p:cxnSp>
+      <p:sp>
+        <p:nvSpPr>
+          <p:cNvPr id="41" name="Hexágono 40">
+            <a:extLst>
+              <a:ext uri="{FF2B5EF4-FFF2-40B4-BE49-F238E27FC236}">
+                <a16:creationId xmlns:a16="http://schemas.microsoft.com/office/drawing/2014/main" id="{600AE671-9102-4D07-9D99-A2B2F249718C}"/>
+              </a:ext>
+            </a:extLst>
+          </p:cNvPr>
+          <p:cNvSpPr/>
+          <p:nvPr/>
+        </p:nvSpPr>
+        <p:spPr>
+          <a:xfrm>
+            <a:off x="3348488" y="3939723"/>
+            <a:ext cx="1087946" cy="720000"/>
+          </a:xfrm>
+          <a:prstGeom prst="hexagon">
+            <a:avLst/>
+          </a:prstGeom>
+          <a:noFill/>
+          <a:ln w="28575">
+            <a:solidFill>
+              <a:srgbClr val="63D297"/>
+            </a:solidFill>
+          </a:ln>
+        </p:spPr>
+        <p:style>
+          <a:lnRef idx="2">
+            <a:schemeClr val="accent1">
+              <a:shade val="50000"/>
+            </a:schemeClr>
+          </a:lnRef>
+          <a:fillRef idx="1">
+            <a:schemeClr val="accent1"/>
+          </a:fillRef>
+          <a:effectRef idx="0">
+            <a:schemeClr val="accent1"/>
+          </a:effectRef>
+          <a:fontRef idx="minor">
+            <a:schemeClr val="lt1"/>
+          </a:fontRef>
+        </p:style>
+        <p:txBody>
+          <a:bodyPr rtlCol="0" anchor="ctr"/>
+          <a:lstStyle/>
+          <a:p>
+            <a:pPr algn="ctr"/>
+            <a:r>
+              <a:rPr lang="es-MX" sz="1050" dirty="0" err="1">
+                <a:solidFill>
+                  <a:schemeClr val="accent2"/>
+                </a:solidFill>
+                <a:latin typeface="Proxima Nova" panose="020B0604020202020204" charset="0"/>
+              </a:rPr>
+              <a:t>Naive</a:t>
+            </a:r>
+            <a:r>
+              <a:rPr lang="es-MX" sz="1050" dirty="0">
+                <a:solidFill>
+                  <a:schemeClr val="accent2"/>
+                </a:solidFill>
+                <a:latin typeface="Proxima Nova" panose="020B0604020202020204" charset="0"/>
+              </a:rPr>
+              <a:t> Bayes</a:t>
+            </a:r>
+            <a:endParaRPr lang="es-AR" sz="1050" dirty="0">
+              <a:solidFill>
+                <a:schemeClr val="accent2"/>
+              </a:solidFill>
+              <a:latin typeface="Proxima Nova" panose="020B0604020202020204" charset="0"/>
+            </a:endParaRPr>
+          </a:p>
+        </p:txBody>
+      </p:sp>
+      <p:cxnSp>
+        <p:nvCxnSpPr>
+          <p:cNvPr id="43" name="Conector recto 42">
+            <a:extLst>
+              <a:ext uri="{FF2B5EF4-FFF2-40B4-BE49-F238E27FC236}">
+                <a16:creationId xmlns:a16="http://schemas.microsoft.com/office/drawing/2014/main" id="{4347F2AA-0FB1-458F-B77F-5E9896EC7F19}"/>
+              </a:ext>
+            </a:extLst>
+          </p:cNvPr>
+          <p:cNvCxnSpPr>
+            <a:cxnSpLocks/>
+          </p:cNvCxnSpPr>
+          <p:nvPr/>
+        </p:nvCxnSpPr>
+        <p:spPr>
+          <a:xfrm>
+            <a:off x="3547672" y="3668258"/>
+            <a:ext cx="344789" cy="270528"/>
+          </a:xfrm>
+          <a:prstGeom prst="line">
+            <a:avLst/>
+          </a:prstGeom>
+          <a:ln w="19050">
+            <a:solidFill>
+              <a:schemeClr val="tx2"/>
             </a:solidFill>
           </a:ln>
         </p:spPr>
@@ -30709,204 +31908,6 @@
       </p:sp>
       <p:sp>
         <p:nvSpPr>
-          <p:cNvPr id="13" name="Hexágono 12">
-            <a:extLst>
-              <a:ext uri="{FF2B5EF4-FFF2-40B4-BE49-F238E27FC236}">
-                <a16:creationId xmlns:a16="http://schemas.microsoft.com/office/drawing/2014/main" id="{87055901-142D-43D4-B0B5-439E3B7DFE24}"/>
-              </a:ext>
-            </a:extLst>
-          </p:cNvPr>
-          <p:cNvSpPr/>
-          <p:nvPr/>
-        </p:nvSpPr>
-        <p:spPr>
-          <a:xfrm>
-            <a:off x="3813168" y="4258723"/>
-            <a:ext cx="1087946" cy="720000"/>
-          </a:xfrm>
-          <a:prstGeom prst="hexagon">
-            <a:avLst/>
-          </a:prstGeom>
-          <a:noFill/>
-          <a:ln w="12700">
-            <a:solidFill>
-              <a:schemeClr val="accent4"/>
-            </a:solidFill>
-          </a:ln>
-        </p:spPr>
-        <p:style>
-          <a:lnRef idx="2">
-            <a:schemeClr val="accent1">
-              <a:shade val="50000"/>
-            </a:schemeClr>
-          </a:lnRef>
-          <a:fillRef idx="1">
-            <a:schemeClr val="accent1"/>
-          </a:fillRef>
-          <a:effectRef idx="0">
-            <a:schemeClr val="accent1"/>
-          </a:effectRef>
-          <a:fontRef idx="minor">
-            <a:schemeClr val="lt1"/>
-          </a:fontRef>
-        </p:style>
-        <p:txBody>
-          <a:bodyPr rtlCol="0" anchor="ctr"/>
-          <a:lstStyle/>
-          <a:p>
-            <a:pPr algn="ctr"/>
-            <a:r>
-              <a:rPr lang="es-MX" sz="1050" dirty="0">
-                <a:solidFill>
-                  <a:schemeClr val="accent2"/>
-                </a:solidFill>
-                <a:latin typeface="Proxima Nova" panose="020B0604020202020204" charset="0"/>
-              </a:rPr>
-              <a:t>Regresión logística</a:t>
-            </a:r>
-            <a:endParaRPr lang="es-AR" sz="1050" dirty="0">
-              <a:solidFill>
-                <a:schemeClr val="accent2"/>
-              </a:solidFill>
-              <a:latin typeface="Proxima Nova" panose="020B0604020202020204" charset="0"/>
-            </a:endParaRPr>
-          </a:p>
-        </p:txBody>
-      </p:sp>
-      <p:sp>
-        <p:nvSpPr>
-          <p:cNvPr id="14" name="Hexágono 13">
-            <a:extLst>
-              <a:ext uri="{FF2B5EF4-FFF2-40B4-BE49-F238E27FC236}">
-                <a16:creationId xmlns:a16="http://schemas.microsoft.com/office/drawing/2014/main" id="{6A4D064D-467B-4E97-9812-6CD3BD98E5FE}"/>
-              </a:ext>
-            </a:extLst>
-          </p:cNvPr>
-          <p:cNvSpPr/>
-          <p:nvPr/>
-        </p:nvSpPr>
-        <p:spPr>
-          <a:xfrm>
-            <a:off x="5275378" y="4266840"/>
-            <a:ext cx="1087946" cy="720000"/>
-          </a:xfrm>
-          <a:prstGeom prst="hexagon">
-            <a:avLst/>
-          </a:prstGeom>
-          <a:noFill/>
-          <a:ln w="12700">
-            <a:solidFill>
-              <a:schemeClr val="accent4"/>
-            </a:solidFill>
-          </a:ln>
-        </p:spPr>
-        <p:style>
-          <a:lnRef idx="2">
-            <a:schemeClr val="accent1">
-              <a:shade val="50000"/>
-            </a:schemeClr>
-          </a:lnRef>
-          <a:fillRef idx="1">
-            <a:schemeClr val="accent1"/>
-          </a:fillRef>
-          <a:effectRef idx="0">
-            <a:schemeClr val="accent1"/>
-          </a:effectRef>
-          <a:fontRef idx="minor">
-            <a:schemeClr val="lt1"/>
-          </a:fontRef>
-        </p:style>
-        <p:txBody>
-          <a:bodyPr rtlCol="0" anchor="ctr"/>
-          <a:lstStyle/>
-          <a:p>
-            <a:pPr algn="ctr"/>
-            <a:r>
-              <a:rPr lang="es-MX" sz="1050" dirty="0">
-                <a:solidFill>
-                  <a:schemeClr val="accent2"/>
-                </a:solidFill>
-                <a:latin typeface="Proxima Nova" panose="020B0604020202020204" charset="0"/>
-              </a:rPr>
-              <a:t>KNN</a:t>
-            </a:r>
-            <a:endParaRPr lang="es-AR" sz="1050" dirty="0">
-              <a:solidFill>
-                <a:schemeClr val="accent2"/>
-              </a:solidFill>
-              <a:latin typeface="Proxima Nova" panose="020B0604020202020204" charset="0"/>
-            </a:endParaRPr>
-          </a:p>
-        </p:txBody>
-      </p:sp>
-      <p:sp>
-        <p:nvSpPr>
-          <p:cNvPr id="15" name="Hexágono 14">
-            <a:extLst>
-              <a:ext uri="{FF2B5EF4-FFF2-40B4-BE49-F238E27FC236}">
-                <a16:creationId xmlns:a16="http://schemas.microsoft.com/office/drawing/2014/main" id="{EB39AD5A-03F2-404C-95A9-4200975E0D00}"/>
-              </a:ext>
-            </a:extLst>
-          </p:cNvPr>
-          <p:cNvSpPr/>
-          <p:nvPr/>
-        </p:nvSpPr>
-        <p:spPr>
-          <a:xfrm>
-            <a:off x="6403968" y="4266840"/>
-            <a:ext cx="1087946" cy="720000"/>
-          </a:xfrm>
-          <a:prstGeom prst="hexagon">
-            <a:avLst/>
-          </a:prstGeom>
-          <a:noFill/>
-          <a:ln w="12700">
-            <a:solidFill>
-              <a:schemeClr val="accent4"/>
-            </a:solidFill>
-          </a:ln>
-        </p:spPr>
-        <p:style>
-          <a:lnRef idx="2">
-            <a:schemeClr val="accent1">
-              <a:shade val="50000"/>
-            </a:schemeClr>
-          </a:lnRef>
-          <a:fillRef idx="1">
-            <a:schemeClr val="accent1"/>
-          </a:fillRef>
-          <a:effectRef idx="0">
-            <a:schemeClr val="accent1"/>
-          </a:effectRef>
-          <a:fontRef idx="minor">
-            <a:schemeClr val="lt1"/>
-          </a:fontRef>
-        </p:style>
-        <p:txBody>
-          <a:bodyPr rtlCol="0" anchor="ctr"/>
-          <a:lstStyle/>
-          <a:p>
-            <a:pPr algn="ctr"/>
-            <a:r>
-              <a:rPr lang="es-MX" sz="1050" dirty="0">
-                <a:solidFill>
-                  <a:schemeClr val="accent2"/>
-                </a:solidFill>
-                <a:latin typeface="Proxima Nova" panose="020B0604020202020204" charset="0"/>
-              </a:rPr>
-              <a:t>LDA</a:t>
-            </a:r>
-            <a:endParaRPr lang="es-AR" sz="1050" dirty="0">
-              <a:solidFill>
-                <a:schemeClr val="accent2"/>
-              </a:solidFill>
-              <a:latin typeface="Proxima Nova" panose="020B0604020202020204" charset="0"/>
-            </a:endParaRPr>
-          </a:p>
-        </p:txBody>
-      </p:sp>
-      <p:sp>
-        <p:nvSpPr>
           <p:cNvPr id="16" name="Rectángulo: esquinas redondeadas 15">
             <a:extLst>
               <a:ext uri="{FF2B5EF4-FFF2-40B4-BE49-F238E27FC236}">
@@ -31304,30 +32305,227 @@
           </a:fontRef>
         </p:style>
       </p:cxnSp>
+      <p:sp>
+        <p:nvSpPr>
+          <p:cNvPr id="24" name="Hexágono 23">
+            <a:extLst>
+              <a:ext uri="{FF2B5EF4-FFF2-40B4-BE49-F238E27FC236}">
+                <a16:creationId xmlns:a16="http://schemas.microsoft.com/office/drawing/2014/main" id="{5455315B-4A23-4718-9123-97F5ED54EE89}"/>
+              </a:ext>
+            </a:extLst>
+          </p:cNvPr>
+          <p:cNvSpPr/>
+          <p:nvPr/>
+        </p:nvSpPr>
+        <p:spPr>
+          <a:xfrm>
+            <a:off x="3066175" y="4267866"/>
+            <a:ext cx="1087946" cy="720000"/>
+          </a:xfrm>
+          <a:prstGeom prst="hexagon">
+            <a:avLst/>
+          </a:prstGeom>
+          <a:noFill/>
+          <a:ln w="12700">
+            <a:solidFill>
+              <a:schemeClr val="accent4"/>
+            </a:solidFill>
+          </a:ln>
+        </p:spPr>
+        <p:style>
+          <a:lnRef idx="2">
+            <a:schemeClr val="accent1">
+              <a:shade val="50000"/>
+            </a:schemeClr>
+          </a:lnRef>
+          <a:fillRef idx="1">
+            <a:schemeClr val="accent1"/>
+          </a:fillRef>
+          <a:effectRef idx="0">
+            <a:schemeClr val="accent1"/>
+          </a:effectRef>
+          <a:fontRef idx="minor">
+            <a:schemeClr val="lt1"/>
+          </a:fontRef>
+        </p:style>
+        <p:txBody>
+          <a:bodyPr rtlCol="0" anchor="ctr"/>
+          <a:lstStyle/>
+          <a:p>
+            <a:pPr algn="ctr"/>
+            <a:r>
+              <a:rPr lang="es-MX" sz="1050">
+                <a:solidFill>
+                  <a:schemeClr val="accent2"/>
+                </a:solidFill>
+                <a:latin typeface="Proxima Nova" panose="020B0604020202020204" charset="0"/>
+              </a:rPr>
+              <a:t>KNN</a:t>
+            </a:r>
+            <a:endParaRPr lang="es-AR" sz="1050" dirty="0">
+              <a:solidFill>
+                <a:schemeClr val="accent2"/>
+              </a:solidFill>
+              <a:latin typeface="Proxima Nova" panose="020B0604020202020204" charset="0"/>
+            </a:endParaRPr>
+          </a:p>
+        </p:txBody>
+      </p:sp>
+      <p:sp>
+        <p:nvSpPr>
+          <p:cNvPr id="25" name="Hexágono 24">
+            <a:extLst>
+              <a:ext uri="{FF2B5EF4-FFF2-40B4-BE49-F238E27FC236}">
+                <a16:creationId xmlns:a16="http://schemas.microsoft.com/office/drawing/2014/main" id="{7C430AB4-E5A6-4EA1-9AE1-12E6F6E54DE7}"/>
+              </a:ext>
+            </a:extLst>
+          </p:cNvPr>
+          <p:cNvSpPr/>
+          <p:nvPr/>
+        </p:nvSpPr>
+        <p:spPr>
+          <a:xfrm>
+            <a:off x="5301016" y="4267866"/>
+            <a:ext cx="1087946" cy="720000"/>
+          </a:xfrm>
+          <a:prstGeom prst="hexagon">
+            <a:avLst/>
+          </a:prstGeom>
+          <a:noFill/>
+          <a:ln w="12700">
+            <a:solidFill>
+              <a:schemeClr val="accent4"/>
+            </a:solidFill>
+          </a:ln>
+        </p:spPr>
+        <p:style>
+          <a:lnRef idx="2">
+            <a:schemeClr val="accent1">
+              <a:shade val="50000"/>
+            </a:schemeClr>
+          </a:lnRef>
+          <a:fillRef idx="1">
+            <a:schemeClr val="accent1"/>
+          </a:fillRef>
+          <a:effectRef idx="0">
+            <a:schemeClr val="accent1"/>
+          </a:effectRef>
+          <a:fontRef idx="minor">
+            <a:schemeClr val="lt1"/>
+          </a:fontRef>
+        </p:style>
+        <p:txBody>
+          <a:bodyPr rtlCol="0" anchor="ctr"/>
+          <a:lstStyle/>
+          <a:p>
+            <a:pPr algn="ctr"/>
+            <a:r>
+              <a:rPr lang="es-MX" sz="1050" dirty="0">
+                <a:solidFill>
+                  <a:schemeClr val="accent2"/>
+                </a:solidFill>
+                <a:latin typeface="Proxima Nova" panose="020B0604020202020204" charset="0"/>
+              </a:rPr>
+              <a:t>Regresión logística</a:t>
+            </a:r>
+            <a:endParaRPr lang="es-AR" sz="1050" dirty="0">
+              <a:solidFill>
+                <a:schemeClr val="accent2"/>
+              </a:solidFill>
+              <a:latin typeface="Proxima Nova" panose="020B0604020202020204" charset="0"/>
+            </a:endParaRPr>
+          </a:p>
+        </p:txBody>
+      </p:sp>
+      <p:sp>
+        <p:nvSpPr>
+          <p:cNvPr id="31" name="Hexágono 30">
+            <a:extLst>
+              <a:ext uri="{FF2B5EF4-FFF2-40B4-BE49-F238E27FC236}">
+                <a16:creationId xmlns:a16="http://schemas.microsoft.com/office/drawing/2014/main" id="{C2F20E83-6A15-4642-8DD4-8FC50FB8E0E9}"/>
+              </a:ext>
+            </a:extLst>
+          </p:cNvPr>
+          <p:cNvSpPr/>
+          <p:nvPr/>
+        </p:nvSpPr>
+        <p:spPr>
+          <a:xfrm>
+            <a:off x="6429606" y="4267866"/>
+            <a:ext cx="1087946" cy="720000"/>
+          </a:xfrm>
+          <a:prstGeom prst="hexagon">
+            <a:avLst/>
+          </a:prstGeom>
+          <a:noFill/>
+          <a:ln w="12700">
+            <a:solidFill>
+              <a:schemeClr val="accent4"/>
+            </a:solidFill>
+          </a:ln>
+        </p:spPr>
+        <p:style>
+          <a:lnRef idx="2">
+            <a:schemeClr val="accent1">
+              <a:shade val="50000"/>
+            </a:schemeClr>
+          </a:lnRef>
+          <a:fillRef idx="1">
+            <a:schemeClr val="accent1"/>
+          </a:fillRef>
+          <a:effectRef idx="0">
+            <a:schemeClr val="accent1"/>
+          </a:effectRef>
+          <a:fontRef idx="minor">
+            <a:schemeClr val="lt1"/>
+          </a:fontRef>
+        </p:style>
+        <p:txBody>
+          <a:bodyPr rtlCol="0" anchor="ctr"/>
+          <a:lstStyle/>
+          <a:p>
+            <a:pPr algn="ctr"/>
+            <a:r>
+              <a:rPr lang="es-MX" sz="1050" dirty="0">
+                <a:solidFill>
+                  <a:schemeClr val="accent2"/>
+                </a:solidFill>
+                <a:latin typeface="Proxima Nova" panose="020B0604020202020204" charset="0"/>
+              </a:rPr>
+              <a:t>LDA/QDA</a:t>
+            </a:r>
+            <a:endParaRPr lang="es-AR" sz="1050" dirty="0">
+              <a:solidFill>
+                <a:schemeClr val="accent2"/>
+              </a:solidFill>
+              <a:latin typeface="Proxima Nova" panose="020B0604020202020204" charset="0"/>
+            </a:endParaRPr>
+          </a:p>
+        </p:txBody>
+      </p:sp>
       <p:cxnSp>
         <p:nvCxnSpPr>
-          <p:cNvPr id="28" name="Conector recto 27">
+          <p:cNvPr id="32" name="Conector recto 31">
             <a:extLst>
               <a:ext uri="{FF2B5EF4-FFF2-40B4-BE49-F238E27FC236}">
-                <a16:creationId xmlns:a16="http://schemas.microsoft.com/office/drawing/2014/main" id="{610EB4CE-F79D-42A8-8EBA-0FE012C04690}"/>
+                <a16:creationId xmlns:a16="http://schemas.microsoft.com/office/drawing/2014/main" id="{C3B00572-02A2-4E3D-82BC-B75D70701367}"/>
               </a:ext>
             </a:extLst>
           </p:cNvPr>
           <p:cNvCxnSpPr>
             <a:cxnSpLocks/>
-            <a:stCxn id="16" idx="2"/>
           </p:cNvCxnSpPr>
           <p:nvPr/>
         </p:nvCxnSpPr>
         <p:spPr>
-          <a:xfrm>
-            <a:off x="4357141" y="3991316"/>
-            <a:ext cx="0" cy="252000"/>
+          <a:xfrm flipH="1">
+            <a:off x="3620837" y="3996401"/>
+            <a:ext cx="761942" cy="258700"/>
           </a:xfrm>
           <a:prstGeom prst="line">
             <a:avLst/>
           </a:prstGeom>
-          <a:ln>
+          <a:ln w="12700">
             <a:solidFill>
               <a:schemeClr val="accent4"/>
             </a:solidFill>
@@ -31350,28 +32548,27 @@
       </p:cxnSp>
       <p:cxnSp>
         <p:nvCxnSpPr>
-          <p:cNvPr id="29" name="Conector recto 28">
+          <p:cNvPr id="33" name="Conector recto 32">
             <a:extLst>
               <a:ext uri="{FF2B5EF4-FFF2-40B4-BE49-F238E27FC236}">
-                <a16:creationId xmlns:a16="http://schemas.microsoft.com/office/drawing/2014/main" id="{7CCBC5D3-5241-478B-AA82-4AF6A45F260E}"/>
+                <a16:creationId xmlns:a16="http://schemas.microsoft.com/office/drawing/2014/main" id="{7B528CE7-A62C-4D23-91CA-A1E7496E1C13}"/>
               </a:ext>
             </a:extLst>
           </p:cNvPr>
           <p:cNvCxnSpPr>
             <a:cxnSpLocks/>
-            <a:stCxn id="17" idx="2"/>
           </p:cNvCxnSpPr>
           <p:nvPr/>
         </p:nvCxnSpPr>
         <p:spPr>
           <a:xfrm flipH="1">
-            <a:off x="5819351" y="3989424"/>
+            <a:off x="5844989" y="3994509"/>
             <a:ext cx="526486" cy="275524"/>
           </a:xfrm>
           <a:prstGeom prst="line">
             <a:avLst/>
           </a:prstGeom>
-          <a:ln>
+          <a:ln w="12700">
             <a:solidFill>
               <a:schemeClr val="accent4"/>
             </a:solidFill>
@@ -31394,28 +32591,145 @@
       </p:cxnSp>
       <p:cxnSp>
         <p:nvCxnSpPr>
-          <p:cNvPr id="30" name="Conector recto 29">
+          <p:cNvPr id="34" name="Conector recto 33">
             <a:extLst>
               <a:ext uri="{FF2B5EF4-FFF2-40B4-BE49-F238E27FC236}">
-                <a16:creationId xmlns:a16="http://schemas.microsoft.com/office/drawing/2014/main" id="{CF13F4FE-DE31-406D-BF99-274460C2FBE7}"/>
+                <a16:creationId xmlns:a16="http://schemas.microsoft.com/office/drawing/2014/main" id="{E1B8A249-27E5-4733-AD75-54A6F6E2E898}"/>
               </a:ext>
             </a:extLst>
           </p:cNvPr>
           <p:cNvCxnSpPr>
             <a:cxnSpLocks/>
-            <a:stCxn id="17" idx="2"/>
           </p:cNvCxnSpPr>
           <p:nvPr/>
         </p:nvCxnSpPr>
         <p:spPr>
           <a:xfrm>
-            <a:off x="6345837" y="3989424"/>
+            <a:off x="6371475" y="3994509"/>
             <a:ext cx="602104" cy="275524"/>
           </a:xfrm>
           <a:prstGeom prst="line">
             <a:avLst/>
           </a:prstGeom>
-          <a:ln>
+          <a:ln w="12700">
+            <a:solidFill>
+              <a:schemeClr val="accent4"/>
+            </a:solidFill>
+          </a:ln>
+        </p:spPr>
+        <p:style>
+          <a:lnRef idx="1">
+            <a:schemeClr val="accent1"/>
+          </a:lnRef>
+          <a:fillRef idx="0">
+            <a:schemeClr val="accent1"/>
+          </a:fillRef>
+          <a:effectRef idx="0">
+            <a:schemeClr val="accent1"/>
+          </a:effectRef>
+          <a:fontRef idx="minor">
+            <a:schemeClr val="tx1"/>
+          </a:fontRef>
+        </p:style>
+      </p:cxnSp>
+      <p:sp>
+        <p:nvSpPr>
+          <p:cNvPr id="35" name="Hexágono 34">
+            <a:extLst>
+              <a:ext uri="{FF2B5EF4-FFF2-40B4-BE49-F238E27FC236}">
+                <a16:creationId xmlns:a16="http://schemas.microsoft.com/office/drawing/2014/main" id="{4D52AD16-0151-4B2E-B95B-0789EDDB8DBB}"/>
+              </a:ext>
+            </a:extLst>
+          </p:cNvPr>
+          <p:cNvSpPr/>
+          <p:nvPr/>
+        </p:nvSpPr>
+        <p:spPr>
+          <a:xfrm>
+            <a:off x="4183595" y="4267866"/>
+            <a:ext cx="1087946" cy="720000"/>
+          </a:xfrm>
+          <a:prstGeom prst="hexagon">
+            <a:avLst/>
+          </a:prstGeom>
+          <a:noFill/>
+          <a:ln w="12700">
+            <a:solidFill>
+              <a:schemeClr val="accent4"/>
+            </a:solidFill>
+          </a:ln>
+        </p:spPr>
+        <p:style>
+          <a:lnRef idx="2">
+            <a:schemeClr val="accent1">
+              <a:shade val="50000"/>
+            </a:schemeClr>
+          </a:lnRef>
+          <a:fillRef idx="1">
+            <a:schemeClr val="accent1"/>
+          </a:fillRef>
+          <a:effectRef idx="0">
+            <a:schemeClr val="accent1"/>
+          </a:effectRef>
+          <a:fontRef idx="minor">
+            <a:schemeClr val="lt1"/>
+          </a:fontRef>
+        </p:style>
+        <p:txBody>
+          <a:bodyPr rtlCol="0" anchor="ctr"/>
+          <a:lstStyle/>
+          <a:p>
+            <a:pPr algn="ctr"/>
+            <a:r>
+              <a:rPr lang="es-MX" sz="1050" dirty="0" err="1">
+                <a:solidFill>
+                  <a:schemeClr val="accent2"/>
+                </a:solidFill>
+                <a:latin typeface="Proxima Nova" panose="020B0604020202020204" charset="0"/>
+              </a:rPr>
+              <a:t>Naive</a:t>
+            </a:r>
+            <a:r>
+              <a:rPr lang="es-MX" sz="1050" dirty="0">
+                <a:solidFill>
+                  <a:schemeClr val="accent2"/>
+                </a:solidFill>
+                <a:latin typeface="Proxima Nova" panose="020B0604020202020204" charset="0"/>
+              </a:rPr>
+              <a:t> Bayes</a:t>
+            </a:r>
+            <a:endParaRPr lang="es-AR" sz="1050" dirty="0">
+              <a:solidFill>
+                <a:schemeClr val="accent2"/>
+              </a:solidFill>
+              <a:latin typeface="Proxima Nova" panose="020B0604020202020204" charset="0"/>
+            </a:endParaRPr>
+          </a:p>
+        </p:txBody>
+      </p:sp>
+      <p:cxnSp>
+        <p:nvCxnSpPr>
+          <p:cNvPr id="36" name="Conector recto 35">
+            <a:extLst>
+              <a:ext uri="{FF2B5EF4-FFF2-40B4-BE49-F238E27FC236}">
+                <a16:creationId xmlns:a16="http://schemas.microsoft.com/office/drawing/2014/main" id="{DA36487B-70D6-4513-83E7-34771DF087AD}"/>
+              </a:ext>
+            </a:extLst>
+          </p:cNvPr>
+          <p:cNvCxnSpPr>
+            <a:cxnSpLocks/>
+          </p:cNvCxnSpPr>
+          <p:nvPr/>
+        </p:nvCxnSpPr>
+        <p:spPr>
+          <a:xfrm>
+            <a:off x="4382779" y="3996401"/>
+            <a:ext cx="344789" cy="270528"/>
+          </a:xfrm>
+          <a:prstGeom prst="line">
+            <a:avLst/>
+          </a:prstGeom>
+          <a:ln w="12700">
             <a:solidFill>
               <a:schemeClr val="accent4"/>
             </a:solidFill>
@@ -32338,10 +33652,18 @@
               <a:buNone/>
             </a:pPr>
             <a:r>
-              <a:rPr lang="en-GB"/>
-              <a:t>Variable(s) independiente(s)</a:t>
-            </a:r>
-            <a:endParaRPr/>
+              <a:rPr lang="en-GB" dirty="0"/>
+              <a:t>Variable(s) </a:t>
+            </a:r>
+            <a:r>
+              <a:rPr lang="en-GB" dirty="0" err="1"/>
+              <a:t>independiente</a:t>
+            </a:r>
+            <a:r>
+              <a:rPr lang="en-GB" dirty="0"/>
+              <a:t>(s)</a:t>
+            </a:r>
+            <a:endParaRPr dirty="0"/>
           </a:p>
           <a:p>
             <a:pPr marL="0" lvl="0" indent="0" algn="ctr" rtl="0">
@@ -32353,7 +33675,7 @@
               </a:spcAft>
               <a:buNone/>
             </a:pPr>
-            <a:endParaRPr/>
+            <a:endParaRPr dirty="0"/>
           </a:p>
           <a:p>
             <a:pPr marL="0" lvl="0" indent="0" algn="ctr" rtl="0">
@@ -32366,10 +33688,10 @@
               <a:buNone/>
             </a:pPr>
             <a:r>
-              <a:rPr lang="en-GB" b="1"/>
+              <a:rPr lang="en-GB" b="1" dirty="0"/>
               <a:t>X</a:t>
             </a:r>
-            <a:endParaRPr b="1"/>
+            <a:endParaRPr b="1" dirty="0"/>
           </a:p>
         </p:txBody>
       </p:sp>

</xml_diff>

<commit_message>
corrijo typos post clase
</commit_message>
<xml_diff>
--- a/clase1/teorica_1.pptx
+++ b/clase1/teorica_1.pptx
@@ -11891,33 +11891,6 @@
           </a:p>
         </p:txBody>
       </p:sp>
-      <p:pic>
-        <p:nvPicPr>
-          <p:cNvPr id="61" name="Google Shape;61;p13"/>
-          <p:cNvPicPr preferRelativeResize="0"/>
-          <p:nvPr/>
-        </p:nvPicPr>
-        <p:blipFill rotWithShape="1">
-          <a:blip r:embed="rId3">
-            <a:alphaModFix/>
-          </a:blip>
-          <a:srcRect l="15544" t="36940" r="15948" b="37818"/>
-          <a:stretch/>
-        </p:blipFill>
-        <p:spPr>
-          <a:xfrm>
-            <a:off x="7195950" y="284375"/>
-            <a:ext cx="1684874" cy="465550"/>
-          </a:xfrm>
-          <a:prstGeom prst="rect">
-            <a:avLst/>
-          </a:prstGeom>
-          <a:noFill/>
-          <a:ln>
-            <a:noFill/>
-          </a:ln>
-        </p:spPr>
-      </p:pic>
     </p:spTree>
   </p:cSld>
   <p:clrMapOvr>
@@ -14145,8 +14118,8 @@
         </p:nvSpPr>
         <p:spPr>
           <a:xfrm>
-            <a:off x="311700" y="1152475"/>
-            <a:ext cx="4060500" cy="3416400"/>
+            <a:off x="311699" y="1152475"/>
+            <a:ext cx="4068000" cy="3416400"/>
           </a:xfrm>
           <a:prstGeom prst="rect">
             <a:avLst/>
@@ -14312,7 +14285,7 @@
         <p:spPr>
           <a:xfrm>
             <a:off x="4771800" y="1152475"/>
-            <a:ext cx="4060500" cy="3416400"/>
+            <a:ext cx="4068000" cy="3416400"/>
           </a:xfrm>
           <a:prstGeom prst="rect">
             <a:avLst/>
@@ -20119,7 +20092,7 @@
                         <a:rPr lang="es-MX" sz="2000" b="0" i="1" smtClean="0">
                           <a:latin typeface="Cambria Math" panose="02040503050406030204" pitchFamily="18" charset="0"/>
                         </a:rPr>
-                        <m:t>−</m:t>
+                        <m:t>+</m:t>
                       </m:r>
                       <m:r>
                         <a:rPr lang="es-MX" sz="2000" b="0" i="1" smtClean="0">

</xml_diff>

<commit_message>
Actualizo readme (y agrego biblio)
</commit_message>
<xml_diff>
--- a/clase1/teorica_1.pptx
+++ b/clase1/teorica_1.pptx
@@ -69,15 +69,11 @@
       <p:regular r:id="rId55"/>
     </p:embeddedFont>
     <p:embeddedFont>
-      <p:font typeface="MS Mincho" panose="02020609040205080304" pitchFamily="49" charset="-128"/>
+      <p:font typeface="Proxima Nova" panose="020B0604020202020204" charset="0"/>
       <p:regular r:id="rId56"/>
-    </p:embeddedFont>
-    <p:embeddedFont>
-      <p:font typeface="Proxima Nova" panose="020B0604020202020204" charset="0"/>
-      <p:regular r:id="rId57"/>
-      <p:bold r:id="rId58"/>
-      <p:italic r:id="rId59"/>
-      <p:boldItalic r:id="rId60"/>
+      <p:bold r:id="rId57"/>
+      <p:italic r:id="rId58"/>
+      <p:boldItalic r:id="rId59"/>
     </p:embeddedFont>
   </p:embeddedFontLst>
   <p:defaultTextStyle>
@@ -14563,35 +14559,8 @@
                   <a:schemeClr val="bg2"/>
                 </a:solidFill>
               </a:rPr>
-              <a:t>Santiago</a:t>
-            </a:r>
-          </a:p>
-          <a:p>
-            <a:pPr marL="0" indent="0">
-              <a:buFont typeface="Proxima Nova"/>
-              <a:buNone/>
-            </a:pPr>
-            <a:r>
-              <a:rPr lang="es-MX" sz="2400" b="1" dirty="0">
-                <a:solidFill>
-                  <a:schemeClr val="bg2"/>
-                </a:solidFill>
-              </a:rPr>
-              <a:t>Núñez </a:t>
-            </a:r>
-            <a:r>
-              <a:rPr lang="es-MX" sz="2400" b="1" dirty="0" err="1">
-                <a:solidFill>
-                  <a:schemeClr val="bg2"/>
-                </a:solidFill>
-              </a:rPr>
-              <a:t>Rimedio</a:t>
-            </a:r>
-            <a:endParaRPr lang="es-MX" sz="2400" b="1" dirty="0">
-              <a:solidFill>
-                <a:schemeClr val="bg2"/>
-              </a:solidFill>
-            </a:endParaRPr>
+              <a:t>Nayla Sol Garcilazo</a:t>
+            </a:r>
           </a:p>
           <a:p>
             <a:pPr marL="114300" indent="0">
@@ -14607,7 +14576,7 @@
             </a:pPr>
             <a:r>
               <a:rPr lang="es-MX" dirty="0"/>
-              <a:t>Estudiante de Antropología Social UNSAM</a:t>
+              <a:t>Lic. en Sociología UBA</a:t>
             </a:r>
           </a:p>
           <a:p>
@@ -14617,11 +14586,21 @@
             </a:pPr>
             <a:r>
               <a:rPr lang="es-MX" dirty="0"/>
+              <a:t>Diploma en Análisis de Datos y Pol. Públicas UBA</a:t>
+            </a:r>
+          </a:p>
+          <a:p>
+            <a:pPr>
+              <a:buFont typeface="Wingdings" panose="05000000000000000000" pitchFamily="2" charset="2"/>
+              <a:buChar char="§"/>
+            </a:pPr>
+            <a:r>
+              <a:rPr lang="es-MX" dirty="0"/>
               <a:t>Asistente de investigación </a:t>
             </a:r>
             <a:r>
               <a:rPr lang="es-MX" dirty="0" err="1"/>
-              <a:t>factor</a:t>
+              <a:t>Factor</a:t>
             </a:r>
             <a:r>
               <a:rPr lang="es-MX" sz="1200" dirty="0" err="1"/>
@@ -14629,7 +14608,7 @@
             </a:r>
             <a:r>
               <a:rPr lang="es-MX" dirty="0" err="1"/>
-              <a:t>data</a:t>
+              <a:t>Data</a:t>
             </a:r>
             <a:endParaRPr lang="es-MX" dirty="0"/>
           </a:p>
@@ -19802,8 +19781,8 @@
           </a:p>
         </p:txBody>
       </p:sp>
-      <mc:AlternateContent xmlns:mc="http://schemas.openxmlformats.org/markup-compatibility/2006">
-        <mc:Choice xmlns:a14="http://schemas.microsoft.com/office/drawing/2010/main" Requires="a14">
+      <mc:AlternateContent xmlns:mc="http://schemas.openxmlformats.org/markup-compatibility/2006" xmlns:a14="http://schemas.microsoft.com/office/drawing/2010/main">
+        <mc:Choice Requires="a14">
           <p:sp>
             <p:nvSpPr>
               <p:cNvPr id="3" name="Marcador de texto 2">
@@ -20205,7 +20184,7 @@
             </p:txBody>
           </p:sp>
         </mc:Choice>
-        <mc:Fallback>
+        <mc:Fallback xmlns="">
           <p:sp>
             <p:nvSpPr>
               <p:cNvPr id="3" name="Marcador de texto 2">

</xml_diff>